<commit_message>
Some changes to the Rust presentation. Still not complete.
</commit_message>
<xml_diff>
--- a/09-04 - Making the Case for Rust/Making the Case for Rust.pptx
+++ b/09-04 - Making the Case for Rust/Making the Case for Rust.pptx
@@ -4,6 +4,9 @@
   <p:sldMasterIdLst>
     <p:sldMasterId id="2147483648" r:id="rId1"/>
   </p:sldMasterIdLst>
+  <p:notesMasterIdLst>
+    <p:notesMasterId r:id="rId18"/>
+  </p:notesMasterIdLst>
   <p:sldIdLst>
     <p:sldId id="256" r:id="rId2"/>
     <p:sldId id="261" r:id="rId3"/>
@@ -11,6 +14,16 @@
     <p:sldId id="257" r:id="rId5"/>
     <p:sldId id="258" r:id="rId6"/>
     <p:sldId id="259" r:id="rId7"/>
+    <p:sldId id="262" r:id="rId8"/>
+    <p:sldId id="267" r:id="rId9"/>
+    <p:sldId id="266" r:id="rId10"/>
+    <p:sldId id="263" r:id="rId11"/>
+    <p:sldId id="264" r:id="rId12"/>
+    <p:sldId id="268" r:id="rId13"/>
+    <p:sldId id="269" r:id="rId14"/>
+    <p:sldId id="270" r:id="rId15"/>
+    <p:sldId id="271" r:id="rId16"/>
+    <p:sldId id="265" r:id="rId17"/>
   </p:sldIdLst>
   <p:sldSz cx="12192000" cy="6858000"/>
   <p:notesSz cx="6858000" cy="9144000"/>
@@ -109,7 +122,451 @@
       </a:defRPr>
     </a:lvl9pPr>
   </p:defaultTextStyle>
+  <p:extLst>
+    <p:ext uri="{EFAFB233-063F-42B5-8137-9DF3F51BA10A}">
+      <p15:sldGuideLst xmlns:p15="http://schemas.microsoft.com/office/powerpoint/2012/main"/>
+    </p:ext>
+  </p:extLst>
 </p:presentation>
+</file>
+
+<file path=ppt/notesMasters/notesMaster1.xml><?xml version="1.0" encoding="utf-8"?>
+<p:notesMaster xmlns:a="http://schemas.openxmlformats.org/drawingml/2006/main" xmlns:r="http://schemas.openxmlformats.org/officeDocument/2006/relationships" xmlns:p="http://schemas.openxmlformats.org/presentationml/2006/main">
+  <p:cSld>
+    <p:bg>
+      <p:bgRef idx="1001">
+        <a:schemeClr val="bg1"/>
+      </p:bgRef>
+    </p:bg>
+    <p:spTree>
+      <p:nvGrpSpPr>
+        <p:cNvPr id="1" name=""/>
+        <p:cNvGrpSpPr/>
+        <p:nvPr/>
+      </p:nvGrpSpPr>
+      <p:grpSpPr>
+        <a:xfrm>
+          <a:off x="0" y="0"/>
+          <a:ext cx="0" cy="0"/>
+          <a:chOff x="0" y="0"/>
+          <a:chExt cx="0" cy="0"/>
+        </a:xfrm>
+      </p:grpSpPr>
+      <p:sp>
+        <p:nvSpPr>
+          <p:cNvPr id="2" name="Header Placeholder 1"/>
+          <p:cNvSpPr>
+            <a:spLocks noGrp="1"/>
+          </p:cNvSpPr>
+          <p:nvPr>
+            <p:ph type="hdr" sz="quarter"/>
+          </p:nvPr>
+        </p:nvSpPr>
+        <p:spPr>
+          <a:xfrm>
+            <a:off x="0" y="0"/>
+            <a:ext cx="2971800" cy="458788"/>
+          </a:xfrm>
+          <a:prstGeom prst="rect">
+            <a:avLst/>
+          </a:prstGeom>
+        </p:spPr>
+        <p:txBody>
+          <a:bodyPr vert="horz" lIns="91440" tIns="45720" rIns="91440" bIns="45720" rtlCol="0"/>
+          <a:lstStyle>
+            <a:lvl1pPr algn="l">
+              <a:defRPr sz="1200"/>
+            </a:lvl1pPr>
+          </a:lstStyle>
+          <a:p>
+            <a:endParaRPr lang="en-US"/>
+          </a:p>
+        </p:txBody>
+      </p:sp>
+      <p:sp>
+        <p:nvSpPr>
+          <p:cNvPr id="3" name="Date Placeholder 2"/>
+          <p:cNvSpPr>
+            <a:spLocks noGrp="1"/>
+          </p:cNvSpPr>
+          <p:nvPr>
+            <p:ph type="dt" idx="1"/>
+          </p:nvPr>
+        </p:nvSpPr>
+        <p:spPr>
+          <a:xfrm>
+            <a:off x="3884613" y="0"/>
+            <a:ext cx="2971800" cy="458788"/>
+          </a:xfrm>
+          <a:prstGeom prst="rect">
+            <a:avLst/>
+          </a:prstGeom>
+        </p:spPr>
+        <p:txBody>
+          <a:bodyPr vert="horz" lIns="91440" tIns="45720" rIns="91440" bIns="45720" rtlCol="0"/>
+          <a:lstStyle>
+            <a:lvl1pPr algn="r">
+              <a:defRPr sz="1200"/>
+            </a:lvl1pPr>
+          </a:lstStyle>
+          <a:p>
+            <a:fld id="{427BEAE6-7F5E-44C7-AA01-D551108D503B}" type="datetimeFigureOut">
+              <a:rPr lang="en-US" smtClean="0"/>
+              <a:t>9/1/2019</a:t>
+            </a:fld>
+            <a:endParaRPr lang="en-US"/>
+          </a:p>
+        </p:txBody>
+      </p:sp>
+      <p:sp>
+        <p:nvSpPr>
+          <p:cNvPr id="4" name="Slide Image Placeholder 3"/>
+          <p:cNvSpPr>
+            <a:spLocks noGrp="1" noRot="1" noChangeAspect="1"/>
+          </p:cNvSpPr>
+          <p:nvPr>
+            <p:ph type="sldImg" idx="2"/>
+          </p:nvPr>
+        </p:nvSpPr>
+        <p:spPr>
+          <a:xfrm>
+            <a:off x="685800" y="1143000"/>
+            <a:ext cx="5486400" cy="3086100"/>
+          </a:xfrm>
+          <a:prstGeom prst="rect">
+            <a:avLst/>
+          </a:prstGeom>
+          <a:noFill/>
+          <a:ln w="12700">
+            <a:solidFill>
+              <a:prstClr val="black"/>
+            </a:solidFill>
+          </a:ln>
+        </p:spPr>
+        <p:txBody>
+          <a:bodyPr vert="horz" lIns="91440" tIns="45720" rIns="91440" bIns="45720" rtlCol="0" anchor="ctr"/>
+          <a:lstStyle/>
+          <a:p>
+            <a:endParaRPr lang="en-US"/>
+          </a:p>
+        </p:txBody>
+      </p:sp>
+      <p:sp>
+        <p:nvSpPr>
+          <p:cNvPr id="5" name="Notes Placeholder 4"/>
+          <p:cNvSpPr>
+            <a:spLocks noGrp="1"/>
+          </p:cNvSpPr>
+          <p:nvPr>
+            <p:ph type="body" sz="quarter" idx="3"/>
+          </p:nvPr>
+        </p:nvSpPr>
+        <p:spPr>
+          <a:xfrm>
+            <a:off x="685800" y="4400550"/>
+            <a:ext cx="5486400" cy="3600450"/>
+          </a:xfrm>
+          <a:prstGeom prst="rect">
+            <a:avLst/>
+          </a:prstGeom>
+        </p:spPr>
+        <p:txBody>
+          <a:bodyPr vert="horz" lIns="91440" tIns="45720" rIns="91440" bIns="45720" rtlCol="0"/>
+          <a:lstStyle/>
+          <a:p>
+            <a:pPr lvl="0"/>
+            <a:r>
+              <a:rPr lang="en-US"/>
+              <a:t>Click to edit Master text styles</a:t>
+            </a:r>
+          </a:p>
+          <a:p>
+            <a:pPr lvl="1"/>
+            <a:r>
+              <a:rPr lang="en-US"/>
+              <a:t>Second level</a:t>
+            </a:r>
+          </a:p>
+          <a:p>
+            <a:pPr lvl="2"/>
+            <a:r>
+              <a:rPr lang="en-US"/>
+              <a:t>Third level</a:t>
+            </a:r>
+          </a:p>
+          <a:p>
+            <a:pPr lvl="3"/>
+            <a:r>
+              <a:rPr lang="en-US"/>
+              <a:t>Fourth level</a:t>
+            </a:r>
+          </a:p>
+          <a:p>
+            <a:pPr lvl="4"/>
+            <a:r>
+              <a:rPr lang="en-US"/>
+              <a:t>Fifth level</a:t>
+            </a:r>
+          </a:p>
+        </p:txBody>
+      </p:sp>
+      <p:sp>
+        <p:nvSpPr>
+          <p:cNvPr id="6" name="Footer Placeholder 5"/>
+          <p:cNvSpPr>
+            <a:spLocks noGrp="1"/>
+          </p:cNvSpPr>
+          <p:nvPr>
+            <p:ph type="ftr" sz="quarter" idx="4"/>
+          </p:nvPr>
+        </p:nvSpPr>
+        <p:spPr>
+          <a:xfrm>
+            <a:off x="0" y="8685213"/>
+            <a:ext cx="2971800" cy="458787"/>
+          </a:xfrm>
+          <a:prstGeom prst="rect">
+            <a:avLst/>
+          </a:prstGeom>
+        </p:spPr>
+        <p:txBody>
+          <a:bodyPr vert="horz" lIns="91440" tIns="45720" rIns="91440" bIns="45720" rtlCol="0" anchor="b"/>
+          <a:lstStyle>
+            <a:lvl1pPr algn="l">
+              <a:defRPr sz="1200"/>
+            </a:lvl1pPr>
+          </a:lstStyle>
+          <a:p>
+            <a:endParaRPr lang="en-US"/>
+          </a:p>
+        </p:txBody>
+      </p:sp>
+      <p:sp>
+        <p:nvSpPr>
+          <p:cNvPr id="7" name="Slide Number Placeholder 6"/>
+          <p:cNvSpPr>
+            <a:spLocks noGrp="1"/>
+          </p:cNvSpPr>
+          <p:nvPr>
+            <p:ph type="sldNum" sz="quarter" idx="5"/>
+          </p:nvPr>
+        </p:nvSpPr>
+        <p:spPr>
+          <a:xfrm>
+            <a:off x="3884613" y="8685213"/>
+            <a:ext cx="2971800" cy="458787"/>
+          </a:xfrm>
+          <a:prstGeom prst="rect">
+            <a:avLst/>
+          </a:prstGeom>
+        </p:spPr>
+        <p:txBody>
+          <a:bodyPr vert="horz" lIns="91440" tIns="45720" rIns="91440" bIns="45720" rtlCol="0" anchor="b"/>
+          <a:lstStyle>
+            <a:lvl1pPr algn="r">
+              <a:defRPr sz="1200"/>
+            </a:lvl1pPr>
+          </a:lstStyle>
+          <a:p>
+            <a:fld id="{2C394F0E-C712-487E-B1FC-CE9069FFBDEB}" type="slidenum">
+              <a:rPr lang="en-US" smtClean="0"/>
+              <a:t>‹#›</a:t>
+            </a:fld>
+            <a:endParaRPr lang="en-US"/>
+          </a:p>
+        </p:txBody>
+      </p:sp>
+    </p:spTree>
+    <p:extLst>
+      <p:ext uri="{BB962C8B-B14F-4D97-AF65-F5344CB8AC3E}">
+        <p14:creationId xmlns:p14="http://schemas.microsoft.com/office/powerpoint/2010/main" val="726641507"/>
+      </p:ext>
+    </p:extLst>
+  </p:cSld>
+  <p:clrMap bg1="lt1" tx1="dk1" bg2="lt2" tx2="dk2" accent1="accent1" accent2="accent2" accent3="accent3" accent4="accent4" accent5="accent5" accent6="accent6" hlink="hlink" folHlink="folHlink"/>
+  <p:notesStyle>
+    <a:lvl1pPr marL="0" algn="l" defTabSz="914400" rtl="0" eaLnBrk="1" latinLnBrk="0" hangingPunct="1">
+      <a:defRPr sz="1200" kern="1200">
+        <a:solidFill>
+          <a:schemeClr val="tx1"/>
+        </a:solidFill>
+        <a:latin typeface="+mn-lt"/>
+        <a:ea typeface="+mn-ea"/>
+        <a:cs typeface="+mn-cs"/>
+      </a:defRPr>
+    </a:lvl1pPr>
+    <a:lvl2pPr marL="457200" algn="l" defTabSz="914400" rtl="0" eaLnBrk="1" latinLnBrk="0" hangingPunct="1">
+      <a:defRPr sz="1200" kern="1200">
+        <a:solidFill>
+          <a:schemeClr val="tx1"/>
+        </a:solidFill>
+        <a:latin typeface="+mn-lt"/>
+        <a:ea typeface="+mn-ea"/>
+        <a:cs typeface="+mn-cs"/>
+      </a:defRPr>
+    </a:lvl2pPr>
+    <a:lvl3pPr marL="914400" algn="l" defTabSz="914400" rtl="0" eaLnBrk="1" latinLnBrk="0" hangingPunct="1">
+      <a:defRPr sz="1200" kern="1200">
+        <a:solidFill>
+          <a:schemeClr val="tx1"/>
+        </a:solidFill>
+        <a:latin typeface="+mn-lt"/>
+        <a:ea typeface="+mn-ea"/>
+        <a:cs typeface="+mn-cs"/>
+      </a:defRPr>
+    </a:lvl3pPr>
+    <a:lvl4pPr marL="1371600" algn="l" defTabSz="914400" rtl="0" eaLnBrk="1" latinLnBrk="0" hangingPunct="1">
+      <a:defRPr sz="1200" kern="1200">
+        <a:solidFill>
+          <a:schemeClr val="tx1"/>
+        </a:solidFill>
+        <a:latin typeface="+mn-lt"/>
+        <a:ea typeface="+mn-ea"/>
+        <a:cs typeface="+mn-cs"/>
+      </a:defRPr>
+    </a:lvl4pPr>
+    <a:lvl5pPr marL="1828800" algn="l" defTabSz="914400" rtl="0" eaLnBrk="1" latinLnBrk="0" hangingPunct="1">
+      <a:defRPr sz="1200" kern="1200">
+        <a:solidFill>
+          <a:schemeClr val="tx1"/>
+        </a:solidFill>
+        <a:latin typeface="+mn-lt"/>
+        <a:ea typeface="+mn-ea"/>
+        <a:cs typeface="+mn-cs"/>
+      </a:defRPr>
+    </a:lvl5pPr>
+    <a:lvl6pPr marL="2286000" algn="l" defTabSz="914400" rtl="0" eaLnBrk="1" latinLnBrk="0" hangingPunct="1">
+      <a:defRPr sz="1200" kern="1200">
+        <a:solidFill>
+          <a:schemeClr val="tx1"/>
+        </a:solidFill>
+        <a:latin typeface="+mn-lt"/>
+        <a:ea typeface="+mn-ea"/>
+        <a:cs typeface="+mn-cs"/>
+      </a:defRPr>
+    </a:lvl6pPr>
+    <a:lvl7pPr marL="2743200" algn="l" defTabSz="914400" rtl="0" eaLnBrk="1" latinLnBrk="0" hangingPunct="1">
+      <a:defRPr sz="1200" kern="1200">
+        <a:solidFill>
+          <a:schemeClr val="tx1"/>
+        </a:solidFill>
+        <a:latin typeface="+mn-lt"/>
+        <a:ea typeface="+mn-ea"/>
+        <a:cs typeface="+mn-cs"/>
+      </a:defRPr>
+    </a:lvl7pPr>
+    <a:lvl8pPr marL="3200400" algn="l" defTabSz="914400" rtl="0" eaLnBrk="1" latinLnBrk="0" hangingPunct="1">
+      <a:defRPr sz="1200" kern="1200">
+        <a:solidFill>
+          <a:schemeClr val="tx1"/>
+        </a:solidFill>
+        <a:latin typeface="+mn-lt"/>
+        <a:ea typeface="+mn-ea"/>
+        <a:cs typeface="+mn-cs"/>
+      </a:defRPr>
+    </a:lvl8pPr>
+    <a:lvl9pPr marL="3657600" algn="l" defTabSz="914400" rtl="0" eaLnBrk="1" latinLnBrk="0" hangingPunct="1">
+      <a:defRPr sz="1200" kern="1200">
+        <a:solidFill>
+          <a:schemeClr val="tx1"/>
+        </a:solidFill>
+        <a:latin typeface="+mn-lt"/>
+        <a:ea typeface="+mn-ea"/>
+        <a:cs typeface="+mn-cs"/>
+      </a:defRPr>
+    </a:lvl9pPr>
+  </p:notesStyle>
+</p:notesMaster>
+</file>
+
+<file path=ppt/notesSlides/notesSlide1.xml><?xml version="1.0" encoding="utf-8"?>
+<p:notes xmlns:a="http://schemas.openxmlformats.org/drawingml/2006/main" xmlns:r="http://schemas.openxmlformats.org/officeDocument/2006/relationships" xmlns:p="http://schemas.openxmlformats.org/presentationml/2006/main">
+  <p:cSld>
+    <p:spTree>
+      <p:nvGrpSpPr>
+        <p:cNvPr id="1" name=""/>
+        <p:cNvGrpSpPr/>
+        <p:nvPr/>
+      </p:nvGrpSpPr>
+      <p:grpSpPr>
+        <a:xfrm>
+          <a:off x="0" y="0"/>
+          <a:ext cx="0" cy="0"/>
+          <a:chOff x="0" y="0"/>
+          <a:chExt cx="0" cy="0"/>
+        </a:xfrm>
+      </p:grpSpPr>
+      <p:sp>
+        <p:nvSpPr>
+          <p:cNvPr id="2" name="Slide Image Placeholder 1"/>
+          <p:cNvSpPr>
+            <a:spLocks noGrp="1" noRot="1" noChangeAspect="1"/>
+          </p:cNvSpPr>
+          <p:nvPr>
+            <p:ph type="sldImg"/>
+          </p:nvPr>
+        </p:nvSpPr>
+        <p:spPr/>
+      </p:sp>
+      <p:sp>
+        <p:nvSpPr>
+          <p:cNvPr id="3" name="Notes Placeholder 2"/>
+          <p:cNvSpPr>
+            <a:spLocks noGrp="1"/>
+          </p:cNvSpPr>
+          <p:nvPr>
+            <p:ph type="body" idx="1"/>
+          </p:nvPr>
+        </p:nvSpPr>
+        <p:spPr/>
+        <p:txBody>
+          <a:bodyPr/>
+          <a:lstStyle/>
+          <a:p>
+            <a:r>
+              <a:rPr lang="en-US" dirty="0"/>
+              <a:t>Atmel Include: C:\Program Files (x86)\Atmel\Studio\7.0\toolchain\avr8\avr8-gnu-toolchain\avr\include</a:t>
+            </a:r>
+          </a:p>
+          <a:p>
+            <a:endParaRPr lang="en-US" dirty="0"/>
+          </a:p>
+        </p:txBody>
+      </p:sp>
+      <p:sp>
+        <p:nvSpPr>
+          <p:cNvPr id="4" name="Slide Number Placeholder 3"/>
+          <p:cNvSpPr>
+            <a:spLocks noGrp="1"/>
+          </p:cNvSpPr>
+          <p:nvPr>
+            <p:ph type="sldNum" sz="quarter" idx="5"/>
+          </p:nvPr>
+        </p:nvSpPr>
+        <p:spPr/>
+        <p:txBody>
+          <a:bodyPr/>
+          <a:lstStyle/>
+          <a:p>
+            <a:fld id="{2C394F0E-C712-487E-B1FC-CE9069FFBDEB}" type="slidenum">
+              <a:rPr lang="en-US" smtClean="0"/>
+              <a:t>10</a:t>
+            </a:fld>
+            <a:endParaRPr lang="en-US"/>
+          </a:p>
+        </p:txBody>
+      </p:sp>
+    </p:spTree>
+    <p:extLst>
+      <p:ext uri="{BB962C8B-B14F-4D97-AF65-F5344CB8AC3E}">
+        <p14:creationId xmlns:p14="http://schemas.microsoft.com/office/powerpoint/2010/main" val="1068007173"/>
+      </p:ext>
+    </p:extLst>
+  </p:cSld>
+  <p:clrMapOvr>
+    <a:masterClrMapping/>
+  </p:clrMapOvr>
+</p:notes>
 </file>
 
 <file path=ppt/slideLayouts/slideLayout1.xml><?xml version="1.0" encoding="utf-8"?>
@@ -259,7 +716,7 @@
           <a:p>
             <a:fld id="{5626CA67-F505-4C48-AD4A-1EC18FAC153A}" type="datetimeFigureOut">
               <a:rPr lang="en-US" smtClean="0"/>
-              <a:t>8/27/2019</a:t>
+              <a:t>9/1/2019</a:t>
             </a:fld>
             <a:endParaRPr lang="en-US"/>
           </a:p>
@@ -457,7 +914,7 @@
           <a:p>
             <a:fld id="{5626CA67-F505-4C48-AD4A-1EC18FAC153A}" type="datetimeFigureOut">
               <a:rPr lang="en-US" smtClean="0"/>
-              <a:t>8/27/2019</a:t>
+              <a:t>9/1/2019</a:t>
             </a:fld>
             <a:endParaRPr lang="en-US"/>
           </a:p>
@@ -665,7 +1122,7 @@
           <a:p>
             <a:fld id="{5626CA67-F505-4C48-AD4A-1EC18FAC153A}" type="datetimeFigureOut">
               <a:rPr lang="en-US" smtClean="0"/>
-              <a:t>8/27/2019</a:t>
+              <a:t>9/1/2019</a:t>
             </a:fld>
             <a:endParaRPr lang="en-US"/>
           </a:p>
@@ -863,7 +1320,7 @@
           <a:p>
             <a:fld id="{5626CA67-F505-4C48-AD4A-1EC18FAC153A}" type="datetimeFigureOut">
               <a:rPr lang="en-US" smtClean="0"/>
-              <a:t>8/27/2019</a:t>
+              <a:t>9/1/2019</a:t>
             </a:fld>
             <a:endParaRPr lang="en-US"/>
           </a:p>
@@ -1138,7 +1595,7 @@
           <a:p>
             <a:fld id="{5626CA67-F505-4C48-AD4A-1EC18FAC153A}" type="datetimeFigureOut">
               <a:rPr lang="en-US" smtClean="0"/>
-              <a:t>8/27/2019</a:t>
+              <a:t>9/1/2019</a:t>
             </a:fld>
             <a:endParaRPr lang="en-US"/>
           </a:p>
@@ -1403,7 +1860,7 @@
           <a:p>
             <a:fld id="{5626CA67-F505-4C48-AD4A-1EC18FAC153A}" type="datetimeFigureOut">
               <a:rPr lang="en-US" smtClean="0"/>
-              <a:t>8/27/2019</a:t>
+              <a:t>9/1/2019</a:t>
             </a:fld>
             <a:endParaRPr lang="en-US"/>
           </a:p>
@@ -1815,7 +2272,7 @@
           <a:p>
             <a:fld id="{5626CA67-F505-4C48-AD4A-1EC18FAC153A}" type="datetimeFigureOut">
               <a:rPr lang="en-US" smtClean="0"/>
-              <a:t>8/27/2019</a:t>
+              <a:t>9/1/2019</a:t>
             </a:fld>
             <a:endParaRPr lang="en-US"/>
           </a:p>
@@ -1956,7 +2413,7 @@
           <a:p>
             <a:fld id="{5626CA67-F505-4C48-AD4A-1EC18FAC153A}" type="datetimeFigureOut">
               <a:rPr lang="en-US" smtClean="0"/>
-              <a:t>8/27/2019</a:t>
+              <a:t>9/1/2019</a:t>
             </a:fld>
             <a:endParaRPr lang="en-US"/>
           </a:p>
@@ -2069,7 +2526,7 @@
           <a:p>
             <a:fld id="{5626CA67-F505-4C48-AD4A-1EC18FAC153A}" type="datetimeFigureOut">
               <a:rPr lang="en-US" smtClean="0"/>
-              <a:t>8/27/2019</a:t>
+              <a:t>9/1/2019</a:t>
             </a:fld>
             <a:endParaRPr lang="en-US"/>
           </a:p>
@@ -2380,7 +2837,7 @@
           <a:p>
             <a:fld id="{5626CA67-F505-4C48-AD4A-1EC18FAC153A}" type="datetimeFigureOut">
               <a:rPr lang="en-US" smtClean="0"/>
-              <a:t>8/27/2019</a:t>
+              <a:t>9/1/2019</a:t>
             </a:fld>
             <a:endParaRPr lang="en-US"/>
           </a:p>
@@ -2668,7 +3125,7 @@
           <a:p>
             <a:fld id="{5626CA67-F505-4C48-AD4A-1EC18FAC153A}" type="datetimeFigureOut">
               <a:rPr lang="en-US" smtClean="0"/>
-              <a:t>8/27/2019</a:t>
+              <a:t>9/1/2019</a:t>
             </a:fld>
             <a:endParaRPr lang="en-US"/>
           </a:p>
@@ -2909,7 +3366,7 @@
           <a:p>
             <a:fld id="{5626CA67-F505-4C48-AD4A-1EC18FAC153A}" type="datetimeFigureOut">
               <a:rPr lang="en-US" smtClean="0"/>
-              <a:t>8/27/2019</a:t>
+              <a:t>9/1/2019</a:t>
             </a:fld>
             <a:endParaRPr lang="en-US"/>
           </a:p>
@@ -3426,6 +3883,809 @@
 </p:sld>
 </file>
 
+<file path=ppt/slides/slide10.xml><?xml version="1.0" encoding="utf-8"?>
+<p:sld xmlns:a="http://schemas.openxmlformats.org/drawingml/2006/main" xmlns:r="http://schemas.openxmlformats.org/officeDocument/2006/relationships" xmlns:p="http://schemas.openxmlformats.org/presentationml/2006/main">
+  <p:cSld>
+    <p:spTree>
+      <p:nvGrpSpPr>
+        <p:cNvPr id="1" name=""/>
+        <p:cNvGrpSpPr/>
+        <p:nvPr/>
+      </p:nvGrpSpPr>
+      <p:grpSpPr>
+        <a:xfrm>
+          <a:off x="0" y="0"/>
+          <a:ext cx="0" cy="0"/>
+          <a:chOff x="0" y="0"/>
+          <a:chExt cx="0" cy="0"/>
+        </a:xfrm>
+      </p:grpSpPr>
+      <p:sp>
+        <p:nvSpPr>
+          <p:cNvPr id="2" name="Title 1">
+            <a:extLst>
+              <a:ext uri="{FF2B5EF4-FFF2-40B4-BE49-F238E27FC236}">
+                <a16:creationId xmlns:a16="http://schemas.microsoft.com/office/drawing/2014/main" id="{CE5573C2-CF2A-4D6B-95EE-098267EC5A8E}"/>
+              </a:ext>
+            </a:extLst>
+          </p:cNvPr>
+          <p:cNvSpPr>
+            <a:spLocks noGrp="1"/>
+          </p:cNvSpPr>
+          <p:nvPr>
+            <p:ph type="title"/>
+          </p:nvPr>
+        </p:nvSpPr>
+        <p:spPr/>
+        <p:txBody>
+          <a:bodyPr/>
+          <a:lstStyle/>
+          <a:p>
+            <a:r>
+              <a:rPr lang="en-US" dirty="0"/>
+              <a:t>Crates</a:t>
+            </a:r>
+          </a:p>
+        </p:txBody>
+      </p:sp>
+      <p:sp>
+        <p:nvSpPr>
+          <p:cNvPr id="3" name="Content Placeholder 2">
+            <a:extLst>
+              <a:ext uri="{FF2B5EF4-FFF2-40B4-BE49-F238E27FC236}">
+                <a16:creationId xmlns:a16="http://schemas.microsoft.com/office/drawing/2014/main" id="{46BD3879-726E-4CE9-BF40-AFA3E2713707}"/>
+              </a:ext>
+            </a:extLst>
+          </p:cNvPr>
+          <p:cNvSpPr>
+            <a:spLocks noGrp="1"/>
+          </p:cNvSpPr>
+          <p:nvPr>
+            <p:ph idx="1"/>
+          </p:nvPr>
+        </p:nvSpPr>
+        <p:spPr/>
+        <p:txBody>
+          <a:bodyPr/>
+          <a:lstStyle/>
+          <a:p>
+            <a:r>
+              <a:rPr lang="en-US" dirty="0"/>
+              <a:t>Built in package manager</a:t>
+            </a:r>
+          </a:p>
+          <a:p>
+            <a:r>
+              <a:rPr lang="en-US" dirty="0"/>
+              <a:t>Creates for embedded dev</a:t>
+            </a:r>
+          </a:p>
+          <a:p>
+            <a:pPr lvl="1"/>
+            <a:r>
+              <a:rPr lang="en-US" dirty="0"/>
+              <a:t>For specific board</a:t>
+            </a:r>
+          </a:p>
+          <a:p>
+            <a:pPr lvl="1"/>
+            <a:r>
+              <a:rPr lang="en-US" dirty="0"/>
+              <a:t>Peripherals like serial port</a:t>
+            </a:r>
+          </a:p>
+          <a:p>
+            <a:pPr lvl="1"/>
+            <a:r>
+              <a:rPr lang="en-US" dirty="0"/>
+              <a:t>Just like a library from the manufacturer in C/C++</a:t>
+            </a:r>
+          </a:p>
+          <a:p>
+            <a:endParaRPr lang="en-US" dirty="0"/>
+          </a:p>
+        </p:txBody>
+      </p:sp>
+    </p:spTree>
+    <p:extLst>
+      <p:ext uri="{BB962C8B-B14F-4D97-AF65-F5344CB8AC3E}">
+        <p14:creationId xmlns:p14="http://schemas.microsoft.com/office/powerpoint/2010/main" val="3421545788"/>
+      </p:ext>
+    </p:extLst>
+  </p:cSld>
+  <p:clrMapOvr>
+    <a:masterClrMapping/>
+  </p:clrMapOvr>
+</p:sld>
+</file>
+
+<file path=ppt/slides/slide11.xml><?xml version="1.0" encoding="utf-8"?>
+<p:sld xmlns:a="http://schemas.openxmlformats.org/drawingml/2006/main" xmlns:r="http://schemas.openxmlformats.org/officeDocument/2006/relationships" xmlns:p="http://schemas.openxmlformats.org/presentationml/2006/main">
+  <p:cSld>
+    <p:spTree>
+      <p:nvGrpSpPr>
+        <p:cNvPr id="1" name=""/>
+        <p:cNvGrpSpPr/>
+        <p:nvPr/>
+      </p:nvGrpSpPr>
+      <p:grpSpPr>
+        <a:xfrm>
+          <a:off x="0" y="0"/>
+          <a:ext cx="0" cy="0"/>
+          <a:chOff x="0" y="0"/>
+          <a:chExt cx="0" cy="0"/>
+        </a:xfrm>
+      </p:grpSpPr>
+      <p:sp>
+        <p:nvSpPr>
+          <p:cNvPr id="2" name="Title 1">
+            <a:extLst>
+              <a:ext uri="{FF2B5EF4-FFF2-40B4-BE49-F238E27FC236}">
+                <a16:creationId xmlns:a16="http://schemas.microsoft.com/office/drawing/2014/main" id="{A05F49E9-698D-4B86-96C2-92EB4CD71323}"/>
+              </a:ext>
+            </a:extLst>
+          </p:cNvPr>
+          <p:cNvSpPr>
+            <a:spLocks noGrp="1"/>
+          </p:cNvSpPr>
+          <p:nvPr>
+            <p:ph type="title"/>
+          </p:nvPr>
+        </p:nvSpPr>
+        <p:spPr/>
+        <p:txBody>
+          <a:bodyPr/>
+          <a:lstStyle/>
+          <a:p>
+            <a:r>
+              <a:rPr lang="en-US" dirty="0"/>
+              <a:t>Immutability by Default</a:t>
+            </a:r>
+          </a:p>
+        </p:txBody>
+      </p:sp>
+      <p:sp>
+        <p:nvSpPr>
+          <p:cNvPr id="3" name="Content Placeholder 2">
+            <a:extLst>
+              <a:ext uri="{FF2B5EF4-FFF2-40B4-BE49-F238E27FC236}">
+                <a16:creationId xmlns:a16="http://schemas.microsoft.com/office/drawing/2014/main" id="{63B9D5E1-FD0D-4FDB-A0A4-1C2CEFDE431A}"/>
+              </a:ext>
+            </a:extLst>
+          </p:cNvPr>
+          <p:cNvSpPr>
+            <a:spLocks noGrp="1"/>
+          </p:cNvSpPr>
+          <p:nvPr>
+            <p:ph idx="1"/>
+          </p:nvPr>
+        </p:nvSpPr>
+        <p:spPr/>
+        <p:txBody>
+          <a:bodyPr/>
+          <a:lstStyle/>
+          <a:p>
+            <a:r>
+              <a:rPr lang="en-US" dirty="0"/>
+              <a:t>Every variable is immutable</a:t>
+            </a:r>
+          </a:p>
+          <a:p>
+            <a:r>
+              <a:rPr lang="en-US" dirty="0"/>
+              <a:t>Use keyword `</a:t>
+            </a:r>
+            <a:r>
+              <a:rPr lang="en-US" dirty="0" err="1"/>
+              <a:t>mut</a:t>
+            </a:r>
+            <a:r>
+              <a:rPr lang="en-US" dirty="0"/>
+              <a:t>` to mark is mutable</a:t>
+            </a:r>
+          </a:p>
+          <a:p>
+            <a:endParaRPr lang="en-US" dirty="0"/>
+          </a:p>
+        </p:txBody>
+      </p:sp>
+      <p:pic>
+        <p:nvPicPr>
+          <p:cNvPr id="4" name="Picture 3">
+            <a:extLst>
+              <a:ext uri="{FF2B5EF4-FFF2-40B4-BE49-F238E27FC236}">
+                <a16:creationId xmlns:a16="http://schemas.microsoft.com/office/drawing/2014/main" id="{C7C6A643-18D0-47A4-8BE7-F99FAF636448}"/>
+              </a:ext>
+            </a:extLst>
+          </p:cNvPr>
+          <p:cNvPicPr>
+            <a:picLocks noChangeAspect="1"/>
+          </p:cNvPicPr>
+          <p:nvPr/>
+        </p:nvPicPr>
+        <p:blipFill>
+          <a:blip r:embed="rId2"/>
+          <a:stretch>
+            <a:fillRect/>
+          </a:stretch>
+        </p:blipFill>
+        <p:spPr>
+          <a:xfrm>
+            <a:off x="2100943" y="3341472"/>
+            <a:ext cx="6889467" cy="2144927"/>
+          </a:xfrm>
+          <a:prstGeom prst="rect">
+            <a:avLst/>
+          </a:prstGeom>
+        </p:spPr>
+      </p:pic>
+    </p:spTree>
+    <p:extLst>
+      <p:ext uri="{BB962C8B-B14F-4D97-AF65-F5344CB8AC3E}">
+        <p14:creationId xmlns:p14="http://schemas.microsoft.com/office/powerpoint/2010/main" val="3815319022"/>
+      </p:ext>
+    </p:extLst>
+  </p:cSld>
+  <p:clrMapOvr>
+    <a:masterClrMapping/>
+  </p:clrMapOvr>
+</p:sld>
+</file>
+
+<file path=ppt/slides/slide12.xml><?xml version="1.0" encoding="utf-8"?>
+<p:sld xmlns:a="http://schemas.openxmlformats.org/drawingml/2006/main" xmlns:r="http://schemas.openxmlformats.org/officeDocument/2006/relationships" xmlns:p="http://schemas.openxmlformats.org/presentationml/2006/main">
+  <p:cSld>
+    <p:spTree>
+      <p:nvGrpSpPr>
+        <p:cNvPr id="1" name=""/>
+        <p:cNvGrpSpPr/>
+        <p:nvPr/>
+      </p:nvGrpSpPr>
+      <p:grpSpPr>
+        <a:xfrm>
+          <a:off x="0" y="0"/>
+          <a:ext cx="0" cy="0"/>
+          <a:chOff x="0" y="0"/>
+          <a:chExt cx="0" cy="0"/>
+        </a:xfrm>
+      </p:grpSpPr>
+      <p:sp>
+        <p:nvSpPr>
+          <p:cNvPr id="2" name="Title 1">
+            <a:extLst>
+              <a:ext uri="{FF2B5EF4-FFF2-40B4-BE49-F238E27FC236}">
+                <a16:creationId xmlns:a16="http://schemas.microsoft.com/office/drawing/2014/main" id="{B0F39A4C-54FB-48CC-B26E-BCFF7EAFF52D}"/>
+              </a:ext>
+            </a:extLst>
+          </p:cNvPr>
+          <p:cNvSpPr>
+            <a:spLocks noGrp="1"/>
+          </p:cNvSpPr>
+          <p:nvPr>
+            <p:ph type="title"/>
+          </p:nvPr>
+        </p:nvSpPr>
+        <p:spPr/>
+        <p:txBody>
+          <a:bodyPr/>
+          <a:lstStyle/>
+          <a:p>
+            <a:r>
+              <a:rPr lang="en-US" dirty="0"/>
+              <a:t>Interrupts and Exceptions</a:t>
+            </a:r>
+          </a:p>
+        </p:txBody>
+      </p:sp>
+      <p:sp>
+        <p:nvSpPr>
+          <p:cNvPr id="3" name="Content Placeholder 2">
+            <a:extLst>
+              <a:ext uri="{FF2B5EF4-FFF2-40B4-BE49-F238E27FC236}">
+                <a16:creationId xmlns:a16="http://schemas.microsoft.com/office/drawing/2014/main" id="{6D5FC10F-3A73-4F10-9FBA-D728D037BCA4}"/>
+              </a:ext>
+            </a:extLst>
+          </p:cNvPr>
+          <p:cNvSpPr>
+            <a:spLocks noGrp="1"/>
+          </p:cNvSpPr>
+          <p:nvPr>
+            <p:ph idx="1"/>
+          </p:nvPr>
+        </p:nvSpPr>
+        <p:spPr>
+          <a:xfrm>
+            <a:off x="838200" y="1825625"/>
+            <a:ext cx="10515600" cy="4351338"/>
+          </a:xfrm>
+        </p:spPr>
+        <p:txBody>
+          <a:bodyPr/>
+          <a:lstStyle/>
+          <a:p>
+            <a:r>
+              <a:rPr lang="en-US" dirty="0"/>
+              <a:t>#[interrupt] and #[exception] attributes</a:t>
+            </a:r>
+          </a:p>
+          <a:p>
+            <a:r>
+              <a:rPr lang="en-US" dirty="0"/>
+              <a:t>Board specific</a:t>
+            </a:r>
+          </a:p>
+          <a:p>
+            <a:endParaRPr lang="en-US" dirty="0"/>
+          </a:p>
+        </p:txBody>
+      </p:sp>
+      <p:pic>
+        <p:nvPicPr>
+          <p:cNvPr id="4" name="Picture 3">
+            <a:extLst>
+              <a:ext uri="{FF2B5EF4-FFF2-40B4-BE49-F238E27FC236}">
+                <a16:creationId xmlns:a16="http://schemas.microsoft.com/office/drawing/2014/main" id="{1C6D8DC5-3ED5-4175-BDE0-DCF94CD0BC5B}"/>
+              </a:ext>
+            </a:extLst>
+          </p:cNvPr>
+          <p:cNvPicPr>
+            <a:picLocks noChangeAspect="1"/>
+          </p:cNvPicPr>
+          <p:nvPr/>
+        </p:nvPicPr>
+        <p:blipFill>
+          <a:blip r:embed="rId2"/>
+          <a:stretch>
+            <a:fillRect/>
+          </a:stretch>
+        </p:blipFill>
+        <p:spPr>
+          <a:xfrm>
+            <a:off x="587883" y="4018384"/>
+            <a:ext cx="9284848" cy="2158579"/>
+          </a:xfrm>
+          <a:prstGeom prst="rect">
+            <a:avLst/>
+          </a:prstGeom>
+        </p:spPr>
+      </p:pic>
+    </p:spTree>
+    <p:extLst>
+      <p:ext uri="{BB962C8B-B14F-4D97-AF65-F5344CB8AC3E}">
+        <p14:creationId xmlns:p14="http://schemas.microsoft.com/office/powerpoint/2010/main" val="1487866357"/>
+      </p:ext>
+    </p:extLst>
+  </p:cSld>
+  <p:clrMapOvr>
+    <a:masterClrMapping/>
+  </p:clrMapOvr>
+</p:sld>
+</file>
+
+<file path=ppt/slides/slide13.xml><?xml version="1.0" encoding="utf-8"?>
+<p:sld xmlns:a="http://schemas.openxmlformats.org/drawingml/2006/main" xmlns:r="http://schemas.openxmlformats.org/officeDocument/2006/relationships" xmlns:p="http://schemas.openxmlformats.org/presentationml/2006/main">
+  <p:cSld>
+    <p:spTree>
+      <p:nvGrpSpPr>
+        <p:cNvPr id="1" name=""/>
+        <p:cNvGrpSpPr/>
+        <p:nvPr/>
+      </p:nvGrpSpPr>
+      <p:grpSpPr>
+        <a:xfrm>
+          <a:off x="0" y="0"/>
+          <a:ext cx="0" cy="0"/>
+          <a:chOff x="0" y="0"/>
+          <a:chExt cx="0" cy="0"/>
+        </a:xfrm>
+      </p:grpSpPr>
+      <p:sp>
+        <p:nvSpPr>
+          <p:cNvPr id="2" name="Title 1">
+            <a:extLst>
+              <a:ext uri="{FF2B5EF4-FFF2-40B4-BE49-F238E27FC236}">
+                <a16:creationId xmlns:a16="http://schemas.microsoft.com/office/drawing/2014/main" id="{21EA2F42-0EC9-4176-9B80-6C9B06BF29EE}"/>
+              </a:ext>
+            </a:extLst>
+          </p:cNvPr>
+          <p:cNvSpPr>
+            <a:spLocks noGrp="1"/>
+          </p:cNvSpPr>
+          <p:nvPr>
+            <p:ph type="title"/>
+          </p:nvPr>
+        </p:nvSpPr>
+        <p:spPr/>
+        <p:txBody>
+          <a:bodyPr/>
+          <a:lstStyle/>
+          <a:p>
+            <a:r>
+              <a:rPr lang="en-US" dirty="0"/>
+              <a:t>For C Developers</a:t>
+            </a:r>
+          </a:p>
+        </p:txBody>
+      </p:sp>
+      <p:sp>
+        <p:nvSpPr>
+          <p:cNvPr id="3" name="Content Placeholder 2">
+            <a:extLst>
+              <a:ext uri="{FF2B5EF4-FFF2-40B4-BE49-F238E27FC236}">
+                <a16:creationId xmlns:a16="http://schemas.microsoft.com/office/drawing/2014/main" id="{73A42E2E-B498-47E7-B86B-E75ABC347732}"/>
+              </a:ext>
+            </a:extLst>
+          </p:cNvPr>
+          <p:cNvSpPr>
+            <a:spLocks noGrp="1"/>
+          </p:cNvSpPr>
+          <p:nvPr>
+            <p:ph idx="1"/>
+          </p:nvPr>
+        </p:nvSpPr>
+        <p:spPr/>
+        <p:txBody>
+          <a:bodyPr/>
+          <a:lstStyle/>
+          <a:p>
+            <a:r>
+              <a:rPr lang="en-US" dirty="0"/>
+              <a:t>Use iterators where possible</a:t>
+            </a:r>
+          </a:p>
+          <a:p>
+            <a:pPr lvl="1"/>
+            <a:r>
+              <a:rPr lang="en-US" dirty="0"/>
+              <a:t>Every index is bounds checked, so performance is slower</a:t>
+            </a:r>
+          </a:p>
+          <a:p>
+            <a:r>
+              <a:rPr lang="en-US" dirty="0"/>
+              <a:t>Use references everywhere you can</a:t>
+            </a:r>
+          </a:p>
+          <a:p>
+            <a:pPr lvl="1"/>
+            <a:r>
+              <a:rPr lang="en-US" dirty="0"/>
+              <a:t>Pointers are considered unsafe</a:t>
+            </a:r>
+          </a:p>
+          <a:p>
+            <a:r>
+              <a:rPr lang="en-US" dirty="0"/>
+              <a:t>Instead of using `volatile` keyword use </a:t>
+            </a:r>
+            <a:r>
+              <a:rPr lang="en-US" dirty="0" err="1"/>
+              <a:t>read_volatile</a:t>
+            </a:r>
+            <a:r>
+              <a:rPr lang="en-US" dirty="0"/>
+              <a:t>() and </a:t>
+            </a:r>
+            <a:r>
+              <a:rPr lang="en-US" dirty="0" err="1"/>
+              <a:t>write_volatile</a:t>
+            </a:r>
+            <a:r>
+              <a:rPr lang="en-US" dirty="0"/>
+              <a:t> methods</a:t>
+            </a:r>
+          </a:p>
+          <a:p>
+            <a:endParaRPr lang="en-US" dirty="0"/>
+          </a:p>
+        </p:txBody>
+      </p:sp>
+    </p:spTree>
+    <p:extLst>
+      <p:ext uri="{BB962C8B-B14F-4D97-AF65-F5344CB8AC3E}">
+        <p14:creationId xmlns:p14="http://schemas.microsoft.com/office/powerpoint/2010/main" val="4230906842"/>
+      </p:ext>
+    </p:extLst>
+  </p:cSld>
+  <p:clrMapOvr>
+    <a:masterClrMapping/>
+  </p:clrMapOvr>
+</p:sld>
+</file>
+
+<file path=ppt/slides/slide14.xml><?xml version="1.0" encoding="utf-8"?>
+<p:sld xmlns:a="http://schemas.openxmlformats.org/drawingml/2006/main" xmlns:r="http://schemas.openxmlformats.org/officeDocument/2006/relationships" xmlns:p="http://schemas.openxmlformats.org/presentationml/2006/main">
+  <p:cSld>
+    <p:spTree>
+      <p:nvGrpSpPr>
+        <p:cNvPr id="1" name=""/>
+        <p:cNvGrpSpPr/>
+        <p:nvPr/>
+      </p:nvGrpSpPr>
+      <p:grpSpPr>
+        <a:xfrm>
+          <a:off x="0" y="0"/>
+          <a:ext cx="0" cy="0"/>
+          <a:chOff x="0" y="0"/>
+          <a:chExt cx="0" cy="0"/>
+        </a:xfrm>
+      </p:grpSpPr>
+      <p:sp>
+        <p:nvSpPr>
+          <p:cNvPr id="2" name="Title 1">
+            <a:extLst>
+              <a:ext uri="{FF2B5EF4-FFF2-40B4-BE49-F238E27FC236}">
+                <a16:creationId xmlns:a16="http://schemas.microsoft.com/office/drawing/2014/main" id="{DAF30E42-102B-47DF-BF49-D7600649EF85}"/>
+              </a:ext>
+            </a:extLst>
+          </p:cNvPr>
+          <p:cNvSpPr>
+            <a:spLocks noGrp="1"/>
+          </p:cNvSpPr>
+          <p:nvPr>
+            <p:ph type="title"/>
+          </p:nvPr>
+        </p:nvSpPr>
+        <p:spPr/>
+        <p:txBody>
+          <a:bodyPr/>
+          <a:lstStyle/>
+          <a:p>
+            <a:r>
+              <a:rPr lang="en-US" dirty="0"/>
+              <a:t>Using C Code</a:t>
+            </a:r>
+          </a:p>
+        </p:txBody>
+      </p:sp>
+      <p:sp>
+        <p:nvSpPr>
+          <p:cNvPr id="3" name="Content Placeholder 2">
+            <a:extLst>
+              <a:ext uri="{FF2B5EF4-FFF2-40B4-BE49-F238E27FC236}">
+                <a16:creationId xmlns:a16="http://schemas.microsoft.com/office/drawing/2014/main" id="{50A85FA4-CDD8-4D93-ADA4-DEB464F575C3}"/>
+              </a:ext>
+            </a:extLst>
+          </p:cNvPr>
+          <p:cNvSpPr>
+            <a:spLocks noGrp="1"/>
+          </p:cNvSpPr>
+          <p:nvPr>
+            <p:ph idx="1"/>
+          </p:nvPr>
+        </p:nvSpPr>
+        <p:spPr/>
+        <p:txBody>
+          <a:bodyPr/>
+          <a:lstStyle/>
+          <a:p>
+            <a:r>
+              <a:rPr lang="en-US" dirty="0"/>
+              <a:t>Can reference C code through Rust</a:t>
+            </a:r>
+          </a:p>
+          <a:p>
+            <a:r>
+              <a:rPr lang="en-US" dirty="0"/>
+              <a:t>Setup the interface manually or use `</a:t>
+            </a:r>
+            <a:r>
+              <a:rPr lang="en-US" dirty="0" err="1"/>
+              <a:t>bindgen</a:t>
+            </a:r>
+            <a:r>
+              <a:rPr lang="en-US" dirty="0"/>
+              <a:t>` tool to generate </a:t>
+            </a:r>
+          </a:p>
+        </p:txBody>
+      </p:sp>
+      <p:pic>
+        <p:nvPicPr>
+          <p:cNvPr id="4" name="Picture 3">
+            <a:extLst>
+              <a:ext uri="{FF2B5EF4-FFF2-40B4-BE49-F238E27FC236}">
+                <a16:creationId xmlns:a16="http://schemas.microsoft.com/office/drawing/2014/main" id="{B197513E-CDEC-4766-91F7-EF896F0F7BFC}"/>
+              </a:ext>
+            </a:extLst>
+          </p:cNvPr>
+          <p:cNvPicPr>
+            <a:picLocks noChangeAspect="1"/>
+          </p:cNvPicPr>
+          <p:nvPr/>
+        </p:nvPicPr>
+        <p:blipFill>
+          <a:blip r:embed="rId2"/>
+          <a:stretch>
+            <a:fillRect/>
+          </a:stretch>
+        </p:blipFill>
+        <p:spPr>
+          <a:xfrm>
+            <a:off x="838200" y="3036620"/>
+            <a:ext cx="4710404" cy="3501977"/>
+          </a:xfrm>
+          <a:prstGeom prst="rect">
+            <a:avLst/>
+          </a:prstGeom>
+        </p:spPr>
+      </p:pic>
+    </p:spTree>
+    <p:extLst>
+      <p:ext uri="{BB962C8B-B14F-4D97-AF65-F5344CB8AC3E}">
+        <p14:creationId xmlns:p14="http://schemas.microsoft.com/office/powerpoint/2010/main" val="3802623911"/>
+      </p:ext>
+    </p:extLst>
+  </p:cSld>
+  <p:clrMapOvr>
+    <a:masterClrMapping/>
+  </p:clrMapOvr>
+</p:sld>
+</file>
+
+<file path=ppt/slides/slide15.xml><?xml version="1.0" encoding="utf-8"?>
+<p:sld xmlns:a="http://schemas.openxmlformats.org/drawingml/2006/main" xmlns:r="http://schemas.openxmlformats.org/officeDocument/2006/relationships" xmlns:p="http://schemas.openxmlformats.org/presentationml/2006/main">
+  <p:cSld>
+    <p:spTree>
+      <p:nvGrpSpPr>
+        <p:cNvPr id="1" name=""/>
+        <p:cNvGrpSpPr/>
+        <p:nvPr/>
+      </p:nvGrpSpPr>
+      <p:grpSpPr>
+        <a:xfrm>
+          <a:off x="0" y="0"/>
+          <a:ext cx="0" cy="0"/>
+          <a:chOff x="0" y="0"/>
+          <a:chExt cx="0" cy="0"/>
+        </a:xfrm>
+      </p:grpSpPr>
+      <p:sp>
+        <p:nvSpPr>
+          <p:cNvPr id="2" name="Title 1">
+            <a:extLst>
+              <a:ext uri="{FF2B5EF4-FFF2-40B4-BE49-F238E27FC236}">
+                <a16:creationId xmlns:a16="http://schemas.microsoft.com/office/drawing/2014/main" id="{49900D82-A889-411B-98D6-61B26E45BA23}"/>
+              </a:ext>
+            </a:extLst>
+          </p:cNvPr>
+          <p:cNvSpPr>
+            <a:spLocks noGrp="1"/>
+          </p:cNvSpPr>
+          <p:nvPr>
+            <p:ph type="title"/>
+          </p:nvPr>
+        </p:nvSpPr>
+        <p:spPr/>
+        <p:txBody>
+          <a:bodyPr/>
+          <a:lstStyle/>
+          <a:p>
+            <a:r>
+              <a:rPr lang="en-US" dirty="0"/>
+              <a:t>Unit Testing</a:t>
+            </a:r>
+          </a:p>
+        </p:txBody>
+      </p:sp>
+      <p:sp>
+        <p:nvSpPr>
+          <p:cNvPr id="3" name="Content Placeholder 2">
+            <a:extLst>
+              <a:ext uri="{FF2B5EF4-FFF2-40B4-BE49-F238E27FC236}">
+                <a16:creationId xmlns:a16="http://schemas.microsoft.com/office/drawing/2014/main" id="{8B918F0D-4C59-434C-B630-957EC324CD8C}"/>
+              </a:ext>
+            </a:extLst>
+          </p:cNvPr>
+          <p:cNvSpPr>
+            <a:spLocks noGrp="1"/>
+          </p:cNvSpPr>
+          <p:nvPr>
+            <p:ph idx="1"/>
+          </p:nvPr>
+        </p:nvSpPr>
+        <p:spPr/>
+        <p:txBody>
+          <a:bodyPr/>
+          <a:lstStyle/>
+          <a:p>
+            <a:endParaRPr lang="en-US"/>
+          </a:p>
+        </p:txBody>
+      </p:sp>
+    </p:spTree>
+    <p:extLst>
+      <p:ext uri="{BB962C8B-B14F-4D97-AF65-F5344CB8AC3E}">
+        <p14:creationId xmlns:p14="http://schemas.microsoft.com/office/powerpoint/2010/main" val="1909587117"/>
+      </p:ext>
+    </p:extLst>
+  </p:cSld>
+  <p:clrMapOvr>
+    <a:masterClrMapping/>
+  </p:clrMapOvr>
+</p:sld>
+</file>
+
+<file path=ppt/slides/slide16.xml><?xml version="1.0" encoding="utf-8"?>
+<p:sld xmlns:a="http://schemas.openxmlformats.org/drawingml/2006/main" xmlns:r="http://schemas.openxmlformats.org/officeDocument/2006/relationships" xmlns:p="http://schemas.openxmlformats.org/presentationml/2006/main">
+  <p:cSld>
+    <p:spTree>
+      <p:nvGrpSpPr>
+        <p:cNvPr id="1" name=""/>
+        <p:cNvGrpSpPr/>
+        <p:nvPr/>
+      </p:nvGrpSpPr>
+      <p:grpSpPr>
+        <a:xfrm>
+          <a:off x="0" y="0"/>
+          <a:ext cx="0" cy="0"/>
+          <a:chOff x="0" y="0"/>
+          <a:chExt cx="0" cy="0"/>
+        </a:xfrm>
+      </p:grpSpPr>
+      <p:sp>
+        <p:nvSpPr>
+          <p:cNvPr id="2" name="Title 1">
+            <a:extLst>
+              <a:ext uri="{FF2B5EF4-FFF2-40B4-BE49-F238E27FC236}">
+                <a16:creationId xmlns:a16="http://schemas.microsoft.com/office/drawing/2014/main" id="{B8C25872-1BED-49CF-BBD1-CBE92C5416B5}"/>
+              </a:ext>
+            </a:extLst>
+          </p:cNvPr>
+          <p:cNvSpPr>
+            <a:spLocks noGrp="1"/>
+          </p:cNvSpPr>
+          <p:nvPr>
+            <p:ph type="title"/>
+          </p:nvPr>
+        </p:nvSpPr>
+        <p:spPr/>
+        <p:txBody>
+          <a:bodyPr/>
+          <a:lstStyle/>
+          <a:p>
+            <a:endParaRPr lang="en-US"/>
+          </a:p>
+        </p:txBody>
+      </p:sp>
+      <p:sp>
+        <p:nvSpPr>
+          <p:cNvPr id="3" name="Content Placeholder 2">
+            <a:extLst>
+              <a:ext uri="{FF2B5EF4-FFF2-40B4-BE49-F238E27FC236}">
+                <a16:creationId xmlns:a16="http://schemas.microsoft.com/office/drawing/2014/main" id="{D649A98E-9ED7-4639-BAA9-EB265C55BBB6}"/>
+              </a:ext>
+            </a:extLst>
+          </p:cNvPr>
+          <p:cNvSpPr>
+            <a:spLocks noGrp="1"/>
+          </p:cNvSpPr>
+          <p:nvPr>
+            <p:ph idx="1"/>
+          </p:nvPr>
+        </p:nvSpPr>
+        <p:spPr/>
+        <p:txBody>
+          <a:bodyPr/>
+          <a:lstStyle/>
+          <a:p>
+            <a:endParaRPr lang="en-US"/>
+          </a:p>
+        </p:txBody>
+      </p:sp>
+    </p:spTree>
+    <p:extLst>
+      <p:ext uri="{BB962C8B-B14F-4D97-AF65-F5344CB8AC3E}">
+        <p14:creationId xmlns:p14="http://schemas.microsoft.com/office/powerpoint/2010/main" val="1482016117"/>
+      </p:ext>
+    </p:extLst>
+  </p:cSld>
+  <p:clrMapOvr>
+    <a:masterClrMapping/>
+  </p:clrMapOvr>
+</p:sld>
+</file>
+
 <file path=ppt/slides/slide2.xml><?xml version="1.0" encoding="utf-8"?>
 <p:sld xmlns:a="http://schemas.openxmlformats.org/drawingml/2006/main" xmlns:r="http://schemas.openxmlformats.org/officeDocument/2006/relationships" xmlns:p="http://schemas.openxmlformats.org/presentationml/2006/main">
   <p:cSld>
@@ -3465,8 +4725,12 @@
           <a:lstStyle/>
           <a:p>
             <a:r>
-              <a:rPr lang="en-US" dirty="0"/>
-              <a:t>Styles of IoT Devices</a:t>
+              <a:rPr lang="en-US"/>
+              <a:t>Levels of </a:t>
+            </a:r>
+            <a:r>
+              <a:rPr lang="en-US" dirty="0"/>
+              <a:t>IoT Devices</a:t>
             </a:r>
           </a:p>
         </p:txBody>
@@ -3934,7 +5198,7 @@
             <a:pPr lvl="1"/>
             <a:r>
               <a:rPr lang="en-US" dirty="0"/>
-              <a:t>16 MHz Quad-Core 8-bit CPU</a:t>
+              <a:t>16 MHz Single-Core 8-bit CPU</a:t>
             </a:r>
           </a:p>
           <a:p>
@@ -4000,6 +5264,266 @@
           </a:p>
         </p:txBody>
       </p:sp>
+      <p:pic>
+        <p:nvPicPr>
+          <p:cNvPr id="1026" name="Picture 2">
+            <a:extLst>
+              <a:ext uri="{FF2B5EF4-FFF2-40B4-BE49-F238E27FC236}">
+                <a16:creationId xmlns:a16="http://schemas.microsoft.com/office/drawing/2014/main" id="{A7C056C1-F9E3-4513-B424-C31B5E14D87E}"/>
+              </a:ext>
+            </a:extLst>
+          </p:cNvPr>
+          <p:cNvPicPr>
+            <a:picLocks noChangeAspect="1" noChangeArrowheads="1"/>
+          </p:cNvPicPr>
+          <p:nvPr/>
+        </p:nvPicPr>
+        <p:blipFill>
+          <a:blip r:embed="rId2">
+            <a:extLst>
+              <a:ext uri="{28A0092B-C50C-407E-A947-70E740481C1C}">
+                <a14:useLocalDpi xmlns:a14="http://schemas.microsoft.com/office/drawing/2010/main" val="0"/>
+              </a:ext>
+            </a:extLst>
+          </a:blip>
+          <a:srcRect/>
+          <a:stretch>
+            <a:fillRect/>
+          </a:stretch>
+        </p:blipFill>
+        <p:spPr bwMode="auto">
+          <a:xfrm>
+            <a:off x="6817570" y="1588496"/>
+            <a:ext cx="4779223" cy="3166235"/>
+          </a:xfrm>
+          <a:prstGeom prst="rect">
+            <a:avLst/>
+          </a:prstGeom>
+          <a:noFill/>
+          <a:extLst>
+            <a:ext uri="{909E8E84-426E-40DD-AFC4-6F175D3DCCD1}">
+              <a14:hiddenFill xmlns:a14="http://schemas.microsoft.com/office/drawing/2010/main">
+                <a:solidFill>
+                  <a:srgbClr val="FFFFFF"/>
+                </a:solidFill>
+              </a14:hiddenFill>
+            </a:ext>
+          </a:extLst>
+        </p:spPr>
+      </p:pic>
+      <p:sp>
+        <p:nvSpPr>
+          <p:cNvPr id="8" name="Content Placeholder 2">
+            <a:extLst>
+              <a:ext uri="{FF2B5EF4-FFF2-40B4-BE49-F238E27FC236}">
+                <a16:creationId xmlns:a16="http://schemas.microsoft.com/office/drawing/2014/main" id="{3BCBAC2A-D8FA-4FD6-A47E-06BA18456944}"/>
+              </a:ext>
+            </a:extLst>
+          </p:cNvPr>
+          <p:cNvSpPr txBox="1">
+            <a:spLocks/>
+          </p:cNvSpPr>
+          <p:nvPr/>
+        </p:nvSpPr>
+        <p:spPr>
+          <a:xfrm>
+            <a:off x="6817566" y="4845007"/>
+            <a:ext cx="4536234" cy="1402767"/>
+          </a:xfrm>
+          <a:prstGeom prst="rect">
+            <a:avLst/>
+          </a:prstGeom>
+        </p:spPr>
+        <p:txBody>
+          <a:bodyPr vert="horz" lIns="91440" tIns="45720" rIns="91440" bIns="45720" rtlCol="0">
+            <a:normAutofit fontScale="92500"/>
+          </a:bodyPr>
+          <a:lstStyle>
+            <a:lvl1pPr marL="228600" indent="-228600" algn="l" defTabSz="914400" rtl="0" eaLnBrk="1" latinLnBrk="0" hangingPunct="1">
+              <a:lnSpc>
+                <a:spcPct val="90000"/>
+              </a:lnSpc>
+              <a:spcBef>
+                <a:spcPts val="1000"/>
+              </a:spcBef>
+              <a:buFont typeface="Arial" panose="020B0604020202020204" pitchFamily="34" charset="0"/>
+              <a:buChar char="•"/>
+              <a:defRPr sz="2800" kern="1200">
+                <a:solidFill>
+                  <a:schemeClr val="tx1"/>
+                </a:solidFill>
+                <a:latin typeface="+mn-lt"/>
+                <a:ea typeface="+mn-ea"/>
+                <a:cs typeface="+mn-cs"/>
+              </a:defRPr>
+            </a:lvl1pPr>
+            <a:lvl2pPr marL="685800" indent="-228600" algn="l" defTabSz="914400" rtl="0" eaLnBrk="1" latinLnBrk="0" hangingPunct="1">
+              <a:lnSpc>
+                <a:spcPct val="90000"/>
+              </a:lnSpc>
+              <a:spcBef>
+                <a:spcPts val="500"/>
+              </a:spcBef>
+              <a:buFont typeface="Arial" panose="020B0604020202020204" pitchFamily="34" charset="0"/>
+              <a:buChar char="•"/>
+              <a:defRPr sz="2400" kern="1200">
+                <a:solidFill>
+                  <a:schemeClr val="tx1"/>
+                </a:solidFill>
+                <a:latin typeface="+mn-lt"/>
+                <a:ea typeface="+mn-ea"/>
+                <a:cs typeface="+mn-cs"/>
+              </a:defRPr>
+            </a:lvl2pPr>
+            <a:lvl3pPr marL="1143000" indent="-228600" algn="l" defTabSz="914400" rtl="0" eaLnBrk="1" latinLnBrk="0" hangingPunct="1">
+              <a:lnSpc>
+                <a:spcPct val="90000"/>
+              </a:lnSpc>
+              <a:spcBef>
+                <a:spcPts val="500"/>
+              </a:spcBef>
+              <a:buFont typeface="Arial" panose="020B0604020202020204" pitchFamily="34" charset="0"/>
+              <a:buChar char="•"/>
+              <a:defRPr sz="2000" kern="1200">
+                <a:solidFill>
+                  <a:schemeClr val="tx1"/>
+                </a:solidFill>
+                <a:latin typeface="+mn-lt"/>
+                <a:ea typeface="+mn-ea"/>
+                <a:cs typeface="+mn-cs"/>
+              </a:defRPr>
+            </a:lvl3pPr>
+            <a:lvl4pPr marL="1600200" indent="-228600" algn="l" defTabSz="914400" rtl="0" eaLnBrk="1" latinLnBrk="0" hangingPunct="1">
+              <a:lnSpc>
+                <a:spcPct val="90000"/>
+              </a:lnSpc>
+              <a:spcBef>
+                <a:spcPts val="500"/>
+              </a:spcBef>
+              <a:buFont typeface="Arial" panose="020B0604020202020204" pitchFamily="34" charset="0"/>
+              <a:buChar char="•"/>
+              <a:defRPr sz="1800" kern="1200">
+                <a:solidFill>
+                  <a:schemeClr val="tx1"/>
+                </a:solidFill>
+                <a:latin typeface="+mn-lt"/>
+                <a:ea typeface="+mn-ea"/>
+                <a:cs typeface="+mn-cs"/>
+              </a:defRPr>
+            </a:lvl4pPr>
+            <a:lvl5pPr marL="2057400" indent="-228600" algn="l" defTabSz="914400" rtl="0" eaLnBrk="1" latinLnBrk="0" hangingPunct="1">
+              <a:lnSpc>
+                <a:spcPct val="90000"/>
+              </a:lnSpc>
+              <a:spcBef>
+                <a:spcPts val="500"/>
+              </a:spcBef>
+              <a:buFont typeface="Arial" panose="020B0604020202020204" pitchFamily="34" charset="0"/>
+              <a:buChar char="•"/>
+              <a:defRPr sz="1800" kern="1200">
+                <a:solidFill>
+                  <a:schemeClr val="tx1"/>
+                </a:solidFill>
+                <a:latin typeface="+mn-lt"/>
+                <a:ea typeface="+mn-ea"/>
+                <a:cs typeface="+mn-cs"/>
+              </a:defRPr>
+            </a:lvl5pPr>
+            <a:lvl6pPr marL="2514600" indent="-228600" algn="l" defTabSz="914400" rtl="0" eaLnBrk="1" latinLnBrk="0" hangingPunct="1">
+              <a:lnSpc>
+                <a:spcPct val="90000"/>
+              </a:lnSpc>
+              <a:spcBef>
+                <a:spcPts val="500"/>
+              </a:spcBef>
+              <a:buFont typeface="Arial" panose="020B0604020202020204" pitchFamily="34" charset="0"/>
+              <a:buChar char="•"/>
+              <a:defRPr sz="1800" kern="1200">
+                <a:solidFill>
+                  <a:schemeClr val="tx1"/>
+                </a:solidFill>
+                <a:latin typeface="+mn-lt"/>
+                <a:ea typeface="+mn-ea"/>
+                <a:cs typeface="+mn-cs"/>
+              </a:defRPr>
+            </a:lvl6pPr>
+            <a:lvl7pPr marL="2971800" indent="-228600" algn="l" defTabSz="914400" rtl="0" eaLnBrk="1" latinLnBrk="0" hangingPunct="1">
+              <a:lnSpc>
+                <a:spcPct val="90000"/>
+              </a:lnSpc>
+              <a:spcBef>
+                <a:spcPts val="500"/>
+              </a:spcBef>
+              <a:buFont typeface="Arial" panose="020B0604020202020204" pitchFamily="34" charset="0"/>
+              <a:buChar char="•"/>
+              <a:defRPr sz="1800" kern="1200">
+                <a:solidFill>
+                  <a:schemeClr val="tx1"/>
+                </a:solidFill>
+                <a:latin typeface="+mn-lt"/>
+                <a:ea typeface="+mn-ea"/>
+                <a:cs typeface="+mn-cs"/>
+              </a:defRPr>
+            </a:lvl7pPr>
+            <a:lvl8pPr marL="3429000" indent="-228600" algn="l" defTabSz="914400" rtl="0" eaLnBrk="1" latinLnBrk="0" hangingPunct="1">
+              <a:lnSpc>
+                <a:spcPct val="90000"/>
+              </a:lnSpc>
+              <a:spcBef>
+                <a:spcPts val="500"/>
+              </a:spcBef>
+              <a:buFont typeface="Arial" panose="020B0604020202020204" pitchFamily="34" charset="0"/>
+              <a:buChar char="•"/>
+              <a:defRPr sz="1800" kern="1200">
+                <a:solidFill>
+                  <a:schemeClr val="tx1"/>
+                </a:solidFill>
+                <a:latin typeface="+mn-lt"/>
+                <a:ea typeface="+mn-ea"/>
+                <a:cs typeface="+mn-cs"/>
+              </a:defRPr>
+            </a:lvl8pPr>
+            <a:lvl9pPr marL="3886200" indent="-228600" algn="l" defTabSz="914400" rtl="0" eaLnBrk="1" latinLnBrk="0" hangingPunct="1">
+              <a:lnSpc>
+                <a:spcPct val="90000"/>
+              </a:lnSpc>
+              <a:spcBef>
+                <a:spcPts val="500"/>
+              </a:spcBef>
+              <a:buFont typeface="Arial" panose="020B0604020202020204" pitchFamily="34" charset="0"/>
+              <a:buChar char="•"/>
+              <a:defRPr sz="1800" kern="1200">
+                <a:solidFill>
+                  <a:schemeClr val="tx1"/>
+                </a:solidFill>
+                <a:latin typeface="+mn-lt"/>
+                <a:ea typeface="+mn-ea"/>
+                <a:cs typeface="+mn-cs"/>
+              </a:defRPr>
+            </a:lvl9pPr>
+          </a:lstStyle>
+          <a:p>
+            <a:r>
+              <a:rPr lang="en-US" dirty="0"/>
+              <a:t>STM32F303VC</a:t>
+            </a:r>
+          </a:p>
+          <a:p>
+            <a:pPr lvl="1"/>
+            <a:r>
+              <a:rPr lang="en-US" dirty="0"/>
+              <a:t>72 MHz Single-Core 32-bit CPU</a:t>
+            </a:r>
+          </a:p>
+          <a:p>
+            <a:pPr lvl="1"/>
+            <a:r>
+              <a:rPr lang="en-US" dirty="0"/>
+              <a:t>40 KB SRAM</a:t>
+            </a:r>
+          </a:p>
+        </p:txBody>
+      </p:sp>
     </p:spTree>
     <p:extLst>
       <p:ext uri="{BB962C8B-B14F-4D97-AF65-F5344CB8AC3E}">
@@ -4010,6 +5534,257 @@
   <p:clrMapOvr>
     <a:masterClrMapping/>
   </p:clrMapOvr>
+  <p:timing>
+    <p:tnLst>
+      <p:par>
+        <p:cTn id="1" dur="indefinite" restart="never" nodeType="tmRoot">
+          <p:childTnLst>
+            <p:seq concurrent="1" nextAc="seek">
+              <p:cTn id="2" dur="indefinite" nodeType="mainSeq">
+                <p:childTnLst>
+                  <p:par>
+                    <p:cTn id="3" fill="hold">
+                      <p:stCondLst>
+                        <p:cond delay="indefinite"/>
+                      </p:stCondLst>
+                      <p:childTnLst>
+                        <p:par>
+                          <p:cTn id="4" fill="hold">
+                            <p:stCondLst>
+                              <p:cond delay="0"/>
+                            </p:stCondLst>
+                            <p:childTnLst>
+                              <p:par>
+                                <p:cTn id="5" presetID="10" presetClass="entr" presetSubtype="0" fill="hold" grpId="0" nodeType="clickEffect">
+                                  <p:stCondLst>
+                                    <p:cond delay="0"/>
+                                  </p:stCondLst>
+                                  <p:childTnLst>
+                                    <p:set>
+                                      <p:cBhvr>
+                                        <p:cTn id="6" dur="1" fill="hold">
+                                          <p:stCondLst>
+                                            <p:cond delay="0"/>
+                                          </p:stCondLst>
+                                        </p:cTn>
+                                        <p:tgtEl>
+                                          <p:spTgt spid="7"/>
+                                        </p:tgtEl>
+                                        <p:attrNameLst>
+                                          <p:attrName>style.visibility</p:attrName>
+                                        </p:attrNameLst>
+                                      </p:cBhvr>
+                                      <p:to>
+                                        <p:strVal val="visible"/>
+                                      </p:to>
+                                    </p:set>
+                                    <p:animEffect transition="in" filter="fade">
+                                      <p:cBhvr>
+                                        <p:cTn id="7" dur="500"/>
+                                        <p:tgtEl>
+                                          <p:spTgt spid="7"/>
+                                        </p:tgtEl>
+                                      </p:cBhvr>
+                                    </p:animEffect>
+                                  </p:childTnLst>
+                                </p:cTn>
+                              </p:par>
+                            </p:childTnLst>
+                          </p:cTn>
+                        </p:par>
+                      </p:childTnLst>
+                    </p:cTn>
+                  </p:par>
+                  <p:par>
+                    <p:cTn id="8" fill="hold">
+                      <p:stCondLst>
+                        <p:cond delay="indefinite"/>
+                      </p:stCondLst>
+                      <p:childTnLst>
+                        <p:par>
+                          <p:cTn id="9" fill="hold">
+                            <p:stCondLst>
+                              <p:cond delay="0"/>
+                            </p:stCondLst>
+                            <p:childTnLst>
+                              <p:par>
+                                <p:cTn id="10" presetID="2" presetClass="entr" presetSubtype="4" fill="hold" grpId="0" nodeType="clickEffect">
+                                  <p:stCondLst>
+                                    <p:cond delay="0"/>
+                                  </p:stCondLst>
+                                  <p:childTnLst>
+                                    <p:set>
+                                      <p:cBhvr>
+                                        <p:cTn id="11" dur="1" fill="hold">
+                                          <p:stCondLst>
+                                            <p:cond delay="0"/>
+                                          </p:stCondLst>
+                                        </p:cTn>
+                                        <p:tgtEl>
+                                          <p:spTgt spid="8"/>
+                                        </p:tgtEl>
+                                        <p:attrNameLst>
+                                          <p:attrName>style.visibility</p:attrName>
+                                        </p:attrNameLst>
+                                      </p:cBhvr>
+                                      <p:to>
+                                        <p:strVal val="visible"/>
+                                      </p:to>
+                                    </p:set>
+                                    <p:anim calcmode="lin" valueType="num">
+                                      <p:cBhvr additive="base">
+                                        <p:cTn id="12" dur="500" fill="hold"/>
+                                        <p:tgtEl>
+                                          <p:spTgt spid="8"/>
+                                        </p:tgtEl>
+                                        <p:attrNameLst>
+                                          <p:attrName>ppt_x</p:attrName>
+                                        </p:attrNameLst>
+                                      </p:cBhvr>
+                                      <p:tavLst>
+                                        <p:tav tm="0">
+                                          <p:val>
+                                            <p:strVal val="#ppt_x"/>
+                                          </p:val>
+                                        </p:tav>
+                                        <p:tav tm="100000">
+                                          <p:val>
+                                            <p:strVal val="#ppt_x"/>
+                                          </p:val>
+                                        </p:tav>
+                                      </p:tavLst>
+                                    </p:anim>
+                                    <p:anim calcmode="lin" valueType="num">
+                                      <p:cBhvr additive="base">
+                                        <p:cTn id="13" dur="500" fill="hold"/>
+                                        <p:tgtEl>
+                                          <p:spTgt spid="8"/>
+                                        </p:tgtEl>
+                                        <p:attrNameLst>
+                                          <p:attrName>ppt_y</p:attrName>
+                                        </p:attrNameLst>
+                                      </p:cBhvr>
+                                      <p:tavLst>
+                                        <p:tav tm="0">
+                                          <p:val>
+                                            <p:strVal val="1+#ppt_h/2"/>
+                                          </p:val>
+                                        </p:tav>
+                                        <p:tav tm="100000">
+                                          <p:val>
+                                            <p:strVal val="#ppt_y"/>
+                                          </p:val>
+                                        </p:tav>
+                                      </p:tavLst>
+                                    </p:anim>
+                                  </p:childTnLst>
+                                </p:cTn>
+                              </p:par>
+                              <p:par>
+                                <p:cTn id="14" presetID="2" presetClass="entr" presetSubtype="4" fill="hold" nodeType="withEffect">
+                                  <p:stCondLst>
+                                    <p:cond delay="0"/>
+                                  </p:stCondLst>
+                                  <p:childTnLst>
+                                    <p:set>
+                                      <p:cBhvr>
+                                        <p:cTn id="15" dur="1" fill="hold">
+                                          <p:stCondLst>
+                                            <p:cond delay="0"/>
+                                          </p:stCondLst>
+                                        </p:cTn>
+                                        <p:tgtEl>
+                                          <p:spTgt spid="1026"/>
+                                        </p:tgtEl>
+                                        <p:attrNameLst>
+                                          <p:attrName>style.visibility</p:attrName>
+                                        </p:attrNameLst>
+                                      </p:cBhvr>
+                                      <p:to>
+                                        <p:strVal val="visible"/>
+                                      </p:to>
+                                    </p:set>
+                                    <p:anim calcmode="lin" valueType="num">
+                                      <p:cBhvr additive="base">
+                                        <p:cTn id="16" dur="500" fill="hold"/>
+                                        <p:tgtEl>
+                                          <p:spTgt spid="1026"/>
+                                        </p:tgtEl>
+                                        <p:attrNameLst>
+                                          <p:attrName>ppt_x</p:attrName>
+                                        </p:attrNameLst>
+                                      </p:cBhvr>
+                                      <p:tavLst>
+                                        <p:tav tm="0">
+                                          <p:val>
+                                            <p:strVal val="#ppt_x"/>
+                                          </p:val>
+                                        </p:tav>
+                                        <p:tav tm="100000">
+                                          <p:val>
+                                            <p:strVal val="#ppt_x"/>
+                                          </p:val>
+                                        </p:tav>
+                                      </p:tavLst>
+                                    </p:anim>
+                                    <p:anim calcmode="lin" valueType="num">
+                                      <p:cBhvr additive="base">
+                                        <p:cTn id="17" dur="500" fill="hold"/>
+                                        <p:tgtEl>
+                                          <p:spTgt spid="1026"/>
+                                        </p:tgtEl>
+                                        <p:attrNameLst>
+                                          <p:attrName>ppt_y</p:attrName>
+                                        </p:attrNameLst>
+                                      </p:cBhvr>
+                                      <p:tavLst>
+                                        <p:tav tm="0">
+                                          <p:val>
+                                            <p:strVal val="1+#ppt_h/2"/>
+                                          </p:val>
+                                        </p:tav>
+                                        <p:tav tm="100000">
+                                          <p:val>
+                                            <p:strVal val="#ppt_y"/>
+                                          </p:val>
+                                        </p:tav>
+                                      </p:tavLst>
+                                    </p:anim>
+                                  </p:childTnLst>
+                                </p:cTn>
+                              </p:par>
+                            </p:childTnLst>
+                          </p:cTn>
+                        </p:par>
+                      </p:childTnLst>
+                    </p:cTn>
+                  </p:par>
+                </p:childTnLst>
+              </p:cTn>
+              <p:prevCondLst>
+                <p:cond evt="onPrev" delay="0">
+                  <p:tgtEl>
+                    <p:sldTgt/>
+                  </p:tgtEl>
+                </p:cond>
+              </p:prevCondLst>
+              <p:nextCondLst>
+                <p:cond evt="onNext" delay="0">
+                  <p:tgtEl>
+                    <p:sldTgt/>
+                  </p:tgtEl>
+                </p:cond>
+              </p:nextCondLst>
+            </p:seq>
+          </p:childTnLst>
+        </p:cTn>
+      </p:par>
+    </p:tnLst>
+    <p:bldLst>
+      <p:bldP spid="7" grpId="0" animBg="1"/>
+      <p:bldP spid="8" grpId="0"/>
+    </p:bldLst>
+  </p:timing>
 </p:sld>
 </file>
 
@@ -4228,7 +6003,25 @@
           <a:p>
             <a:r>
               <a:rPr lang="en-US" dirty="0"/>
-              <a:t>C based language</a:t>
+              <a:t>C based syntax</a:t>
+            </a:r>
+          </a:p>
+          <a:p>
+            <a:r>
+              <a:rPr lang="en-US" dirty="0"/>
+              <a:t>Performance comparable to C++</a:t>
+            </a:r>
+          </a:p>
+          <a:p>
+            <a:r>
+              <a:rPr lang="en-US" dirty="0"/>
+              <a:t>Created by Mozilla</a:t>
+            </a:r>
+          </a:p>
+          <a:p>
+            <a:r>
+              <a:rPr lang="en-US" dirty="0"/>
+              <a:t>“Most loved programming language“ in Stack Overflow’s Developer Survey 2016-2019</a:t>
             </a:r>
           </a:p>
           <a:p>
@@ -4321,6 +6114,7 @@
             </a:r>
           </a:p>
           <a:p>
+            <a:pPr lvl="1"/>
             <a:r>
               <a:rPr lang="en-US" dirty="0"/>
               <a:t>Good Docs</a:t>
@@ -4331,6 +6125,15 @@
               <a:rPr lang="en-US" dirty="0"/>
               <a:t>Memory Safety</a:t>
             </a:r>
+          </a:p>
+          <a:p>
+            <a:r>
+              <a:rPr lang="en-US" dirty="0"/>
+              <a:t>Performance</a:t>
+            </a:r>
+          </a:p>
+          <a:p>
+            <a:endParaRPr lang="en-US" dirty="0"/>
           </a:p>
         </p:txBody>
       </p:sp>
@@ -4447,6 +6250,374 @@
     <p:extLst>
       <p:ext uri="{BB962C8B-B14F-4D97-AF65-F5344CB8AC3E}">
         <p14:creationId xmlns:p14="http://schemas.microsoft.com/office/powerpoint/2010/main" val="774428196"/>
+      </p:ext>
+    </p:extLst>
+  </p:cSld>
+  <p:clrMapOvr>
+    <a:masterClrMapping/>
+  </p:clrMapOvr>
+</p:sld>
+</file>
+
+<file path=ppt/slides/slide7.xml><?xml version="1.0" encoding="utf-8"?>
+<p:sld xmlns:a="http://schemas.openxmlformats.org/drawingml/2006/main" xmlns:r="http://schemas.openxmlformats.org/officeDocument/2006/relationships" xmlns:p="http://schemas.openxmlformats.org/presentationml/2006/main">
+  <p:cSld>
+    <p:spTree>
+      <p:nvGrpSpPr>
+        <p:cNvPr id="1" name=""/>
+        <p:cNvGrpSpPr/>
+        <p:nvPr/>
+      </p:nvGrpSpPr>
+      <p:grpSpPr>
+        <a:xfrm>
+          <a:off x="0" y="0"/>
+          <a:ext cx="0" cy="0"/>
+          <a:chOff x="0" y="0"/>
+          <a:chExt cx="0" cy="0"/>
+        </a:xfrm>
+      </p:grpSpPr>
+      <p:sp>
+        <p:nvSpPr>
+          <p:cNvPr id="2" name="Title 1">
+            <a:extLst>
+              <a:ext uri="{FF2B5EF4-FFF2-40B4-BE49-F238E27FC236}">
+                <a16:creationId xmlns:a16="http://schemas.microsoft.com/office/drawing/2014/main" id="{D9D1052D-B90E-4951-A48D-DA0E50370EF5}"/>
+              </a:ext>
+            </a:extLst>
+          </p:cNvPr>
+          <p:cNvSpPr>
+            <a:spLocks noGrp="1"/>
+          </p:cNvSpPr>
+          <p:nvPr>
+            <p:ph type="title"/>
+          </p:nvPr>
+        </p:nvSpPr>
+        <p:spPr/>
+        <p:txBody>
+          <a:bodyPr/>
+          <a:lstStyle/>
+          <a:p>
+            <a:r>
+              <a:rPr lang="en-US" dirty="0"/>
+              <a:t>Getting Started</a:t>
+            </a:r>
+          </a:p>
+        </p:txBody>
+      </p:sp>
+      <p:sp>
+        <p:nvSpPr>
+          <p:cNvPr id="3" name="Content Placeholder 2">
+            <a:extLst>
+              <a:ext uri="{FF2B5EF4-FFF2-40B4-BE49-F238E27FC236}">
+                <a16:creationId xmlns:a16="http://schemas.microsoft.com/office/drawing/2014/main" id="{341D4FB4-5A4C-4226-8499-E5C40648563E}"/>
+              </a:ext>
+            </a:extLst>
+          </p:cNvPr>
+          <p:cNvSpPr>
+            <a:spLocks noGrp="1"/>
+          </p:cNvSpPr>
+          <p:nvPr>
+            <p:ph idx="1"/>
+          </p:nvPr>
+        </p:nvSpPr>
+        <p:spPr/>
+        <p:txBody>
+          <a:bodyPr/>
+          <a:lstStyle/>
+          <a:p>
+            <a:r>
+              <a:rPr lang="en-US" dirty="0"/>
+              <a:t>Navigate to: </a:t>
+            </a:r>
+            <a:r>
+              <a:rPr lang="en-US" dirty="0">
+                <a:hlinkClick r:id="rId2"/>
+              </a:rPr>
+              <a:t>https://www.rust-lang.org/</a:t>
+            </a:r>
+            <a:endParaRPr lang="en-US" dirty="0"/>
+          </a:p>
+          <a:p>
+            <a:r>
+              <a:rPr lang="en-US" dirty="0"/>
+              <a:t>Follow Instructions to install</a:t>
+            </a:r>
+          </a:p>
+          <a:p>
+            <a:r>
+              <a:rPr lang="en-US" dirty="0"/>
+              <a:t>Use CLI: `cargo new </a:t>
+            </a:r>
+            <a:r>
+              <a:rPr lang="en-US" dirty="0" err="1"/>
+              <a:t>hello_world</a:t>
+            </a:r>
+            <a:r>
+              <a:rPr lang="en-US" dirty="0"/>
+              <a:t>`</a:t>
+            </a:r>
+          </a:p>
+          <a:p>
+            <a:r>
+              <a:rPr lang="en-US" dirty="0"/>
+              <a:t>Navigate to </a:t>
+            </a:r>
+            <a:r>
+              <a:rPr lang="en-US" dirty="0" err="1"/>
+              <a:t>hello_world</a:t>
+            </a:r>
+            <a:r>
+              <a:rPr lang="en-US" dirty="0"/>
+              <a:t> folder</a:t>
+            </a:r>
+          </a:p>
+          <a:p>
+            <a:r>
+              <a:rPr lang="en-US" dirty="0"/>
+              <a:t>Use CLI: `cargo run </a:t>
+            </a:r>
+            <a:r>
+              <a:rPr lang="en-US" dirty="0" err="1"/>
+              <a:t>hello_world</a:t>
+            </a:r>
+            <a:r>
+              <a:rPr lang="en-US" dirty="0"/>
+              <a:t>`</a:t>
+            </a:r>
+          </a:p>
+        </p:txBody>
+      </p:sp>
+    </p:spTree>
+    <p:extLst>
+      <p:ext uri="{BB962C8B-B14F-4D97-AF65-F5344CB8AC3E}">
+        <p14:creationId xmlns:p14="http://schemas.microsoft.com/office/powerpoint/2010/main" val="1163067433"/>
+      </p:ext>
+    </p:extLst>
+  </p:cSld>
+  <p:clrMapOvr>
+    <a:masterClrMapping/>
+  </p:clrMapOvr>
+</p:sld>
+</file>
+
+<file path=ppt/slides/slide8.xml><?xml version="1.0" encoding="utf-8"?>
+<p:sld xmlns:a="http://schemas.openxmlformats.org/drawingml/2006/main" xmlns:r="http://schemas.openxmlformats.org/officeDocument/2006/relationships" xmlns:p="http://schemas.openxmlformats.org/presentationml/2006/main">
+  <p:cSld>
+    <p:spTree>
+      <p:nvGrpSpPr>
+        <p:cNvPr id="1" name=""/>
+        <p:cNvGrpSpPr/>
+        <p:nvPr/>
+      </p:nvGrpSpPr>
+      <p:grpSpPr>
+        <a:xfrm>
+          <a:off x="0" y="0"/>
+          <a:ext cx="0" cy="0"/>
+          <a:chOff x="0" y="0"/>
+          <a:chExt cx="0" cy="0"/>
+        </a:xfrm>
+      </p:grpSpPr>
+      <p:sp>
+        <p:nvSpPr>
+          <p:cNvPr id="2" name="Title 1">
+            <a:extLst>
+              <a:ext uri="{FF2B5EF4-FFF2-40B4-BE49-F238E27FC236}">
+                <a16:creationId xmlns:a16="http://schemas.microsoft.com/office/drawing/2014/main" id="{03F2DE0A-72C0-4E6C-B546-2CE22D7D6660}"/>
+              </a:ext>
+            </a:extLst>
+          </p:cNvPr>
+          <p:cNvSpPr>
+            <a:spLocks noGrp="1"/>
+          </p:cNvSpPr>
+          <p:nvPr>
+            <p:ph type="title"/>
+          </p:nvPr>
+        </p:nvSpPr>
+        <p:spPr/>
+        <p:txBody>
+          <a:bodyPr/>
+          <a:lstStyle/>
+          <a:p>
+            <a:r>
+              <a:rPr lang="en-US" dirty="0"/>
+              <a:t>No Embedded “Standard Library”</a:t>
+            </a:r>
+          </a:p>
+        </p:txBody>
+      </p:sp>
+      <p:sp>
+        <p:nvSpPr>
+          <p:cNvPr id="3" name="Content Placeholder 2">
+            <a:extLst>
+              <a:ext uri="{FF2B5EF4-FFF2-40B4-BE49-F238E27FC236}">
+                <a16:creationId xmlns:a16="http://schemas.microsoft.com/office/drawing/2014/main" id="{574CC8C0-D171-4B9C-90C8-5F6F6852A72E}"/>
+              </a:ext>
+            </a:extLst>
+          </p:cNvPr>
+          <p:cNvSpPr>
+            <a:spLocks noGrp="1"/>
+          </p:cNvSpPr>
+          <p:nvPr>
+            <p:ph idx="1"/>
+          </p:nvPr>
+        </p:nvSpPr>
+        <p:spPr/>
+        <p:txBody>
+          <a:bodyPr/>
+          <a:lstStyle/>
+          <a:p>
+            <a:r>
+              <a:rPr lang="en-US" dirty="0"/>
+              <a:t>Embedded devices are small</a:t>
+            </a:r>
+          </a:p>
+          <a:p>
+            <a:r>
+              <a:rPr lang="en-US" dirty="0"/>
+              <a:t>Alternative: </a:t>
+            </a:r>
+            <a:r>
+              <a:rPr lang="en-US" dirty="0" err="1"/>
+              <a:t>no_std</a:t>
+            </a:r>
+            <a:endParaRPr lang="en-US" dirty="0"/>
+          </a:p>
+          <a:p>
+            <a:endParaRPr lang="en-US" dirty="0"/>
+          </a:p>
+        </p:txBody>
+      </p:sp>
+      <p:pic>
+        <p:nvPicPr>
+          <p:cNvPr id="6" name="Picture 5">
+            <a:extLst>
+              <a:ext uri="{FF2B5EF4-FFF2-40B4-BE49-F238E27FC236}">
+                <a16:creationId xmlns:a16="http://schemas.microsoft.com/office/drawing/2014/main" id="{73BD517B-A24C-4FEA-9437-CB98DD6DB41E}"/>
+              </a:ext>
+            </a:extLst>
+          </p:cNvPr>
+          <p:cNvPicPr>
+            <a:picLocks noChangeAspect="1"/>
+          </p:cNvPicPr>
+          <p:nvPr/>
+        </p:nvPicPr>
+        <p:blipFill>
+          <a:blip r:embed="rId2"/>
+          <a:stretch>
+            <a:fillRect/>
+          </a:stretch>
+        </p:blipFill>
+        <p:spPr>
+          <a:xfrm>
+            <a:off x="3862552" y="2701741"/>
+            <a:ext cx="7831893" cy="3934743"/>
+          </a:xfrm>
+          <a:prstGeom prst="rect">
+            <a:avLst/>
+          </a:prstGeom>
+        </p:spPr>
+      </p:pic>
+    </p:spTree>
+    <p:extLst>
+      <p:ext uri="{BB962C8B-B14F-4D97-AF65-F5344CB8AC3E}">
+        <p14:creationId xmlns:p14="http://schemas.microsoft.com/office/powerpoint/2010/main" val="2008116879"/>
+      </p:ext>
+    </p:extLst>
+  </p:cSld>
+  <p:clrMapOvr>
+    <a:masterClrMapping/>
+  </p:clrMapOvr>
+</p:sld>
+</file>
+
+<file path=ppt/slides/slide9.xml><?xml version="1.0" encoding="utf-8"?>
+<p:sld xmlns:a="http://schemas.openxmlformats.org/drawingml/2006/main" xmlns:r="http://schemas.openxmlformats.org/officeDocument/2006/relationships" xmlns:p="http://schemas.openxmlformats.org/presentationml/2006/main">
+  <p:cSld>
+    <p:spTree>
+      <p:nvGrpSpPr>
+        <p:cNvPr id="1" name=""/>
+        <p:cNvGrpSpPr/>
+        <p:nvPr/>
+      </p:nvGrpSpPr>
+      <p:grpSpPr>
+        <a:xfrm>
+          <a:off x="0" y="0"/>
+          <a:ext cx="0" cy="0"/>
+          <a:chOff x="0" y="0"/>
+          <a:chExt cx="0" cy="0"/>
+        </a:xfrm>
+      </p:grpSpPr>
+      <p:sp>
+        <p:nvSpPr>
+          <p:cNvPr id="2" name="Title 1">
+            <a:extLst>
+              <a:ext uri="{FF2B5EF4-FFF2-40B4-BE49-F238E27FC236}">
+                <a16:creationId xmlns:a16="http://schemas.microsoft.com/office/drawing/2014/main" id="{D0CF1325-4C51-4C8F-8423-8E2B25775CC5}"/>
+              </a:ext>
+            </a:extLst>
+          </p:cNvPr>
+          <p:cNvSpPr>
+            <a:spLocks noGrp="1"/>
+          </p:cNvSpPr>
+          <p:nvPr>
+            <p:ph type="title"/>
+          </p:nvPr>
+        </p:nvSpPr>
+        <p:spPr/>
+        <p:txBody>
+          <a:bodyPr/>
+          <a:lstStyle/>
+          <a:p>
+            <a:r>
+              <a:rPr lang="en-US" dirty="0"/>
+              <a:t>Cargo</a:t>
+            </a:r>
+          </a:p>
+        </p:txBody>
+      </p:sp>
+      <p:sp>
+        <p:nvSpPr>
+          <p:cNvPr id="3" name="Content Placeholder 2">
+            <a:extLst>
+              <a:ext uri="{FF2B5EF4-FFF2-40B4-BE49-F238E27FC236}">
+                <a16:creationId xmlns:a16="http://schemas.microsoft.com/office/drawing/2014/main" id="{63141C8E-60BE-449F-B6B1-1EA358A5B57D}"/>
+              </a:ext>
+            </a:extLst>
+          </p:cNvPr>
+          <p:cNvSpPr>
+            <a:spLocks noGrp="1"/>
+          </p:cNvSpPr>
+          <p:nvPr>
+            <p:ph idx="1"/>
+          </p:nvPr>
+        </p:nvSpPr>
+        <p:spPr/>
+        <p:txBody>
+          <a:bodyPr/>
+          <a:lstStyle/>
+          <a:p>
+            <a:r>
+              <a:rPr lang="en-US" dirty="0"/>
+              <a:t>Used for managing app stuff</a:t>
+            </a:r>
+          </a:p>
+          <a:p>
+            <a:r>
+              <a:rPr lang="en-US" dirty="0"/>
+              <a:t>Build/new/download package/</a:t>
+            </a:r>
+            <a:r>
+              <a:rPr lang="en-US" dirty="0" err="1"/>
+              <a:t>etc</a:t>
+            </a:r>
+            <a:endParaRPr lang="en-US" dirty="0"/>
+          </a:p>
+        </p:txBody>
+      </p:sp>
+    </p:spTree>
+    <p:extLst>
+      <p:ext uri="{BB962C8B-B14F-4D97-AF65-F5344CB8AC3E}">
+        <p14:creationId xmlns:p14="http://schemas.microsoft.com/office/powerpoint/2010/main" val="1063557504"/>
       </p:ext>
     </p:extLst>
   </p:cSld>
@@ -4749,4 +6920,299 @@
     </a:ext>
   </a:extLst>
 </a:theme>
+</file>
+
+<file path=ppt/theme/theme2.xml><?xml version="1.0" encoding="utf-8"?>
+<a:theme xmlns:a="http://schemas.openxmlformats.org/drawingml/2006/main" name="Office Theme">
+  <a:themeElements>
+    <a:clrScheme name="Office">
+      <a:dk1>
+        <a:sysClr val="windowText" lastClr="000000"/>
+      </a:dk1>
+      <a:lt1>
+        <a:sysClr val="window" lastClr="FFFFFF"/>
+      </a:lt1>
+      <a:dk2>
+        <a:srgbClr val="44546A"/>
+      </a:dk2>
+      <a:lt2>
+        <a:srgbClr val="E7E6E6"/>
+      </a:lt2>
+      <a:accent1>
+        <a:srgbClr val="4472C4"/>
+      </a:accent1>
+      <a:accent2>
+        <a:srgbClr val="ED7D31"/>
+      </a:accent2>
+      <a:accent3>
+        <a:srgbClr val="A5A5A5"/>
+      </a:accent3>
+      <a:accent4>
+        <a:srgbClr val="FFC000"/>
+      </a:accent4>
+      <a:accent5>
+        <a:srgbClr val="5B9BD5"/>
+      </a:accent5>
+      <a:accent6>
+        <a:srgbClr val="70AD47"/>
+      </a:accent6>
+      <a:hlink>
+        <a:srgbClr val="0563C1"/>
+      </a:hlink>
+      <a:folHlink>
+        <a:srgbClr val="954F72"/>
+      </a:folHlink>
+    </a:clrScheme>
+    <a:fontScheme name="Office">
+      <a:majorFont>
+        <a:latin typeface="Calibri Light" panose="020F0302020204030204"/>
+        <a:ea typeface=""/>
+        <a:cs typeface=""/>
+        <a:font script="Jpan" typeface="游ゴシック Light"/>
+        <a:font script="Hang" typeface="맑은 고딕"/>
+        <a:font script="Hans" typeface="等线 Light"/>
+        <a:font script="Hant" typeface="新細明體"/>
+        <a:font script="Arab" typeface="Times New Roman"/>
+        <a:font script="Hebr" typeface="Times New Roman"/>
+        <a:font script="Thai" typeface="Angsana New"/>
+        <a:font script="Ethi" typeface="Nyala"/>
+        <a:font script="Beng" typeface="Vrinda"/>
+        <a:font script="Gujr" typeface="Shruti"/>
+        <a:font script="Khmr" typeface="MoolBoran"/>
+        <a:font script="Knda" typeface="Tunga"/>
+        <a:font script="Guru" typeface="Raavi"/>
+        <a:font script="Cans" typeface="Euphemia"/>
+        <a:font script="Cher" typeface="Plantagenet Cherokee"/>
+        <a:font script="Yiii" typeface="Microsoft Yi Baiti"/>
+        <a:font script="Tibt" typeface="Microsoft Himalaya"/>
+        <a:font script="Thaa" typeface="MV Boli"/>
+        <a:font script="Deva" typeface="Mangal"/>
+        <a:font script="Telu" typeface="Gautami"/>
+        <a:font script="Taml" typeface="Latha"/>
+        <a:font script="Syrc" typeface="Estrangelo Edessa"/>
+        <a:font script="Orya" typeface="Kalinga"/>
+        <a:font script="Mlym" typeface="Kartika"/>
+        <a:font script="Laoo" typeface="DokChampa"/>
+        <a:font script="Sinh" typeface="Iskoola Pota"/>
+        <a:font script="Mong" typeface="Mongolian Baiti"/>
+        <a:font script="Viet" typeface="Times New Roman"/>
+        <a:font script="Uigh" typeface="Microsoft Uighur"/>
+        <a:font script="Geor" typeface="Sylfaen"/>
+        <a:font script="Armn" typeface="Arial"/>
+        <a:font script="Bugi" typeface="Leelawadee UI"/>
+        <a:font script="Bopo" typeface="Microsoft JhengHei"/>
+        <a:font script="Java" typeface="Javanese Text"/>
+        <a:font script="Lisu" typeface="Segoe UI"/>
+        <a:font script="Mymr" typeface="Myanmar Text"/>
+        <a:font script="Nkoo" typeface="Ebrima"/>
+        <a:font script="Olck" typeface="Nirmala UI"/>
+        <a:font script="Osma" typeface="Ebrima"/>
+        <a:font script="Phag" typeface="Phagspa"/>
+        <a:font script="Syrn" typeface="Estrangelo Edessa"/>
+        <a:font script="Syrj" typeface="Estrangelo Edessa"/>
+        <a:font script="Syre" typeface="Estrangelo Edessa"/>
+        <a:font script="Sora" typeface="Nirmala UI"/>
+        <a:font script="Tale" typeface="Microsoft Tai Le"/>
+        <a:font script="Talu" typeface="Microsoft New Tai Lue"/>
+        <a:font script="Tfng" typeface="Ebrima"/>
+      </a:majorFont>
+      <a:minorFont>
+        <a:latin typeface="Calibri" panose="020F0502020204030204"/>
+        <a:ea typeface=""/>
+        <a:cs typeface=""/>
+        <a:font script="Jpan" typeface="游ゴシック"/>
+        <a:font script="Hang" typeface="맑은 고딕"/>
+        <a:font script="Hans" typeface="等线"/>
+        <a:font script="Hant" typeface="新細明體"/>
+        <a:font script="Arab" typeface="Arial"/>
+        <a:font script="Hebr" typeface="Arial"/>
+        <a:font script="Thai" typeface="Cordia New"/>
+        <a:font script="Ethi" typeface="Nyala"/>
+        <a:font script="Beng" typeface="Vrinda"/>
+        <a:font script="Gujr" typeface="Shruti"/>
+        <a:font script="Khmr" typeface="DaunPenh"/>
+        <a:font script="Knda" typeface="Tunga"/>
+        <a:font script="Guru" typeface="Raavi"/>
+        <a:font script="Cans" typeface="Euphemia"/>
+        <a:font script="Cher" typeface="Plantagenet Cherokee"/>
+        <a:font script="Yiii" typeface="Microsoft Yi Baiti"/>
+        <a:font script="Tibt" typeface="Microsoft Himalaya"/>
+        <a:font script="Thaa" typeface="MV Boli"/>
+        <a:font script="Deva" typeface="Mangal"/>
+        <a:font script="Telu" typeface="Gautami"/>
+        <a:font script="Taml" typeface="Latha"/>
+        <a:font script="Syrc" typeface="Estrangelo Edessa"/>
+        <a:font script="Orya" typeface="Kalinga"/>
+        <a:font script="Mlym" typeface="Kartika"/>
+        <a:font script="Laoo" typeface="DokChampa"/>
+        <a:font script="Sinh" typeface="Iskoola Pota"/>
+        <a:font script="Mong" typeface="Mongolian Baiti"/>
+        <a:font script="Viet" typeface="Arial"/>
+        <a:font script="Uigh" typeface="Microsoft Uighur"/>
+        <a:font script="Geor" typeface="Sylfaen"/>
+        <a:font script="Armn" typeface="Arial"/>
+        <a:font script="Bugi" typeface="Leelawadee UI"/>
+        <a:font script="Bopo" typeface="Microsoft JhengHei"/>
+        <a:font script="Java" typeface="Javanese Text"/>
+        <a:font script="Lisu" typeface="Segoe UI"/>
+        <a:font script="Mymr" typeface="Myanmar Text"/>
+        <a:font script="Nkoo" typeface="Ebrima"/>
+        <a:font script="Olck" typeface="Nirmala UI"/>
+        <a:font script="Osma" typeface="Ebrima"/>
+        <a:font script="Phag" typeface="Phagspa"/>
+        <a:font script="Syrn" typeface="Estrangelo Edessa"/>
+        <a:font script="Syrj" typeface="Estrangelo Edessa"/>
+        <a:font script="Syre" typeface="Estrangelo Edessa"/>
+        <a:font script="Sora" typeface="Nirmala UI"/>
+        <a:font script="Tale" typeface="Microsoft Tai Le"/>
+        <a:font script="Talu" typeface="Microsoft New Tai Lue"/>
+        <a:font script="Tfng" typeface="Ebrima"/>
+      </a:minorFont>
+    </a:fontScheme>
+    <a:fmtScheme name="Office">
+      <a:fillStyleLst>
+        <a:solidFill>
+          <a:schemeClr val="phClr"/>
+        </a:solidFill>
+        <a:gradFill rotWithShape="1">
+          <a:gsLst>
+            <a:gs pos="0">
+              <a:schemeClr val="phClr">
+                <a:lumMod val="110000"/>
+                <a:satMod val="105000"/>
+                <a:tint val="67000"/>
+              </a:schemeClr>
+            </a:gs>
+            <a:gs pos="50000">
+              <a:schemeClr val="phClr">
+                <a:lumMod val="105000"/>
+                <a:satMod val="103000"/>
+                <a:tint val="73000"/>
+              </a:schemeClr>
+            </a:gs>
+            <a:gs pos="100000">
+              <a:schemeClr val="phClr">
+                <a:lumMod val="105000"/>
+                <a:satMod val="109000"/>
+                <a:tint val="81000"/>
+              </a:schemeClr>
+            </a:gs>
+          </a:gsLst>
+          <a:lin ang="5400000" scaled="0"/>
+        </a:gradFill>
+        <a:gradFill rotWithShape="1">
+          <a:gsLst>
+            <a:gs pos="0">
+              <a:schemeClr val="phClr">
+                <a:satMod val="103000"/>
+                <a:lumMod val="102000"/>
+                <a:tint val="94000"/>
+              </a:schemeClr>
+            </a:gs>
+            <a:gs pos="50000">
+              <a:schemeClr val="phClr">
+                <a:satMod val="110000"/>
+                <a:lumMod val="100000"/>
+                <a:shade val="100000"/>
+              </a:schemeClr>
+            </a:gs>
+            <a:gs pos="100000">
+              <a:schemeClr val="phClr">
+                <a:lumMod val="99000"/>
+                <a:satMod val="120000"/>
+                <a:shade val="78000"/>
+              </a:schemeClr>
+            </a:gs>
+          </a:gsLst>
+          <a:lin ang="5400000" scaled="0"/>
+        </a:gradFill>
+      </a:fillStyleLst>
+      <a:lnStyleLst>
+        <a:ln w="6350" cap="flat" cmpd="sng" algn="ctr">
+          <a:solidFill>
+            <a:schemeClr val="phClr"/>
+          </a:solidFill>
+          <a:prstDash val="solid"/>
+          <a:miter lim="800000"/>
+        </a:ln>
+        <a:ln w="12700" cap="flat" cmpd="sng" algn="ctr">
+          <a:solidFill>
+            <a:schemeClr val="phClr"/>
+          </a:solidFill>
+          <a:prstDash val="solid"/>
+          <a:miter lim="800000"/>
+        </a:ln>
+        <a:ln w="19050" cap="flat" cmpd="sng" algn="ctr">
+          <a:solidFill>
+            <a:schemeClr val="phClr"/>
+          </a:solidFill>
+          <a:prstDash val="solid"/>
+          <a:miter lim="800000"/>
+        </a:ln>
+      </a:lnStyleLst>
+      <a:effectStyleLst>
+        <a:effectStyle>
+          <a:effectLst/>
+        </a:effectStyle>
+        <a:effectStyle>
+          <a:effectLst/>
+        </a:effectStyle>
+        <a:effectStyle>
+          <a:effectLst>
+            <a:outerShdw blurRad="57150" dist="19050" dir="5400000" algn="ctr" rotWithShape="0">
+              <a:srgbClr val="000000">
+                <a:alpha val="63000"/>
+              </a:srgbClr>
+            </a:outerShdw>
+          </a:effectLst>
+        </a:effectStyle>
+      </a:effectStyleLst>
+      <a:bgFillStyleLst>
+        <a:solidFill>
+          <a:schemeClr val="phClr"/>
+        </a:solidFill>
+        <a:solidFill>
+          <a:schemeClr val="phClr">
+            <a:tint val="95000"/>
+            <a:satMod val="170000"/>
+          </a:schemeClr>
+        </a:solidFill>
+        <a:gradFill rotWithShape="1">
+          <a:gsLst>
+            <a:gs pos="0">
+              <a:schemeClr val="phClr">
+                <a:tint val="93000"/>
+                <a:satMod val="150000"/>
+                <a:shade val="98000"/>
+                <a:lumMod val="102000"/>
+              </a:schemeClr>
+            </a:gs>
+            <a:gs pos="50000">
+              <a:schemeClr val="phClr">
+                <a:tint val="98000"/>
+                <a:satMod val="130000"/>
+                <a:shade val="90000"/>
+                <a:lumMod val="103000"/>
+              </a:schemeClr>
+            </a:gs>
+            <a:gs pos="100000">
+              <a:schemeClr val="phClr">
+                <a:shade val="63000"/>
+                <a:satMod val="120000"/>
+              </a:schemeClr>
+            </a:gs>
+          </a:gsLst>
+          <a:lin ang="5400000" scaled="0"/>
+        </a:gradFill>
+      </a:bgFillStyleLst>
+    </a:fmtScheme>
+  </a:themeElements>
+  <a:objectDefaults/>
+  <a:extraClrSchemeLst/>
+  <a:extLst>
+    <a:ext uri="{05A4C25C-085E-4340-85A3-A5531E510DB2}">
+      <thm15:themeFamily xmlns:thm15="http://schemas.microsoft.com/office/thememl/2012/main" name="Office Theme" id="{62F939B6-93AF-4DB8-9C6B-D6C7DFDC589F}" vid="{4A3C46E8-61CC-4603-A589-7422A47A8E4A}"/>
+    </a:ext>
+  </a:extLst>
+</a:theme>
 </file>
</xml_diff>

<commit_message>
Some more changes to presentation. Still not complete.
</commit_message>
<xml_diff>
--- a/09-04 - Making the Case for Rust/Making the Case for Rust.pptx
+++ b/09-04 - Making the Case for Rust/Making the Case for Rust.pptx
@@ -5,7 +5,7 @@
     <p:sldMasterId id="2147483648" r:id="rId1"/>
   </p:sldMasterIdLst>
   <p:notesMasterIdLst>
-    <p:notesMasterId r:id="rId18"/>
+    <p:notesMasterId r:id="rId19"/>
   </p:notesMasterIdLst>
   <p:sldIdLst>
     <p:sldId id="256" r:id="rId2"/>
@@ -20,10 +20,11 @@
     <p:sldId id="263" r:id="rId11"/>
     <p:sldId id="264" r:id="rId12"/>
     <p:sldId id="268" r:id="rId13"/>
-    <p:sldId id="269" r:id="rId14"/>
-    <p:sldId id="270" r:id="rId15"/>
-    <p:sldId id="271" r:id="rId16"/>
-    <p:sldId id="265" r:id="rId17"/>
+    <p:sldId id="272" r:id="rId14"/>
+    <p:sldId id="269" r:id="rId15"/>
+    <p:sldId id="270" r:id="rId16"/>
+    <p:sldId id="271" r:id="rId17"/>
+    <p:sldId id="265" r:id="rId18"/>
   </p:sldIdLst>
   <p:sldSz cx="12192000" cy="6858000"/>
   <p:notesSz cx="6858000" cy="9144000"/>
@@ -4284,6 +4285,89 @@
           <p:cNvPr id="2" name="Title 1">
             <a:extLst>
               <a:ext uri="{FF2B5EF4-FFF2-40B4-BE49-F238E27FC236}">
+                <a16:creationId xmlns:a16="http://schemas.microsoft.com/office/drawing/2014/main" id="{1DAC007C-097D-4B50-8900-886A8F1C3069}"/>
+              </a:ext>
+            </a:extLst>
+          </p:cNvPr>
+          <p:cNvSpPr>
+            <a:spLocks noGrp="1"/>
+          </p:cNvSpPr>
+          <p:nvPr>
+            <p:ph type="title"/>
+          </p:nvPr>
+        </p:nvSpPr>
+        <p:spPr/>
+        <p:txBody>
+          <a:bodyPr/>
+          <a:lstStyle/>
+          <a:p>
+            <a:r>
+              <a:rPr lang="en-US" dirty="0"/>
+              <a:t>Collections</a:t>
+            </a:r>
+          </a:p>
+        </p:txBody>
+      </p:sp>
+      <p:sp>
+        <p:nvSpPr>
+          <p:cNvPr id="3" name="Content Placeholder 2">
+            <a:extLst>
+              <a:ext uri="{FF2B5EF4-FFF2-40B4-BE49-F238E27FC236}">
+                <a16:creationId xmlns:a16="http://schemas.microsoft.com/office/drawing/2014/main" id="{890798A9-DF5C-4739-9E12-8FDEB5DE6DF8}"/>
+              </a:ext>
+            </a:extLst>
+          </p:cNvPr>
+          <p:cNvSpPr>
+            <a:spLocks noGrp="1"/>
+          </p:cNvSpPr>
+          <p:nvPr>
+            <p:ph idx="1"/>
+          </p:nvPr>
+        </p:nvSpPr>
+        <p:spPr/>
+        <p:txBody>
+          <a:bodyPr/>
+          <a:lstStyle/>
+          <a:p>
+            <a:endParaRPr lang="en-US"/>
+          </a:p>
+        </p:txBody>
+      </p:sp>
+    </p:spTree>
+    <p:extLst>
+      <p:ext uri="{BB962C8B-B14F-4D97-AF65-F5344CB8AC3E}">
+        <p14:creationId xmlns:p14="http://schemas.microsoft.com/office/powerpoint/2010/main" val="1929909146"/>
+      </p:ext>
+    </p:extLst>
+  </p:cSld>
+  <p:clrMapOvr>
+    <a:masterClrMapping/>
+  </p:clrMapOvr>
+</p:sld>
+</file>
+
+<file path=ppt/slides/slide14.xml><?xml version="1.0" encoding="utf-8"?>
+<p:sld xmlns:a="http://schemas.openxmlformats.org/drawingml/2006/main" xmlns:r="http://schemas.openxmlformats.org/officeDocument/2006/relationships" xmlns:p="http://schemas.openxmlformats.org/presentationml/2006/main">
+  <p:cSld>
+    <p:spTree>
+      <p:nvGrpSpPr>
+        <p:cNvPr id="1" name=""/>
+        <p:cNvGrpSpPr/>
+        <p:nvPr/>
+      </p:nvGrpSpPr>
+      <p:grpSpPr>
+        <a:xfrm>
+          <a:off x="0" y="0"/>
+          <a:ext cx="0" cy="0"/>
+          <a:chOff x="0" y="0"/>
+          <a:chExt cx="0" cy="0"/>
+        </a:xfrm>
+      </p:grpSpPr>
+      <p:sp>
+        <p:nvSpPr>
+          <p:cNvPr id="2" name="Title 1">
+            <a:extLst>
+              <a:ext uri="{FF2B5EF4-FFF2-40B4-BE49-F238E27FC236}">
                 <a16:creationId xmlns:a16="http://schemas.microsoft.com/office/drawing/2014/main" id="{21EA2F42-0EC9-4176-9B80-6C9B06BF29EE}"/>
               </a:ext>
             </a:extLst>
@@ -4393,7 +4477,7 @@
 </p:sld>
 </file>
 
-<file path=ppt/slides/slide14.xml><?xml version="1.0" encoding="utf-8"?>
+<file path=ppt/slides/slide15.xml><?xml version="1.0" encoding="utf-8"?>
 <p:sld xmlns:a="http://schemas.openxmlformats.org/drawingml/2006/main" xmlns:r="http://schemas.openxmlformats.org/officeDocument/2006/relationships" xmlns:p="http://schemas.openxmlformats.org/presentationml/2006/main">
   <p:cSld>
     <p:spTree>
@@ -4523,7 +4607,7 @@
 </p:sld>
 </file>
 
-<file path=ppt/slides/slide15.xml><?xml version="1.0" encoding="utf-8"?>
+<file path=ppt/slides/slide16.xml><?xml version="1.0" encoding="utf-8"?>
 <p:sld xmlns:a="http://schemas.openxmlformats.org/drawingml/2006/main" xmlns:r="http://schemas.openxmlformats.org/officeDocument/2006/relationships" xmlns:p="http://schemas.openxmlformats.org/presentationml/2006/main">
   <p:cSld>
     <p:spTree>
@@ -4606,7 +4690,7 @@
 </p:sld>
 </file>
 
-<file path=ppt/slides/slide16.xml><?xml version="1.0" encoding="utf-8"?>
+<file path=ppt/slides/slide17.xml><?xml version="1.0" encoding="utf-8"?>
 <p:sld xmlns:a="http://schemas.openxmlformats.org/drawingml/2006/main" xmlns:r="http://schemas.openxmlformats.org/officeDocument/2006/relationships" xmlns:p="http://schemas.openxmlformats.org/presentationml/2006/main">
   <p:cSld>
     <p:spTree>
@@ -4725,12 +4809,8 @@
           <a:lstStyle/>
           <a:p>
             <a:r>
-              <a:rPr lang="en-US"/>
-              <a:t>Levels of </a:t>
-            </a:r>
-            <a:r>
-              <a:rPr lang="en-US" dirty="0"/>
-              <a:t>IoT Devices</a:t>
+              <a:rPr lang="en-US" dirty="0"/>
+              <a:t>Levels of IoT Devices</a:t>
             </a:r>
           </a:p>
         </p:txBody>

</xml_diff>

<commit_message>
Saving some misc changes
</commit_message>
<xml_diff>
--- a/09-04 - Making the Case for Rust/Making the Case for Rust.pptx
+++ b/09-04 - Making the Case for Rust/Making the Case for Rust.pptx
@@ -5,26 +5,27 @@
     <p:sldMasterId id="2147483648" r:id="rId1"/>
   </p:sldMasterIdLst>
   <p:notesMasterIdLst>
-    <p:notesMasterId r:id="rId19"/>
+    <p:notesMasterId r:id="rId20"/>
   </p:notesMasterIdLst>
   <p:sldIdLst>
     <p:sldId id="256" r:id="rId2"/>
     <p:sldId id="261" r:id="rId3"/>
-    <p:sldId id="260" r:id="rId4"/>
-    <p:sldId id="257" r:id="rId5"/>
-    <p:sldId id="258" r:id="rId6"/>
-    <p:sldId id="259" r:id="rId7"/>
-    <p:sldId id="262" r:id="rId8"/>
-    <p:sldId id="267" r:id="rId9"/>
-    <p:sldId id="266" r:id="rId10"/>
-    <p:sldId id="263" r:id="rId11"/>
-    <p:sldId id="264" r:id="rId12"/>
-    <p:sldId id="268" r:id="rId13"/>
-    <p:sldId id="272" r:id="rId14"/>
-    <p:sldId id="269" r:id="rId15"/>
-    <p:sldId id="270" r:id="rId16"/>
-    <p:sldId id="271" r:id="rId17"/>
-    <p:sldId id="265" r:id="rId18"/>
+    <p:sldId id="273" r:id="rId4"/>
+    <p:sldId id="260" r:id="rId5"/>
+    <p:sldId id="257" r:id="rId6"/>
+    <p:sldId id="258" r:id="rId7"/>
+    <p:sldId id="259" r:id="rId8"/>
+    <p:sldId id="262" r:id="rId9"/>
+    <p:sldId id="267" r:id="rId10"/>
+    <p:sldId id="266" r:id="rId11"/>
+    <p:sldId id="263" r:id="rId12"/>
+    <p:sldId id="264" r:id="rId13"/>
+    <p:sldId id="268" r:id="rId14"/>
+    <p:sldId id="272" r:id="rId15"/>
+    <p:sldId id="269" r:id="rId16"/>
+    <p:sldId id="270" r:id="rId17"/>
+    <p:sldId id="271" r:id="rId18"/>
+    <p:sldId id="265" r:id="rId19"/>
   </p:sldIdLst>
   <p:sldSz cx="12192000" cy="6858000"/>
   <p:notesSz cx="6858000" cy="9144000"/>
@@ -213,7 +214,7 @@
           <a:p>
             <a:fld id="{427BEAE6-7F5E-44C7-AA01-D551108D503B}" type="datetimeFigureOut">
               <a:rPr lang="en-US" smtClean="0"/>
-              <a:t>9/1/2019</a:t>
+              <a:t>11/4/2019</a:t>
             </a:fld>
             <a:endParaRPr lang="en-US"/>
           </a:p>
@@ -551,7 +552,7 @@
           <a:p>
             <a:fld id="{2C394F0E-C712-487E-B1FC-CE9069FFBDEB}" type="slidenum">
               <a:rPr lang="en-US" smtClean="0"/>
-              <a:t>10</a:t>
+              <a:t>11</a:t>
             </a:fld>
             <a:endParaRPr lang="en-US"/>
           </a:p>
@@ -717,7 +718,7 @@
           <a:p>
             <a:fld id="{5626CA67-F505-4C48-AD4A-1EC18FAC153A}" type="datetimeFigureOut">
               <a:rPr lang="en-US" smtClean="0"/>
-              <a:t>9/1/2019</a:t>
+              <a:t>11/4/2019</a:t>
             </a:fld>
             <a:endParaRPr lang="en-US"/>
           </a:p>
@@ -915,7 +916,7 @@
           <a:p>
             <a:fld id="{5626CA67-F505-4C48-AD4A-1EC18FAC153A}" type="datetimeFigureOut">
               <a:rPr lang="en-US" smtClean="0"/>
-              <a:t>9/1/2019</a:t>
+              <a:t>11/4/2019</a:t>
             </a:fld>
             <a:endParaRPr lang="en-US"/>
           </a:p>
@@ -1123,7 +1124,7 @@
           <a:p>
             <a:fld id="{5626CA67-F505-4C48-AD4A-1EC18FAC153A}" type="datetimeFigureOut">
               <a:rPr lang="en-US" smtClean="0"/>
-              <a:t>9/1/2019</a:t>
+              <a:t>11/4/2019</a:t>
             </a:fld>
             <a:endParaRPr lang="en-US"/>
           </a:p>
@@ -1321,7 +1322,7 @@
           <a:p>
             <a:fld id="{5626CA67-F505-4C48-AD4A-1EC18FAC153A}" type="datetimeFigureOut">
               <a:rPr lang="en-US" smtClean="0"/>
-              <a:t>9/1/2019</a:t>
+              <a:t>11/4/2019</a:t>
             </a:fld>
             <a:endParaRPr lang="en-US"/>
           </a:p>
@@ -1596,7 +1597,7 @@
           <a:p>
             <a:fld id="{5626CA67-F505-4C48-AD4A-1EC18FAC153A}" type="datetimeFigureOut">
               <a:rPr lang="en-US" smtClean="0"/>
-              <a:t>9/1/2019</a:t>
+              <a:t>11/4/2019</a:t>
             </a:fld>
             <a:endParaRPr lang="en-US"/>
           </a:p>
@@ -1861,7 +1862,7 @@
           <a:p>
             <a:fld id="{5626CA67-F505-4C48-AD4A-1EC18FAC153A}" type="datetimeFigureOut">
               <a:rPr lang="en-US" smtClean="0"/>
-              <a:t>9/1/2019</a:t>
+              <a:t>11/4/2019</a:t>
             </a:fld>
             <a:endParaRPr lang="en-US"/>
           </a:p>
@@ -2273,7 +2274,7 @@
           <a:p>
             <a:fld id="{5626CA67-F505-4C48-AD4A-1EC18FAC153A}" type="datetimeFigureOut">
               <a:rPr lang="en-US" smtClean="0"/>
-              <a:t>9/1/2019</a:t>
+              <a:t>11/4/2019</a:t>
             </a:fld>
             <a:endParaRPr lang="en-US"/>
           </a:p>
@@ -2414,7 +2415,7 @@
           <a:p>
             <a:fld id="{5626CA67-F505-4C48-AD4A-1EC18FAC153A}" type="datetimeFigureOut">
               <a:rPr lang="en-US" smtClean="0"/>
-              <a:t>9/1/2019</a:t>
+              <a:t>11/4/2019</a:t>
             </a:fld>
             <a:endParaRPr lang="en-US"/>
           </a:p>
@@ -2527,7 +2528,7 @@
           <a:p>
             <a:fld id="{5626CA67-F505-4C48-AD4A-1EC18FAC153A}" type="datetimeFigureOut">
               <a:rPr lang="en-US" smtClean="0"/>
-              <a:t>9/1/2019</a:t>
+              <a:t>11/4/2019</a:t>
             </a:fld>
             <a:endParaRPr lang="en-US"/>
           </a:p>
@@ -2838,7 +2839,7 @@
           <a:p>
             <a:fld id="{5626CA67-F505-4C48-AD4A-1EC18FAC153A}" type="datetimeFigureOut">
               <a:rPr lang="en-US" smtClean="0"/>
-              <a:t>9/1/2019</a:t>
+              <a:t>11/4/2019</a:t>
             </a:fld>
             <a:endParaRPr lang="en-US"/>
           </a:p>
@@ -3126,7 +3127,7 @@
           <a:p>
             <a:fld id="{5626CA67-F505-4C48-AD4A-1EC18FAC153A}" type="datetimeFigureOut">
               <a:rPr lang="en-US" smtClean="0"/>
-              <a:t>9/1/2019</a:t>
+              <a:t>11/4/2019</a:t>
             </a:fld>
             <a:endParaRPr lang="en-US"/>
           </a:p>
@@ -3367,7 +3368,7 @@
           <a:p>
             <a:fld id="{5626CA67-F505-4C48-AD4A-1EC18FAC153A}" type="datetimeFigureOut">
               <a:rPr lang="en-US" smtClean="0"/>
-              <a:t>9/1/2019</a:t>
+              <a:t>11/4/2019</a:t>
             </a:fld>
             <a:endParaRPr lang="en-US"/>
           </a:p>
@@ -3906,6 +3907,103 @@
           <p:cNvPr id="2" name="Title 1">
             <a:extLst>
               <a:ext uri="{FF2B5EF4-FFF2-40B4-BE49-F238E27FC236}">
+                <a16:creationId xmlns:a16="http://schemas.microsoft.com/office/drawing/2014/main" id="{D0CF1325-4C51-4C8F-8423-8E2B25775CC5}"/>
+              </a:ext>
+            </a:extLst>
+          </p:cNvPr>
+          <p:cNvSpPr>
+            <a:spLocks noGrp="1"/>
+          </p:cNvSpPr>
+          <p:nvPr>
+            <p:ph type="title"/>
+          </p:nvPr>
+        </p:nvSpPr>
+        <p:spPr/>
+        <p:txBody>
+          <a:bodyPr/>
+          <a:lstStyle/>
+          <a:p>
+            <a:r>
+              <a:rPr lang="en-US" dirty="0"/>
+              <a:t>Cargo</a:t>
+            </a:r>
+          </a:p>
+        </p:txBody>
+      </p:sp>
+      <p:sp>
+        <p:nvSpPr>
+          <p:cNvPr id="3" name="Content Placeholder 2">
+            <a:extLst>
+              <a:ext uri="{FF2B5EF4-FFF2-40B4-BE49-F238E27FC236}">
+                <a16:creationId xmlns:a16="http://schemas.microsoft.com/office/drawing/2014/main" id="{63141C8E-60BE-449F-B6B1-1EA358A5B57D}"/>
+              </a:ext>
+            </a:extLst>
+          </p:cNvPr>
+          <p:cNvSpPr>
+            <a:spLocks noGrp="1"/>
+          </p:cNvSpPr>
+          <p:nvPr>
+            <p:ph idx="1"/>
+          </p:nvPr>
+        </p:nvSpPr>
+        <p:spPr/>
+        <p:txBody>
+          <a:bodyPr/>
+          <a:lstStyle/>
+          <a:p>
+            <a:r>
+              <a:rPr lang="en-US" dirty="0"/>
+              <a:t>Used for managing app stuff</a:t>
+            </a:r>
+          </a:p>
+          <a:p>
+            <a:r>
+              <a:rPr lang="en-US" dirty="0"/>
+              <a:t>Build/new/download package/</a:t>
+            </a:r>
+            <a:r>
+              <a:rPr lang="en-US" dirty="0" err="1"/>
+              <a:t>etc</a:t>
+            </a:r>
+            <a:endParaRPr lang="en-US" dirty="0"/>
+          </a:p>
+        </p:txBody>
+      </p:sp>
+    </p:spTree>
+    <p:extLst>
+      <p:ext uri="{BB962C8B-B14F-4D97-AF65-F5344CB8AC3E}">
+        <p14:creationId xmlns:p14="http://schemas.microsoft.com/office/powerpoint/2010/main" val="1063557504"/>
+      </p:ext>
+    </p:extLst>
+  </p:cSld>
+  <p:clrMapOvr>
+    <a:masterClrMapping/>
+  </p:clrMapOvr>
+</p:sld>
+</file>
+
+<file path=ppt/slides/slide11.xml><?xml version="1.0" encoding="utf-8"?>
+<p:sld xmlns:a="http://schemas.openxmlformats.org/drawingml/2006/main" xmlns:r="http://schemas.openxmlformats.org/officeDocument/2006/relationships" xmlns:p="http://schemas.openxmlformats.org/presentationml/2006/main">
+  <p:cSld>
+    <p:spTree>
+      <p:nvGrpSpPr>
+        <p:cNvPr id="1" name=""/>
+        <p:cNvGrpSpPr/>
+        <p:nvPr/>
+      </p:nvGrpSpPr>
+      <p:grpSpPr>
+        <a:xfrm>
+          <a:off x="0" y="0"/>
+          <a:ext cx="0" cy="0"/>
+          <a:chOff x="0" y="0"/>
+          <a:chExt cx="0" cy="0"/>
+        </a:xfrm>
+      </p:grpSpPr>
+      <p:sp>
+        <p:nvSpPr>
+          <p:cNvPr id="2" name="Title 1">
+            <a:extLst>
+              <a:ext uri="{FF2B5EF4-FFF2-40B4-BE49-F238E27FC236}">
                 <a16:creationId xmlns:a16="http://schemas.microsoft.com/office/drawing/2014/main" id="{CE5573C2-CF2A-4D6B-95EE-098267EC5A8E}"/>
               </a:ext>
             </a:extLst>
@@ -4000,7 +4098,7 @@
 </p:sld>
 </file>
 
-<file path=ppt/slides/slide11.xml><?xml version="1.0" encoding="utf-8"?>
+<file path=ppt/slides/slide12.xml><?xml version="1.0" encoding="utf-8"?>
 <p:sld xmlns:a="http://schemas.openxmlformats.org/drawingml/2006/main" xmlns:r="http://schemas.openxmlformats.org/officeDocument/2006/relationships" xmlns:p="http://schemas.openxmlformats.org/presentationml/2006/main">
   <p:cSld>
     <p:spTree>
@@ -4133,7 +4231,7 @@
 </p:sld>
 </file>
 
-<file path=ppt/slides/slide12.xml><?xml version="1.0" encoding="utf-8"?>
+<file path=ppt/slides/slide13.xml><?xml version="1.0" encoding="utf-8"?>
 <p:sld xmlns:a="http://schemas.openxmlformats.org/drawingml/2006/main" xmlns:r="http://schemas.openxmlformats.org/officeDocument/2006/relationships" xmlns:p="http://schemas.openxmlformats.org/presentationml/2006/main">
   <p:cSld>
     <p:spTree>
@@ -4263,89 +4361,6 @@
 </p:sld>
 </file>
 
-<file path=ppt/slides/slide13.xml><?xml version="1.0" encoding="utf-8"?>
-<p:sld xmlns:a="http://schemas.openxmlformats.org/drawingml/2006/main" xmlns:r="http://schemas.openxmlformats.org/officeDocument/2006/relationships" xmlns:p="http://schemas.openxmlformats.org/presentationml/2006/main">
-  <p:cSld>
-    <p:spTree>
-      <p:nvGrpSpPr>
-        <p:cNvPr id="1" name=""/>
-        <p:cNvGrpSpPr/>
-        <p:nvPr/>
-      </p:nvGrpSpPr>
-      <p:grpSpPr>
-        <a:xfrm>
-          <a:off x="0" y="0"/>
-          <a:ext cx="0" cy="0"/>
-          <a:chOff x="0" y="0"/>
-          <a:chExt cx="0" cy="0"/>
-        </a:xfrm>
-      </p:grpSpPr>
-      <p:sp>
-        <p:nvSpPr>
-          <p:cNvPr id="2" name="Title 1">
-            <a:extLst>
-              <a:ext uri="{FF2B5EF4-FFF2-40B4-BE49-F238E27FC236}">
-                <a16:creationId xmlns:a16="http://schemas.microsoft.com/office/drawing/2014/main" id="{1DAC007C-097D-4B50-8900-886A8F1C3069}"/>
-              </a:ext>
-            </a:extLst>
-          </p:cNvPr>
-          <p:cNvSpPr>
-            <a:spLocks noGrp="1"/>
-          </p:cNvSpPr>
-          <p:nvPr>
-            <p:ph type="title"/>
-          </p:nvPr>
-        </p:nvSpPr>
-        <p:spPr/>
-        <p:txBody>
-          <a:bodyPr/>
-          <a:lstStyle/>
-          <a:p>
-            <a:r>
-              <a:rPr lang="en-US" dirty="0"/>
-              <a:t>Collections</a:t>
-            </a:r>
-          </a:p>
-        </p:txBody>
-      </p:sp>
-      <p:sp>
-        <p:nvSpPr>
-          <p:cNvPr id="3" name="Content Placeholder 2">
-            <a:extLst>
-              <a:ext uri="{FF2B5EF4-FFF2-40B4-BE49-F238E27FC236}">
-                <a16:creationId xmlns:a16="http://schemas.microsoft.com/office/drawing/2014/main" id="{890798A9-DF5C-4739-9E12-8FDEB5DE6DF8}"/>
-              </a:ext>
-            </a:extLst>
-          </p:cNvPr>
-          <p:cNvSpPr>
-            <a:spLocks noGrp="1"/>
-          </p:cNvSpPr>
-          <p:nvPr>
-            <p:ph idx="1"/>
-          </p:nvPr>
-        </p:nvSpPr>
-        <p:spPr/>
-        <p:txBody>
-          <a:bodyPr/>
-          <a:lstStyle/>
-          <a:p>
-            <a:endParaRPr lang="en-US"/>
-          </a:p>
-        </p:txBody>
-      </p:sp>
-    </p:spTree>
-    <p:extLst>
-      <p:ext uri="{BB962C8B-B14F-4D97-AF65-F5344CB8AC3E}">
-        <p14:creationId xmlns:p14="http://schemas.microsoft.com/office/powerpoint/2010/main" val="1929909146"/>
-      </p:ext>
-    </p:extLst>
-  </p:cSld>
-  <p:clrMapOvr>
-    <a:masterClrMapping/>
-  </p:clrMapOvr>
-</p:sld>
-</file>
-
 <file path=ppt/slides/slide14.xml><?xml version="1.0" encoding="utf-8"?>
 <p:sld xmlns:a="http://schemas.openxmlformats.org/drawingml/2006/main" xmlns:r="http://schemas.openxmlformats.org/officeDocument/2006/relationships" xmlns:p="http://schemas.openxmlformats.org/presentationml/2006/main">
   <p:cSld>
@@ -4368,6 +4383,89 @@
           <p:cNvPr id="2" name="Title 1">
             <a:extLst>
               <a:ext uri="{FF2B5EF4-FFF2-40B4-BE49-F238E27FC236}">
+                <a16:creationId xmlns:a16="http://schemas.microsoft.com/office/drawing/2014/main" id="{1DAC007C-097D-4B50-8900-886A8F1C3069}"/>
+              </a:ext>
+            </a:extLst>
+          </p:cNvPr>
+          <p:cNvSpPr>
+            <a:spLocks noGrp="1"/>
+          </p:cNvSpPr>
+          <p:nvPr>
+            <p:ph type="title"/>
+          </p:nvPr>
+        </p:nvSpPr>
+        <p:spPr/>
+        <p:txBody>
+          <a:bodyPr/>
+          <a:lstStyle/>
+          <a:p>
+            <a:r>
+              <a:rPr lang="en-US" dirty="0"/>
+              <a:t>Collections</a:t>
+            </a:r>
+          </a:p>
+        </p:txBody>
+      </p:sp>
+      <p:sp>
+        <p:nvSpPr>
+          <p:cNvPr id="3" name="Content Placeholder 2">
+            <a:extLst>
+              <a:ext uri="{FF2B5EF4-FFF2-40B4-BE49-F238E27FC236}">
+                <a16:creationId xmlns:a16="http://schemas.microsoft.com/office/drawing/2014/main" id="{890798A9-DF5C-4739-9E12-8FDEB5DE6DF8}"/>
+              </a:ext>
+            </a:extLst>
+          </p:cNvPr>
+          <p:cNvSpPr>
+            <a:spLocks noGrp="1"/>
+          </p:cNvSpPr>
+          <p:nvPr>
+            <p:ph idx="1"/>
+          </p:nvPr>
+        </p:nvSpPr>
+        <p:spPr/>
+        <p:txBody>
+          <a:bodyPr/>
+          <a:lstStyle/>
+          <a:p>
+            <a:endParaRPr lang="en-US"/>
+          </a:p>
+        </p:txBody>
+      </p:sp>
+    </p:spTree>
+    <p:extLst>
+      <p:ext uri="{BB962C8B-B14F-4D97-AF65-F5344CB8AC3E}">
+        <p14:creationId xmlns:p14="http://schemas.microsoft.com/office/powerpoint/2010/main" val="1929909146"/>
+      </p:ext>
+    </p:extLst>
+  </p:cSld>
+  <p:clrMapOvr>
+    <a:masterClrMapping/>
+  </p:clrMapOvr>
+</p:sld>
+</file>
+
+<file path=ppt/slides/slide15.xml><?xml version="1.0" encoding="utf-8"?>
+<p:sld xmlns:a="http://schemas.openxmlformats.org/drawingml/2006/main" xmlns:r="http://schemas.openxmlformats.org/officeDocument/2006/relationships" xmlns:p="http://schemas.openxmlformats.org/presentationml/2006/main">
+  <p:cSld>
+    <p:spTree>
+      <p:nvGrpSpPr>
+        <p:cNvPr id="1" name=""/>
+        <p:cNvGrpSpPr/>
+        <p:nvPr/>
+      </p:nvGrpSpPr>
+      <p:grpSpPr>
+        <a:xfrm>
+          <a:off x="0" y="0"/>
+          <a:ext cx="0" cy="0"/>
+          <a:chOff x="0" y="0"/>
+          <a:chExt cx="0" cy="0"/>
+        </a:xfrm>
+      </p:grpSpPr>
+      <p:sp>
+        <p:nvSpPr>
+          <p:cNvPr id="2" name="Title 1">
+            <a:extLst>
+              <a:ext uri="{FF2B5EF4-FFF2-40B4-BE49-F238E27FC236}">
                 <a16:creationId xmlns:a16="http://schemas.microsoft.com/office/drawing/2014/main" id="{21EA2F42-0EC9-4176-9B80-6C9B06BF29EE}"/>
               </a:ext>
             </a:extLst>
@@ -4477,7 +4575,7 @@
 </p:sld>
 </file>
 
-<file path=ppt/slides/slide15.xml><?xml version="1.0" encoding="utf-8"?>
+<file path=ppt/slides/slide16.xml><?xml version="1.0" encoding="utf-8"?>
 <p:sld xmlns:a="http://schemas.openxmlformats.org/drawingml/2006/main" xmlns:r="http://schemas.openxmlformats.org/officeDocument/2006/relationships" xmlns:p="http://schemas.openxmlformats.org/presentationml/2006/main">
   <p:cSld>
     <p:spTree>
@@ -4607,7 +4705,7 @@
 </p:sld>
 </file>
 
-<file path=ppt/slides/slide16.xml><?xml version="1.0" encoding="utf-8"?>
+<file path=ppt/slides/slide17.xml><?xml version="1.0" encoding="utf-8"?>
 <p:sld xmlns:a="http://schemas.openxmlformats.org/drawingml/2006/main" xmlns:r="http://schemas.openxmlformats.org/officeDocument/2006/relationships" xmlns:p="http://schemas.openxmlformats.org/presentationml/2006/main">
   <p:cSld>
     <p:spTree>
@@ -4690,7 +4788,7 @@
 </p:sld>
 </file>
 
-<file path=ppt/slides/slide17.xml><?xml version="1.0" encoding="utf-8"?>
+<file path=ppt/slides/slide18.xml><?xml version="1.0" encoding="utf-8"?>
 <p:sld xmlns:a="http://schemas.openxmlformats.org/drawingml/2006/main" xmlns:r="http://schemas.openxmlformats.org/officeDocument/2006/relationships" xmlns:p="http://schemas.openxmlformats.org/presentationml/2006/main">
   <p:cSld>
     <p:spTree>
@@ -5890,7 +5988,7 @@
           <p:cNvPr id="2" name="Title 1">
             <a:extLst>
               <a:ext uri="{FF2B5EF4-FFF2-40B4-BE49-F238E27FC236}">
-                <a16:creationId xmlns:a16="http://schemas.microsoft.com/office/drawing/2014/main" id="{ADD51F4F-49EA-4521-830A-50B931F48C9B}"/>
+                <a16:creationId xmlns:a16="http://schemas.microsoft.com/office/drawing/2014/main" id="{63A6B202-6EB1-4E9D-A772-B851CF40F77F}"/>
               </a:ext>
             </a:extLst>
           </p:cNvPr>
@@ -5908,7 +6006,7 @@
           <a:p>
             <a:r>
               <a:rPr lang="en-US" dirty="0"/>
-              <a:t>Let’s talk about C/C++</a:t>
+              <a:t>Code Example!</a:t>
             </a:r>
           </a:p>
         </p:txBody>
@@ -5918,7 +6016,7 @@
           <p:cNvPr id="3" name="Content Placeholder 2">
             <a:extLst>
               <a:ext uri="{FF2B5EF4-FFF2-40B4-BE49-F238E27FC236}">
-                <a16:creationId xmlns:a16="http://schemas.microsoft.com/office/drawing/2014/main" id="{DA297433-4AD9-40C0-85E5-A5B079F47112}"/>
+                <a16:creationId xmlns:a16="http://schemas.microsoft.com/office/drawing/2014/main" id="{021A7D65-BEEF-42D8-8647-D46DF6D45389}"/>
               </a:ext>
             </a:extLst>
           </p:cNvPr>
@@ -5936,76 +6034,15 @@
           <a:p>
             <a:r>
               <a:rPr lang="en-US" dirty="0"/>
-              <a:t>Built for Speed</a:t>
-            </a:r>
-          </a:p>
-          <a:p>
-            <a:r>
-              <a:rPr lang="en-US" dirty="0"/>
-              <a:t>Not memory safe</a:t>
-            </a:r>
-          </a:p>
-          <a:p>
-            <a:pPr lvl="1"/>
-            <a:r>
-              <a:rPr lang="en-US" dirty="0" err="1"/>
-              <a:t>Gotta</a:t>
-            </a:r>
-            <a:r>
-              <a:rPr lang="en-US"/>
-              <a:t> love them pointers</a:t>
-            </a:r>
-            <a:endParaRPr lang="en-US" dirty="0"/>
-          </a:p>
-          <a:p>
-            <a:r>
-              <a:rPr lang="en-US" dirty="0"/>
-              <a:t>Building</a:t>
-            </a:r>
-          </a:p>
-          <a:p>
-            <a:pPr lvl="1"/>
-            <a:r>
-              <a:rPr lang="en-US" dirty="0"/>
-              <a:t>CMake Script</a:t>
-            </a:r>
-          </a:p>
-          <a:p>
-            <a:pPr lvl="1"/>
-            <a:r>
-              <a:rPr lang="en-US" dirty="0"/>
-              <a:t>Have fun setting it up</a:t>
-            </a:r>
-          </a:p>
-          <a:p>
-            <a:r>
-              <a:rPr lang="en-US" dirty="0"/>
-              <a:t>Unit Testing</a:t>
-            </a:r>
-          </a:p>
-          <a:p>
-            <a:pPr lvl="1"/>
-            <a:r>
-              <a:rPr lang="en-US" dirty="0"/>
-              <a:t>Handful of options</a:t>
-            </a:r>
-          </a:p>
-          <a:p>
-            <a:pPr lvl="1"/>
-            <a:r>
-              <a:rPr lang="en-US" dirty="0"/>
-              <a:t>Have fun setting it up</a:t>
-            </a:r>
-          </a:p>
-          <a:p>
-            <a:endParaRPr lang="en-US" dirty="0"/>
+              <a:t>It’s C Code</a:t>
+            </a:r>
           </a:p>
         </p:txBody>
       </p:sp>
     </p:spTree>
     <p:extLst>
       <p:ext uri="{BB962C8B-B14F-4D97-AF65-F5344CB8AC3E}">
-        <p14:creationId xmlns:p14="http://schemas.microsoft.com/office/powerpoint/2010/main" val="49177043"/>
+        <p14:creationId xmlns:p14="http://schemas.microsoft.com/office/powerpoint/2010/main" val="2224390578"/>
       </p:ext>
     </p:extLst>
   </p:cSld>
@@ -6037,7 +6074,7 @@
           <p:cNvPr id="2" name="Title 1">
             <a:extLst>
               <a:ext uri="{FF2B5EF4-FFF2-40B4-BE49-F238E27FC236}">
-                <a16:creationId xmlns:a16="http://schemas.microsoft.com/office/drawing/2014/main" id="{83DE588E-2A3E-40A1-8B63-EB2732B5D19A}"/>
+                <a16:creationId xmlns:a16="http://schemas.microsoft.com/office/drawing/2014/main" id="{ADD51F4F-49EA-4521-830A-50B931F48C9B}"/>
               </a:ext>
             </a:extLst>
           </p:cNvPr>
@@ -6055,7 +6092,7 @@
           <a:p>
             <a:r>
               <a:rPr lang="en-US" dirty="0"/>
-              <a:t>What is Rust?</a:t>
+              <a:t>Let’s talk about C/C++</a:t>
             </a:r>
           </a:p>
         </p:txBody>
@@ -6065,7 +6102,7 @@
           <p:cNvPr id="3" name="Content Placeholder 2">
             <a:extLst>
               <a:ext uri="{FF2B5EF4-FFF2-40B4-BE49-F238E27FC236}">
-                <a16:creationId xmlns:a16="http://schemas.microsoft.com/office/drawing/2014/main" id="{EDA467E1-8794-48E3-8782-BAF2AB5BD1CE}"/>
+                <a16:creationId xmlns:a16="http://schemas.microsoft.com/office/drawing/2014/main" id="{DA297433-4AD9-40C0-85E5-A5B079F47112}"/>
               </a:ext>
             </a:extLst>
           </p:cNvPr>
@@ -6083,25 +6120,65 @@
           <a:p>
             <a:r>
               <a:rPr lang="en-US" dirty="0"/>
-              <a:t>C based syntax</a:t>
-            </a:r>
-          </a:p>
-          <a:p>
-            <a:r>
-              <a:rPr lang="en-US" dirty="0"/>
-              <a:t>Performance comparable to C++</a:t>
-            </a:r>
-          </a:p>
-          <a:p>
-            <a:r>
-              <a:rPr lang="en-US" dirty="0"/>
-              <a:t>Created by Mozilla</a:t>
-            </a:r>
-          </a:p>
-          <a:p>
-            <a:r>
-              <a:rPr lang="en-US" dirty="0"/>
-              <a:t>“Most loved programming language“ in Stack Overflow’s Developer Survey 2016-2019</a:t>
+              <a:t>Built for Speed</a:t>
+            </a:r>
+          </a:p>
+          <a:p>
+            <a:r>
+              <a:rPr lang="en-US" dirty="0"/>
+              <a:t>Not memory safe</a:t>
+            </a:r>
+          </a:p>
+          <a:p>
+            <a:pPr lvl="1"/>
+            <a:r>
+              <a:rPr lang="en-US" dirty="0" err="1"/>
+              <a:t>Gotta</a:t>
+            </a:r>
+            <a:r>
+              <a:rPr lang="en-US"/>
+              <a:t> love them pointers</a:t>
+            </a:r>
+            <a:endParaRPr lang="en-US" dirty="0"/>
+          </a:p>
+          <a:p>
+            <a:r>
+              <a:rPr lang="en-US" dirty="0"/>
+              <a:t>Building</a:t>
+            </a:r>
+          </a:p>
+          <a:p>
+            <a:pPr lvl="1"/>
+            <a:r>
+              <a:rPr lang="en-US" dirty="0"/>
+              <a:t>CMake Script</a:t>
+            </a:r>
+          </a:p>
+          <a:p>
+            <a:pPr lvl="1"/>
+            <a:r>
+              <a:rPr lang="en-US" dirty="0"/>
+              <a:t>Have fun setting it up</a:t>
+            </a:r>
+          </a:p>
+          <a:p>
+            <a:r>
+              <a:rPr lang="en-US" dirty="0"/>
+              <a:t>Unit Testing</a:t>
+            </a:r>
+          </a:p>
+          <a:p>
+            <a:pPr lvl="1"/>
+            <a:r>
+              <a:rPr lang="en-US" dirty="0"/>
+              <a:t>Handful of options</a:t>
+            </a:r>
+          </a:p>
+          <a:p>
+            <a:pPr lvl="1"/>
+            <a:r>
+              <a:rPr lang="en-US" dirty="0"/>
+              <a:t>Have fun setting it up</a:t>
             </a:r>
           </a:p>
           <a:p>
@@ -6112,7 +6189,7 @@
     </p:spTree>
     <p:extLst>
       <p:ext uri="{BB962C8B-B14F-4D97-AF65-F5344CB8AC3E}">
-        <p14:creationId xmlns:p14="http://schemas.microsoft.com/office/powerpoint/2010/main" val="624615685"/>
+        <p14:creationId xmlns:p14="http://schemas.microsoft.com/office/powerpoint/2010/main" val="49177043"/>
       </p:ext>
     </p:extLst>
   </p:cSld>
@@ -6144,7 +6221,7 @@
           <p:cNvPr id="2" name="Title 1">
             <a:extLst>
               <a:ext uri="{FF2B5EF4-FFF2-40B4-BE49-F238E27FC236}">
-                <a16:creationId xmlns:a16="http://schemas.microsoft.com/office/drawing/2014/main" id="{FA2BD226-E041-4079-8DC7-DDA72477C149}"/>
+                <a16:creationId xmlns:a16="http://schemas.microsoft.com/office/drawing/2014/main" id="{83DE588E-2A3E-40A1-8B63-EB2732B5D19A}"/>
               </a:ext>
             </a:extLst>
           </p:cNvPr>
@@ -6162,7 +6239,7 @@
           <a:p>
             <a:r>
               <a:rPr lang="en-US" dirty="0"/>
-              <a:t>Why Rust?</a:t>
+              <a:t>What is Rust?</a:t>
             </a:r>
           </a:p>
         </p:txBody>
@@ -6172,7 +6249,7 @@
           <p:cNvPr id="3" name="Content Placeholder 2">
             <a:extLst>
               <a:ext uri="{FF2B5EF4-FFF2-40B4-BE49-F238E27FC236}">
-                <a16:creationId xmlns:a16="http://schemas.microsoft.com/office/drawing/2014/main" id="{F84E0BD2-0042-44C9-8332-D4D4AE19CBE8}"/>
+                <a16:creationId xmlns:a16="http://schemas.microsoft.com/office/drawing/2014/main" id="{EDA467E1-8794-48E3-8782-BAF2AB5BD1CE}"/>
               </a:ext>
             </a:extLst>
           </p:cNvPr>
@@ -6190,26 +6267,25 @@
           <a:p>
             <a:r>
               <a:rPr lang="en-US" dirty="0"/>
-              <a:t>New Docs</a:t>
-            </a:r>
-          </a:p>
-          <a:p>
-            <a:pPr lvl="1"/>
-            <a:r>
-              <a:rPr lang="en-US" dirty="0"/>
-              <a:t>Good Docs</a:t>
-            </a:r>
-          </a:p>
-          <a:p>
-            <a:r>
-              <a:rPr lang="en-US" dirty="0"/>
-              <a:t>Memory Safety</a:t>
-            </a:r>
-          </a:p>
-          <a:p>
-            <a:r>
-              <a:rPr lang="en-US" dirty="0"/>
-              <a:t>Performance</a:t>
+              <a:t>C based syntax</a:t>
+            </a:r>
+          </a:p>
+          <a:p>
+            <a:r>
+              <a:rPr lang="en-US" dirty="0"/>
+              <a:t>Performance comparable to C++</a:t>
+            </a:r>
+          </a:p>
+          <a:p>
+            <a:r>
+              <a:rPr lang="en-US" dirty="0"/>
+              <a:t>Created by Mozilla</a:t>
+            </a:r>
+          </a:p>
+          <a:p>
+            <a:r>
+              <a:rPr lang="en-US" dirty="0"/>
+              <a:t>“Most loved programming language“ in Stack Overflow’s Developer Survey 2016-2019</a:t>
             </a:r>
           </a:p>
           <a:p>
@@ -6220,7 +6296,7 @@
     </p:spTree>
     <p:extLst>
       <p:ext uri="{BB962C8B-B14F-4D97-AF65-F5344CB8AC3E}">
-        <p14:creationId xmlns:p14="http://schemas.microsoft.com/office/powerpoint/2010/main" val="2082636709"/>
+        <p14:creationId xmlns:p14="http://schemas.microsoft.com/office/powerpoint/2010/main" val="624615685"/>
       </p:ext>
     </p:extLst>
   </p:cSld>
@@ -6252,7 +6328,7 @@
           <p:cNvPr id="2" name="Title 1">
             <a:extLst>
               <a:ext uri="{FF2B5EF4-FFF2-40B4-BE49-F238E27FC236}">
-                <a16:creationId xmlns:a16="http://schemas.microsoft.com/office/drawing/2014/main" id="{EBC8A360-5809-4304-ADFF-05BBC2ECD839}"/>
+                <a16:creationId xmlns:a16="http://schemas.microsoft.com/office/drawing/2014/main" id="{FA2BD226-E041-4079-8DC7-DDA72477C149}"/>
               </a:ext>
             </a:extLst>
           </p:cNvPr>
@@ -6270,7 +6346,7 @@
           <a:p>
             <a:r>
               <a:rPr lang="en-US" dirty="0"/>
-              <a:t>Books!!! and other docs</a:t>
+              <a:t>Why Rust?</a:t>
             </a:r>
           </a:p>
         </p:txBody>
@@ -6280,7 +6356,7 @@
           <p:cNvPr id="3" name="Content Placeholder 2">
             <a:extLst>
               <a:ext uri="{FF2B5EF4-FFF2-40B4-BE49-F238E27FC236}">
-                <a16:creationId xmlns:a16="http://schemas.microsoft.com/office/drawing/2014/main" id="{9C201CBE-0B86-48F5-B183-B9A8C8DE2089}"/>
+                <a16:creationId xmlns:a16="http://schemas.microsoft.com/office/drawing/2014/main" id="{F84E0BD2-0042-44C9-8332-D4D4AE19CBE8}"/>
               </a:ext>
             </a:extLst>
           </p:cNvPr>
@@ -6298,28 +6374,27 @@
           <a:p>
             <a:r>
               <a:rPr lang="en-US" dirty="0"/>
-              <a:t>Basic Rust Book: </a:t>
-            </a:r>
-            <a:r>
-              <a:rPr lang="en-US" dirty="0">
-                <a:hlinkClick r:id="rId2"/>
-              </a:rPr>
-              <a:t>https://doc.rust-lang.org/book/</a:t>
-            </a:r>
-            <a:endParaRPr lang="en-US" dirty="0"/>
-          </a:p>
-          <a:p>
-            <a:r>
-              <a:rPr lang="en-US" dirty="0"/>
-              <a:t>Embedded Rust Book: </a:t>
-            </a:r>
-            <a:r>
-              <a:rPr lang="en-US" dirty="0">
-                <a:hlinkClick r:id="rId3"/>
-              </a:rPr>
-              <a:t>https://rust-embedded.github.io/book/intro/index.html</a:t>
-            </a:r>
-            <a:endParaRPr lang="en-US" dirty="0"/>
+              <a:t>New Docs</a:t>
+            </a:r>
+          </a:p>
+          <a:p>
+            <a:pPr lvl="1"/>
+            <a:r>
+              <a:rPr lang="en-US" dirty="0"/>
+              <a:t>Good Docs</a:t>
+            </a:r>
+          </a:p>
+          <a:p>
+            <a:r>
+              <a:rPr lang="en-US" dirty="0"/>
+              <a:t>Memory Safety</a:t>
+            </a:r>
+          </a:p>
+          <a:p>
+            <a:r>
+              <a:rPr lang="en-US" dirty="0"/>
+              <a:t>Performance</a:t>
+            </a:r>
           </a:p>
           <a:p>
             <a:endParaRPr lang="en-US" dirty="0"/>
@@ -6329,7 +6404,7 @@
     </p:spTree>
     <p:extLst>
       <p:ext uri="{BB962C8B-B14F-4D97-AF65-F5344CB8AC3E}">
-        <p14:creationId xmlns:p14="http://schemas.microsoft.com/office/powerpoint/2010/main" val="774428196"/>
+        <p14:creationId xmlns:p14="http://schemas.microsoft.com/office/powerpoint/2010/main" val="2082636709"/>
       </p:ext>
     </p:extLst>
   </p:cSld>
@@ -6361,7 +6436,7 @@
           <p:cNvPr id="2" name="Title 1">
             <a:extLst>
               <a:ext uri="{FF2B5EF4-FFF2-40B4-BE49-F238E27FC236}">
-                <a16:creationId xmlns:a16="http://schemas.microsoft.com/office/drawing/2014/main" id="{D9D1052D-B90E-4951-A48D-DA0E50370EF5}"/>
+                <a16:creationId xmlns:a16="http://schemas.microsoft.com/office/drawing/2014/main" id="{EBC8A360-5809-4304-ADFF-05BBC2ECD839}"/>
               </a:ext>
             </a:extLst>
           </p:cNvPr>
@@ -6379,7 +6454,7 @@
           <a:p>
             <a:r>
               <a:rPr lang="en-US" dirty="0"/>
-              <a:t>Getting Started</a:t>
+              <a:t>Books!!! and other docs</a:t>
             </a:r>
           </a:p>
         </p:txBody>
@@ -6389,7 +6464,7 @@
           <p:cNvPr id="3" name="Content Placeholder 2">
             <a:extLst>
               <a:ext uri="{FF2B5EF4-FFF2-40B4-BE49-F238E27FC236}">
-                <a16:creationId xmlns:a16="http://schemas.microsoft.com/office/drawing/2014/main" id="{341D4FB4-5A4C-4226-8499-E5C40648563E}"/>
+                <a16:creationId xmlns:a16="http://schemas.microsoft.com/office/drawing/2014/main" id="{9C201CBE-0B86-48F5-B183-B9A8C8DE2089}"/>
               </a:ext>
             </a:extLst>
           </p:cNvPr>
@@ -6407,70 +6482,38 @@
           <a:p>
             <a:r>
               <a:rPr lang="en-US" dirty="0"/>
-              <a:t>Navigate to: </a:t>
+              <a:t>Basic Rust Book: </a:t>
             </a:r>
             <a:r>
               <a:rPr lang="en-US" dirty="0">
                 <a:hlinkClick r:id="rId2"/>
               </a:rPr>
-              <a:t>https://www.rust-lang.org/</a:t>
+              <a:t>https://doc.rust-lang.org/book/</a:t>
             </a:r>
             <a:endParaRPr lang="en-US" dirty="0"/>
           </a:p>
           <a:p>
             <a:r>
               <a:rPr lang="en-US" dirty="0"/>
-              <a:t>Follow Instructions to install</a:t>
-            </a:r>
-          </a:p>
-          <a:p>
-            <a:r>
-              <a:rPr lang="en-US" dirty="0"/>
-              <a:t>Use CLI: `cargo new </a:t>
-            </a:r>
-            <a:r>
-              <a:rPr lang="en-US" dirty="0" err="1"/>
-              <a:t>hello_world</a:t>
-            </a:r>
-            <a:r>
-              <a:rPr lang="en-US" dirty="0"/>
-              <a:t>`</a:t>
-            </a:r>
-          </a:p>
-          <a:p>
-            <a:r>
-              <a:rPr lang="en-US" dirty="0"/>
-              <a:t>Navigate to </a:t>
-            </a:r>
-            <a:r>
-              <a:rPr lang="en-US" dirty="0" err="1"/>
-              <a:t>hello_world</a:t>
-            </a:r>
-            <a:r>
-              <a:rPr lang="en-US" dirty="0"/>
-              <a:t> folder</a:t>
-            </a:r>
-          </a:p>
-          <a:p>
-            <a:r>
-              <a:rPr lang="en-US" dirty="0"/>
-              <a:t>Use CLI: `cargo run </a:t>
-            </a:r>
-            <a:r>
-              <a:rPr lang="en-US" dirty="0" err="1"/>
-              <a:t>hello_world</a:t>
-            </a:r>
-            <a:r>
-              <a:rPr lang="en-US" dirty="0"/>
-              <a:t>`</a:t>
-            </a:r>
+              <a:t>Embedded Rust Book: </a:t>
+            </a:r>
+            <a:r>
+              <a:rPr lang="en-US" dirty="0">
+                <a:hlinkClick r:id="rId3"/>
+              </a:rPr>
+              <a:t>https://rust-embedded.github.io/book/intro/index.html</a:t>
+            </a:r>
+            <a:endParaRPr lang="en-US" dirty="0"/>
+          </a:p>
+          <a:p>
+            <a:endParaRPr lang="en-US" dirty="0"/>
           </a:p>
         </p:txBody>
       </p:sp>
     </p:spTree>
     <p:extLst>
       <p:ext uri="{BB962C8B-B14F-4D97-AF65-F5344CB8AC3E}">
-        <p14:creationId xmlns:p14="http://schemas.microsoft.com/office/powerpoint/2010/main" val="1163067433"/>
+        <p14:creationId xmlns:p14="http://schemas.microsoft.com/office/powerpoint/2010/main" val="774428196"/>
       </p:ext>
     </p:extLst>
   </p:cSld>
@@ -6502,7 +6545,7 @@
           <p:cNvPr id="2" name="Title 1">
             <a:extLst>
               <a:ext uri="{FF2B5EF4-FFF2-40B4-BE49-F238E27FC236}">
-                <a16:creationId xmlns:a16="http://schemas.microsoft.com/office/drawing/2014/main" id="{03F2DE0A-72C0-4E6C-B546-2CE22D7D6660}"/>
+                <a16:creationId xmlns:a16="http://schemas.microsoft.com/office/drawing/2014/main" id="{D9D1052D-B90E-4951-A48D-DA0E50370EF5}"/>
               </a:ext>
             </a:extLst>
           </p:cNvPr>
@@ -6520,7 +6563,7 @@
           <a:p>
             <a:r>
               <a:rPr lang="en-US" dirty="0"/>
-              <a:t>No Embedded “Standard Library”</a:t>
+              <a:t>Getting Started</a:t>
             </a:r>
           </a:p>
         </p:txBody>
@@ -6530,7 +6573,7 @@
           <p:cNvPr id="3" name="Content Placeholder 2">
             <a:extLst>
               <a:ext uri="{FF2B5EF4-FFF2-40B4-BE49-F238E27FC236}">
-                <a16:creationId xmlns:a16="http://schemas.microsoft.com/office/drawing/2014/main" id="{574CC8C0-D171-4B9C-90C8-5F6F6852A72E}"/>
+                <a16:creationId xmlns:a16="http://schemas.microsoft.com/office/drawing/2014/main" id="{341D4FB4-5A4C-4226-8499-E5C40648563E}"/>
               </a:ext>
             </a:extLst>
           </p:cNvPr>
@@ -6548,59 +6591,70 @@
           <a:p>
             <a:r>
               <a:rPr lang="en-US" dirty="0"/>
-              <a:t>Embedded devices are small</a:t>
-            </a:r>
-          </a:p>
-          <a:p>
-            <a:r>
-              <a:rPr lang="en-US" dirty="0"/>
-              <a:t>Alternative: </a:t>
+              <a:t>Navigate to: </a:t>
+            </a:r>
+            <a:r>
+              <a:rPr lang="en-US" dirty="0">
+                <a:hlinkClick r:id="rId2"/>
+              </a:rPr>
+              <a:t>https://www.rust-lang.org/</a:t>
+            </a:r>
+            <a:endParaRPr lang="en-US" dirty="0"/>
+          </a:p>
+          <a:p>
+            <a:r>
+              <a:rPr lang="en-US" dirty="0"/>
+              <a:t>Follow Instructions to install</a:t>
+            </a:r>
+          </a:p>
+          <a:p>
+            <a:r>
+              <a:rPr lang="en-US" dirty="0"/>
+              <a:t>Use CLI: `cargo new </a:t>
             </a:r>
             <a:r>
               <a:rPr lang="en-US" dirty="0" err="1"/>
-              <a:t>no_std</a:t>
-            </a:r>
-            <a:endParaRPr lang="en-US" dirty="0"/>
-          </a:p>
-          <a:p>
-            <a:endParaRPr lang="en-US" dirty="0"/>
-          </a:p>
-        </p:txBody>
-      </p:sp>
-      <p:pic>
-        <p:nvPicPr>
-          <p:cNvPr id="6" name="Picture 5">
-            <a:extLst>
-              <a:ext uri="{FF2B5EF4-FFF2-40B4-BE49-F238E27FC236}">
-                <a16:creationId xmlns:a16="http://schemas.microsoft.com/office/drawing/2014/main" id="{73BD517B-A24C-4FEA-9437-CB98DD6DB41E}"/>
-              </a:ext>
-            </a:extLst>
-          </p:cNvPr>
-          <p:cNvPicPr>
-            <a:picLocks noChangeAspect="1"/>
-          </p:cNvPicPr>
-          <p:nvPr/>
-        </p:nvPicPr>
-        <p:blipFill>
-          <a:blip r:embed="rId2"/>
-          <a:stretch>
-            <a:fillRect/>
-          </a:stretch>
-        </p:blipFill>
-        <p:spPr>
-          <a:xfrm>
-            <a:off x="3862552" y="2701741"/>
-            <a:ext cx="7831893" cy="3934743"/>
-          </a:xfrm>
-          <a:prstGeom prst="rect">
-            <a:avLst/>
-          </a:prstGeom>
-        </p:spPr>
-      </p:pic>
+              <a:t>hello_world</a:t>
+            </a:r>
+            <a:r>
+              <a:rPr lang="en-US" dirty="0"/>
+              <a:t>`</a:t>
+            </a:r>
+          </a:p>
+          <a:p>
+            <a:r>
+              <a:rPr lang="en-US" dirty="0"/>
+              <a:t>Navigate to </a:t>
+            </a:r>
+            <a:r>
+              <a:rPr lang="en-US" dirty="0" err="1"/>
+              <a:t>hello_world</a:t>
+            </a:r>
+            <a:r>
+              <a:rPr lang="en-US" dirty="0"/>
+              <a:t> folder</a:t>
+            </a:r>
+          </a:p>
+          <a:p>
+            <a:r>
+              <a:rPr lang="en-US" dirty="0"/>
+              <a:t>Use CLI: `cargo run </a:t>
+            </a:r>
+            <a:r>
+              <a:rPr lang="en-US" dirty="0" err="1"/>
+              <a:t>hello_world</a:t>
+            </a:r>
+            <a:r>
+              <a:rPr lang="en-US" dirty="0"/>
+              <a:t>`</a:t>
+            </a:r>
+          </a:p>
+        </p:txBody>
+      </p:sp>
     </p:spTree>
     <p:extLst>
       <p:ext uri="{BB962C8B-B14F-4D97-AF65-F5344CB8AC3E}">
-        <p14:creationId xmlns:p14="http://schemas.microsoft.com/office/powerpoint/2010/main" val="2008116879"/>
+        <p14:creationId xmlns:p14="http://schemas.microsoft.com/office/powerpoint/2010/main" val="1163067433"/>
       </p:ext>
     </p:extLst>
   </p:cSld>
@@ -6632,7 +6686,7 @@
           <p:cNvPr id="2" name="Title 1">
             <a:extLst>
               <a:ext uri="{FF2B5EF4-FFF2-40B4-BE49-F238E27FC236}">
-                <a16:creationId xmlns:a16="http://schemas.microsoft.com/office/drawing/2014/main" id="{D0CF1325-4C51-4C8F-8423-8E2B25775CC5}"/>
+                <a16:creationId xmlns:a16="http://schemas.microsoft.com/office/drawing/2014/main" id="{03F2DE0A-72C0-4E6C-B546-2CE22D7D6660}"/>
               </a:ext>
             </a:extLst>
           </p:cNvPr>
@@ -6650,7 +6704,7 @@
           <a:p>
             <a:r>
               <a:rPr lang="en-US" dirty="0"/>
-              <a:t>Cargo</a:t>
+              <a:t>No Embedded “Standard Library”</a:t>
             </a:r>
           </a:p>
         </p:txBody>
@@ -6660,7 +6714,7 @@
           <p:cNvPr id="3" name="Content Placeholder 2">
             <a:extLst>
               <a:ext uri="{FF2B5EF4-FFF2-40B4-BE49-F238E27FC236}">
-                <a16:creationId xmlns:a16="http://schemas.microsoft.com/office/drawing/2014/main" id="{63141C8E-60BE-449F-B6B1-1EA358A5B57D}"/>
+                <a16:creationId xmlns:a16="http://schemas.microsoft.com/office/drawing/2014/main" id="{574CC8C0-D171-4B9C-90C8-5F6F6852A72E}"/>
               </a:ext>
             </a:extLst>
           </p:cNvPr>
@@ -6678,26 +6732,59 @@
           <a:p>
             <a:r>
               <a:rPr lang="en-US" dirty="0"/>
-              <a:t>Used for managing app stuff</a:t>
-            </a:r>
-          </a:p>
-          <a:p>
-            <a:r>
-              <a:rPr lang="en-US" dirty="0"/>
-              <a:t>Build/new/download package/</a:t>
+              <a:t>Embedded devices are small</a:t>
+            </a:r>
+          </a:p>
+          <a:p>
+            <a:r>
+              <a:rPr lang="en-US" dirty="0"/>
+              <a:t>Alternative: </a:t>
             </a:r>
             <a:r>
               <a:rPr lang="en-US" dirty="0" err="1"/>
-              <a:t>etc</a:t>
+              <a:t>no_std</a:t>
             </a:r>
             <a:endParaRPr lang="en-US" dirty="0"/>
           </a:p>
-        </p:txBody>
-      </p:sp>
+          <a:p>
+            <a:endParaRPr lang="en-US" dirty="0"/>
+          </a:p>
+        </p:txBody>
+      </p:sp>
+      <p:pic>
+        <p:nvPicPr>
+          <p:cNvPr id="6" name="Picture 5">
+            <a:extLst>
+              <a:ext uri="{FF2B5EF4-FFF2-40B4-BE49-F238E27FC236}">
+                <a16:creationId xmlns:a16="http://schemas.microsoft.com/office/drawing/2014/main" id="{73BD517B-A24C-4FEA-9437-CB98DD6DB41E}"/>
+              </a:ext>
+            </a:extLst>
+          </p:cNvPr>
+          <p:cNvPicPr>
+            <a:picLocks noChangeAspect="1"/>
+          </p:cNvPicPr>
+          <p:nvPr/>
+        </p:nvPicPr>
+        <p:blipFill>
+          <a:blip r:embed="rId2"/>
+          <a:stretch>
+            <a:fillRect/>
+          </a:stretch>
+        </p:blipFill>
+        <p:spPr>
+          <a:xfrm>
+            <a:off x="3862552" y="2701741"/>
+            <a:ext cx="7831893" cy="3934743"/>
+          </a:xfrm>
+          <a:prstGeom prst="rect">
+            <a:avLst/>
+          </a:prstGeom>
+        </p:spPr>
+      </p:pic>
     </p:spTree>
     <p:extLst>
       <p:ext uri="{BB962C8B-B14F-4D97-AF65-F5344CB8AC3E}">
-        <p14:creationId xmlns:p14="http://schemas.microsoft.com/office/powerpoint/2010/main" val="1063557504"/>
+        <p14:creationId xmlns:p14="http://schemas.microsoft.com/office/powerpoint/2010/main" val="2008116879"/>
       </p:ext>
     </p:extLst>
   </p:cSld>

</xml_diff>

<commit_message>
Added things after a dry run
</commit_message>
<xml_diff>
--- a/09-04 - Making the Case for Rust/Making the Case for Rust.pptx
+++ b/09-04 - Making the Case for Rust/Making the Case for Rust.pptx
@@ -5,27 +5,29 @@
     <p:sldMasterId id="2147483648" r:id="rId1"/>
   </p:sldMasterIdLst>
   <p:notesMasterIdLst>
-    <p:notesMasterId r:id="rId20"/>
+    <p:notesMasterId r:id="rId22"/>
   </p:notesMasterIdLst>
   <p:sldIdLst>
     <p:sldId id="256" r:id="rId2"/>
-    <p:sldId id="261" r:id="rId3"/>
-    <p:sldId id="273" r:id="rId4"/>
-    <p:sldId id="260" r:id="rId5"/>
-    <p:sldId id="257" r:id="rId6"/>
-    <p:sldId id="258" r:id="rId7"/>
-    <p:sldId id="259" r:id="rId8"/>
-    <p:sldId id="262" r:id="rId9"/>
-    <p:sldId id="267" r:id="rId10"/>
-    <p:sldId id="266" r:id="rId11"/>
-    <p:sldId id="263" r:id="rId12"/>
+    <p:sldId id="275" r:id="rId3"/>
+    <p:sldId id="276" r:id="rId4"/>
+    <p:sldId id="261" r:id="rId5"/>
+    <p:sldId id="260" r:id="rId6"/>
+    <p:sldId id="274" r:id="rId7"/>
+    <p:sldId id="273" r:id="rId8"/>
+    <p:sldId id="257" r:id="rId9"/>
+    <p:sldId id="258" r:id="rId10"/>
+    <p:sldId id="259" r:id="rId11"/>
+    <p:sldId id="262" r:id="rId12"/>
     <p:sldId id="264" r:id="rId13"/>
     <p:sldId id="268" r:id="rId14"/>
     <p:sldId id="272" r:id="rId15"/>
     <p:sldId id="269" r:id="rId16"/>
     <p:sldId id="270" r:id="rId17"/>
-    <p:sldId id="271" r:id="rId18"/>
-    <p:sldId id="265" r:id="rId19"/>
+    <p:sldId id="267" r:id="rId18"/>
+    <p:sldId id="266" r:id="rId19"/>
+    <p:sldId id="263" r:id="rId20"/>
+    <p:sldId id="271" r:id="rId21"/>
   </p:sldIdLst>
   <p:sldSz cx="12192000" cy="6858000"/>
   <p:notesSz cx="6858000" cy="9144000"/>
@@ -214,7 +216,7 @@
           <a:p>
             <a:fld id="{427BEAE6-7F5E-44C7-AA01-D551108D503B}" type="datetimeFigureOut">
               <a:rPr lang="en-US" smtClean="0"/>
-              <a:t>11/4/2019</a:t>
+              <a:t>11/10/2019</a:t>
             </a:fld>
             <a:endParaRPr lang="en-US"/>
           </a:p>
@@ -552,7 +554,7 @@
           <a:p>
             <a:fld id="{2C394F0E-C712-487E-B1FC-CE9069FFBDEB}" type="slidenum">
               <a:rPr lang="en-US" smtClean="0"/>
-              <a:t>11</a:t>
+              <a:t>19</a:t>
             </a:fld>
             <a:endParaRPr lang="en-US"/>
           </a:p>
@@ -718,7 +720,7 @@
           <a:p>
             <a:fld id="{5626CA67-F505-4C48-AD4A-1EC18FAC153A}" type="datetimeFigureOut">
               <a:rPr lang="en-US" smtClean="0"/>
-              <a:t>11/4/2019</a:t>
+              <a:t>11/10/2019</a:t>
             </a:fld>
             <a:endParaRPr lang="en-US"/>
           </a:p>
@@ -916,7 +918,7 @@
           <a:p>
             <a:fld id="{5626CA67-F505-4C48-AD4A-1EC18FAC153A}" type="datetimeFigureOut">
               <a:rPr lang="en-US" smtClean="0"/>
-              <a:t>11/4/2019</a:t>
+              <a:t>11/10/2019</a:t>
             </a:fld>
             <a:endParaRPr lang="en-US"/>
           </a:p>
@@ -1124,7 +1126,7 @@
           <a:p>
             <a:fld id="{5626CA67-F505-4C48-AD4A-1EC18FAC153A}" type="datetimeFigureOut">
               <a:rPr lang="en-US" smtClean="0"/>
-              <a:t>11/4/2019</a:t>
+              <a:t>11/10/2019</a:t>
             </a:fld>
             <a:endParaRPr lang="en-US"/>
           </a:p>
@@ -1322,7 +1324,7 @@
           <a:p>
             <a:fld id="{5626CA67-F505-4C48-AD4A-1EC18FAC153A}" type="datetimeFigureOut">
               <a:rPr lang="en-US" smtClean="0"/>
-              <a:t>11/4/2019</a:t>
+              <a:t>11/10/2019</a:t>
             </a:fld>
             <a:endParaRPr lang="en-US"/>
           </a:p>
@@ -1597,7 +1599,7 @@
           <a:p>
             <a:fld id="{5626CA67-F505-4C48-AD4A-1EC18FAC153A}" type="datetimeFigureOut">
               <a:rPr lang="en-US" smtClean="0"/>
-              <a:t>11/4/2019</a:t>
+              <a:t>11/10/2019</a:t>
             </a:fld>
             <a:endParaRPr lang="en-US"/>
           </a:p>
@@ -1862,7 +1864,7 @@
           <a:p>
             <a:fld id="{5626CA67-F505-4C48-AD4A-1EC18FAC153A}" type="datetimeFigureOut">
               <a:rPr lang="en-US" smtClean="0"/>
-              <a:t>11/4/2019</a:t>
+              <a:t>11/10/2019</a:t>
             </a:fld>
             <a:endParaRPr lang="en-US"/>
           </a:p>
@@ -2274,7 +2276,7 @@
           <a:p>
             <a:fld id="{5626CA67-F505-4C48-AD4A-1EC18FAC153A}" type="datetimeFigureOut">
               <a:rPr lang="en-US" smtClean="0"/>
-              <a:t>11/4/2019</a:t>
+              <a:t>11/10/2019</a:t>
             </a:fld>
             <a:endParaRPr lang="en-US"/>
           </a:p>
@@ -2415,7 +2417,7 @@
           <a:p>
             <a:fld id="{5626CA67-F505-4C48-AD4A-1EC18FAC153A}" type="datetimeFigureOut">
               <a:rPr lang="en-US" smtClean="0"/>
-              <a:t>11/4/2019</a:t>
+              <a:t>11/10/2019</a:t>
             </a:fld>
             <a:endParaRPr lang="en-US"/>
           </a:p>
@@ -2528,7 +2530,7 @@
           <a:p>
             <a:fld id="{5626CA67-F505-4C48-AD4A-1EC18FAC153A}" type="datetimeFigureOut">
               <a:rPr lang="en-US" smtClean="0"/>
-              <a:t>11/4/2019</a:t>
+              <a:t>11/10/2019</a:t>
             </a:fld>
             <a:endParaRPr lang="en-US"/>
           </a:p>
@@ -2839,7 +2841,7 @@
           <a:p>
             <a:fld id="{5626CA67-F505-4C48-AD4A-1EC18FAC153A}" type="datetimeFigureOut">
               <a:rPr lang="en-US" smtClean="0"/>
-              <a:t>11/4/2019</a:t>
+              <a:t>11/10/2019</a:t>
             </a:fld>
             <a:endParaRPr lang="en-US"/>
           </a:p>
@@ -3127,7 +3129,7 @@
           <a:p>
             <a:fld id="{5626CA67-F505-4C48-AD4A-1EC18FAC153A}" type="datetimeFigureOut">
               <a:rPr lang="en-US" smtClean="0"/>
-              <a:t>11/4/2019</a:t>
+              <a:t>11/10/2019</a:t>
             </a:fld>
             <a:endParaRPr lang="en-US"/>
           </a:p>
@@ -3368,7 +3370,7 @@
           <a:p>
             <a:fld id="{5626CA67-F505-4C48-AD4A-1EC18FAC153A}" type="datetimeFigureOut">
               <a:rPr lang="en-US" smtClean="0"/>
-              <a:t>11/4/2019</a:t>
+              <a:t>11/10/2019</a:t>
             </a:fld>
             <a:endParaRPr lang="en-US"/>
           </a:p>
@@ -3907,7 +3909,7 @@
           <p:cNvPr id="2" name="Title 1">
             <a:extLst>
               <a:ext uri="{FF2B5EF4-FFF2-40B4-BE49-F238E27FC236}">
-                <a16:creationId xmlns:a16="http://schemas.microsoft.com/office/drawing/2014/main" id="{D0CF1325-4C51-4C8F-8423-8E2B25775CC5}"/>
+                <a16:creationId xmlns:a16="http://schemas.microsoft.com/office/drawing/2014/main" id="{EBC8A360-5809-4304-ADFF-05BBC2ECD839}"/>
               </a:ext>
             </a:extLst>
           </p:cNvPr>
@@ -3925,7 +3927,7 @@
           <a:p>
             <a:r>
               <a:rPr lang="en-US" dirty="0"/>
-              <a:t>Cargo</a:t>
+              <a:t>Books!!! and other docs</a:t>
             </a:r>
           </a:p>
         </p:txBody>
@@ -3935,7 +3937,7 @@
           <p:cNvPr id="3" name="Content Placeholder 2">
             <a:extLst>
               <a:ext uri="{FF2B5EF4-FFF2-40B4-BE49-F238E27FC236}">
-                <a16:creationId xmlns:a16="http://schemas.microsoft.com/office/drawing/2014/main" id="{63141C8E-60BE-449F-B6B1-1EA358A5B57D}"/>
+                <a16:creationId xmlns:a16="http://schemas.microsoft.com/office/drawing/2014/main" id="{9C201CBE-0B86-48F5-B183-B9A8C8DE2089}"/>
               </a:ext>
             </a:extLst>
           </p:cNvPr>
@@ -3953,18 +3955,30 @@
           <a:p>
             <a:r>
               <a:rPr lang="en-US" dirty="0"/>
-              <a:t>Used for managing app stuff</a:t>
-            </a:r>
-          </a:p>
-          <a:p>
-            <a:r>
-              <a:rPr lang="en-US" dirty="0"/>
-              <a:t>Build/new/download package/</a:t>
-            </a:r>
-            <a:r>
-              <a:rPr lang="en-US" dirty="0" err="1"/>
-              <a:t>etc</a:t>
-            </a:r>
+              <a:t>Basic Rust Book: </a:t>
+            </a:r>
+            <a:r>
+              <a:rPr lang="en-US" dirty="0">
+                <a:hlinkClick r:id="rId2"/>
+              </a:rPr>
+              <a:t>https://doc.rust-lang.org/book/</a:t>
+            </a:r>
+            <a:endParaRPr lang="en-US" dirty="0"/>
+          </a:p>
+          <a:p>
+            <a:r>
+              <a:rPr lang="en-US" dirty="0"/>
+              <a:t>Embedded Rust Book: </a:t>
+            </a:r>
+            <a:r>
+              <a:rPr lang="en-US" dirty="0">
+                <a:hlinkClick r:id="rId3"/>
+              </a:rPr>
+              <a:t>https://rust-embedded.github.io/book/intro/index.html</a:t>
+            </a:r>
+            <a:endParaRPr lang="en-US" dirty="0"/>
+          </a:p>
+          <a:p>
             <a:endParaRPr lang="en-US" dirty="0"/>
           </a:p>
         </p:txBody>
@@ -3972,7 +3986,7 @@
     </p:spTree>
     <p:extLst>
       <p:ext uri="{BB962C8B-B14F-4D97-AF65-F5344CB8AC3E}">
-        <p14:creationId xmlns:p14="http://schemas.microsoft.com/office/powerpoint/2010/main" val="1063557504"/>
+        <p14:creationId xmlns:p14="http://schemas.microsoft.com/office/powerpoint/2010/main" val="774428196"/>
       </p:ext>
     </p:extLst>
   </p:cSld>
@@ -4004,7 +4018,7 @@
           <p:cNvPr id="2" name="Title 1">
             <a:extLst>
               <a:ext uri="{FF2B5EF4-FFF2-40B4-BE49-F238E27FC236}">
-                <a16:creationId xmlns:a16="http://schemas.microsoft.com/office/drawing/2014/main" id="{CE5573C2-CF2A-4D6B-95EE-098267EC5A8E}"/>
+                <a16:creationId xmlns:a16="http://schemas.microsoft.com/office/drawing/2014/main" id="{D9D1052D-B90E-4951-A48D-DA0E50370EF5}"/>
               </a:ext>
             </a:extLst>
           </p:cNvPr>
@@ -4022,7 +4036,7 @@
           <a:p>
             <a:r>
               <a:rPr lang="en-US" dirty="0"/>
-              <a:t>Crates</a:t>
+              <a:t>Getting Started</a:t>
             </a:r>
           </a:p>
         </p:txBody>
@@ -4032,7 +4046,7 @@
           <p:cNvPr id="3" name="Content Placeholder 2">
             <a:extLst>
               <a:ext uri="{FF2B5EF4-FFF2-40B4-BE49-F238E27FC236}">
-                <a16:creationId xmlns:a16="http://schemas.microsoft.com/office/drawing/2014/main" id="{46BD3879-726E-4CE9-BF40-AFA3E2713707}"/>
+                <a16:creationId xmlns:a16="http://schemas.microsoft.com/office/drawing/2014/main" id="{341D4FB4-5A4C-4226-8499-E5C40648563E}"/>
               </a:ext>
             </a:extLst>
           </p:cNvPr>
@@ -4050,45 +4064,70 @@
           <a:p>
             <a:r>
               <a:rPr lang="en-US" dirty="0"/>
-              <a:t>Built in package manager</a:t>
-            </a:r>
-          </a:p>
-          <a:p>
-            <a:r>
-              <a:rPr lang="en-US" dirty="0"/>
-              <a:t>Creates for embedded dev</a:t>
-            </a:r>
-          </a:p>
-          <a:p>
-            <a:pPr lvl="1"/>
-            <a:r>
-              <a:rPr lang="en-US" dirty="0"/>
-              <a:t>For specific board</a:t>
-            </a:r>
-          </a:p>
-          <a:p>
-            <a:pPr lvl="1"/>
-            <a:r>
-              <a:rPr lang="en-US" dirty="0"/>
-              <a:t>Peripherals like serial port</a:t>
-            </a:r>
-          </a:p>
-          <a:p>
-            <a:pPr lvl="1"/>
-            <a:r>
-              <a:rPr lang="en-US" dirty="0"/>
-              <a:t>Just like a library from the manufacturer in C/C++</a:t>
-            </a:r>
-          </a:p>
-          <a:p>
+              <a:t>Navigate to: </a:t>
+            </a:r>
+            <a:r>
+              <a:rPr lang="en-US" dirty="0">
+                <a:hlinkClick r:id="rId2"/>
+              </a:rPr>
+              <a:t>https://www.rust-lang.org/</a:t>
+            </a:r>
             <a:endParaRPr lang="en-US" dirty="0"/>
+          </a:p>
+          <a:p>
+            <a:r>
+              <a:rPr lang="en-US" dirty="0"/>
+              <a:t>Follow Instructions to install</a:t>
+            </a:r>
+          </a:p>
+          <a:p>
+            <a:r>
+              <a:rPr lang="en-US" dirty="0"/>
+              <a:t>Use CLI: `cargo new </a:t>
+            </a:r>
+            <a:r>
+              <a:rPr lang="en-US" dirty="0" err="1"/>
+              <a:t>hello_world</a:t>
+            </a:r>
+            <a:r>
+              <a:rPr lang="en-US" dirty="0"/>
+              <a:t>`</a:t>
+            </a:r>
+          </a:p>
+          <a:p>
+            <a:r>
+              <a:rPr lang="en-US" dirty="0"/>
+              <a:t>Navigate to </a:t>
+            </a:r>
+            <a:r>
+              <a:rPr lang="en-US" dirty="0" err="1"/>
+              <a:t>hello_world</a:t>
+            </a:r>
+            <a:r>
+              <a:rPr lang="en-US" dirty="0"/>
+              <a:t> folder</a:t>
+            </a:r>
+          </a:p>
+          <a:p>
+            <a:r>
+              <a:rPr lang="en-US" dirty="0"/>
+              <a:t>Use CLI: `cargo run </a:t>
+            </a:r>
+            <a:r>
+              <a:rPr lang="en-US" dirty="0" err="1"/>
+              <a:t>hello_world</a:t>
+            </a:r>
+            <a:r>
+              <a:rPr lang="en-US" dirty="0"/>
+              <a:t>`</a:t>
+            </a:r>
           </a:p>
         </p:txBody>
       </p:sp>
     </p:spTree>
     <p:extLst>
       <p:ext uri="{BB962C8B-B14F-4D97-AF65-F5344CB8AC3E}">
-        <p14:creationId xmlns:p14="http://schemas.microsoft.com/office/powerpoint/2010/main" val="3421545788"/>
+        <p14:creationId xmlns:p14="http://schemas.microsoft.com/office/powerpoint/2010/main" val="1163067433"/>
       </p:ext>
     </p:extLst>
   </p:cSld>
@@ -4427,10 +4466,71 @@
           <a:bodyPr/>
           <a:lstStyle/>
           <a:p>
-            <a:endParaRPr lang="en-US"/>
-          </a:p>
-        </p:txBody>
-      </p:sp>
+            <a:r>
+              <a:rPr lang="en-US" dirty="0"/>
+              <a:t>Standard Collection: Vector</a:t>
+            </a:r>
+          </a:p>
+          <a:p>
+            <a:r>
+              <a:rPr lang="en-US" dirty="0"/>
+              <a:t>Generic: </a:t>
+            </a:r>
+            <a:r>
+              <a:rPr lang="en-US" dirty="0" err="1"/>
+              <a:t>Vec</a:t>
+            </a:r>
+            <a:r>
+              <a:rPr lang="en-US" dirty="0"/>
+              <a:t>&lt;i32&gt; creates collection for 32-bit </a:t>
+            </a:r>
+            <a:r>
+              <a:rPr lang="en-US" dirty="0" err="1"/>
+              <a:t>ints</a:t>
+            </a:r>
+            <a:endParaRPr lang="en-US" dirty="0"/>
+          </a:p>
+          <a:p>
+            <a:r>
+              <a:rPr lang="en-US" dirty="0"/>
+              <a:t>Add items by calling .push()</a:t>
+            </a:r>
+          </a:p>
+          <a:p>
+            <a:endParaRPr lang="en-US" dirty="0"/>
+          </a:p>
+        </p:txBody>
+      </p:sp>
+      <p:pic>
+        <p:nvPicPr>
+          <p:cNvPr id="4" name="Picture 3">
+            <a:extLst>
+              <a:ext uri="{FF2B5EF4-FFF2-40B4-BE49-F238E27FC236}">
+                <a16:creationId xmlns:a16="http://schemas.microsoft.com/office/drawing/2014/main" id="{6040E105-E967-48F5-9E6F-5F9407BB512B}"/>
+              </a:ext>
+            </a:extLst>
+          </p:cNvPr>
+          <p:cNvPicPr>
+            <a:picLocks noChangeAspect="1"/>
+          </p:cNvPicPr>
+          <p:nvPr/>
+        </p:nvPicPr>
+        <p:blipFill>
+          <a:blip r:embed="rId2"/>
+          <a:stretch>
+            <a:fillRect/>
+          </a:stretch>
+        </p:blipFill>
+        <p:spPr>
+          <a:xfrm>
+            <a:off x="2352240" y="4159526"/>
+            <a:ext cx="7351889" cy="2399478"/>
+          </a:xfrm>
+          <a:prstGeom prst="rect">
+            <a:avLst/>
+          </a:prstGeom>
+        </p:spPr>
+      </p:pic>
     </p:spTree>
     <p:extLst>
       <p:ext uri="{BB962C8B-B14F-4D97-AF65-F5344CB8AC3E}">
@@ -4727,7 +4827,7 @@
           <p:cNvPr id="2" name="Title 1">
             <a:extLst>
               <a:ext uri="{FF2B5EF4-FFF2-40B4-BE49-F238E27FC236}">
-                <a16:creationId xmlns:a16="http://schemas.microsoft.com/office/drawing/2014/main" id="{49900D82-A889-411B-98D6-61B26E45BA23}"/>
+                <a16:creationId xmlns:a16="http://schemas.microsoft.com/office/drawing/2014/main" id="{03F2DE0A-72C0-4E6C-B546-2CE22D7D6660}"/>
               </a:ext>
             </a:extLst>
           </p:cNvPr>
@@ -4745,7 +4845,7 @@
           <a:p>
             <a:r>
               <a:rPr lang="en-US" dirty="0"/>
-              <a:t>Unit Testing</a:t>
+              <a:t>No Embedded “Standard Library”</a:t>
             </a:r>
           </a:p>
         </p:txBody>
@@ -4755,7 +4855,7 @@
           <p:cNvPr id="3" name="Content Placeholder 2">
             <a:extLst>
               <a:ext uri="{FF2B5EF4-FFF2-40B4-BE49-F238E27FC236}">
-                <a16:creationId xmlns:a16="http://schemas.microsoft.com/office/drawing/2014/main" id="{8B918F0D-4C59-434C-B630-957EC324CD8C}"/>
+                <a16:creationId xmlns:a16="http://schemas.microsoft.com/office/drawing/2014/main" id="{574CC8C0-D171-4B9C-90C8-5F6F6852A72E}"/>
               </a:ext>
             </a:extLst>
           </p:cNvPr>
@@ -4771,14 +4871,61 @@
           <a:bodyPr/>
           <a:lstStyle/>
           <a:p>
-            <a:endParaRPr lang="en-US"/>
-          </a:p>
-        </p:txBody>
-      </p:sp>
+            <a:r>
+              <a:rPr lang="en-US" dirty="0"/>
+              <a:t>Embedded devices are small</a:t>
+            </a:r>
+          </a:p>
+          <a:p>
+            <a:r>
+              <a:rPr lang="en-US" dirty="0"/>
+              <a:t>Alternative: </a:t>
+            </a:r>
+            <a:r>
+              <a:rPr lang="en-US" dirty="0" err="1"/>
+              <a:t>no_std</a:t>
+            </a:r>
+            <a:endParaRPr lang="en-US" dirty="0"/>
+          </a:p>
+          <a:p>
+            <a:endParaRPr lang="en-US" dirty="0"/>
+          </a:p>
+        </p:txBody>
+      </p:sp>
+      <p:pic>
+        <p:nvPicPr>
+          <p:cNvPr id="6" name="Picture 5">
+            <a:extLst>
+              <a:ext uri="{FF2B5EF4-FFF2-40B4-BE49-F238E27FC236}">
+                <a16:creationId xmlns:a16="http://schemas.microsoft.com/office/drawing/2014/main" id="{73BD517B-A24C-4FEA-9437-CB98DD6DB41E}"/>
+              </a:ext>
+            </a:extLst>
+          </p:cNvPr>
+          <p:cNvPicPr>
+            <a:picLocks noChangeAspect="1"/>
+          </p:cNvPicPr>
+          <p:nvPr/>
+        </p:nvPicPr>
+        <p:blipFill>
+          <a:blip r:embed="rId2"/>
+          <a:stretch>
+            <a:fillRect/>
+          </a:stretch>
+        </p:blipFill>
+        <p:spPr>
+          <a:xfrm>
+            <a:off x="3862552" y="2701741"/>
+            <a:ext cx="7831893" cy="3934743"/>
+          </a:xfrm>
+          <a:prstGeom prst="rect">
+            <a:avLst/>
+          </a:prstGeom>
+        </p:spPr>
+      </p:pic>
     </p:spTree>
     <p:extLst>
       <p:ext uri="{BB962C8B-B14F-4D97-AF65-F5344CB8AC3E}">
-        <p14:creationId xmlns:p14="http://schemas.microsoft.com/office/powerpoint/2010/main" val="1909587117"/>
+        <p14:creationId xmlns:p14="http://schemas.microsoft.com/office/powerpoint/2010/main" val="2008116879"/>
       </p:ext>
     </p:extLst>
   </p:cSld>
@@ -4810,7 +4957,7 @@
           <p:cNvPr id="2" name="Title 1">
             <a:extLst>
               <a:ext uri="{FF2B5EF4-FFF2-40B4-BE49-F238E27FC236}">
-                <a16:creationId xmlns:a16="http://schemas.microsoft.com/office/drawing/2014/main" id="{B8C25872-1BED-49CF-BBD1-CBE92C5416B5}"/>
+                <a16:creationId xmlns:a16="http://schemas.microsoft.com/office/drawing/2014/main" id="{D0CF1325-4C51-4C8F-8423-8E2B25775CC5}"/>
               </a:ext>
             </a:extLst>
           </p:cNvPr>
@@ -4826,7 +4973,10 @@
           <a:bodyPr/>
           <a:lstStyle/>
           <a:p>
-            <a:endParaRPr lang="en-US"/>
+            <a:r>
+              <a:rPr lang="en-US" dirty="0"/>
+              <a:t>Cargo</a:t>
+            </a:r>
           </a:p>
         </p:txBody>
       </p:sp>
@@ -4835,7 +4985,7 @@
           <p:cNvPr id="3" name="Content Placeholder 2">
             <a:extLst>
               <a:ext uri="{FF2B5EF4-FFF2-40B4-BE49-F238E27FC236}">
-                <a16:creationId xmlns:a16="http://schemas.microsoft.com/office/drawing/2014/main" id="{D649A98E-9ED7-4639-BAA9-EB265C55BBB6}"/>
+                <a16:creationId xmlns:a16="http://schemas.microsoft.com/office/drawing/2014/main" id="{63141C8E-60BE-449F-B6B1-1EA358A5B57D}"/>
               </a:ext>
             </a:extLst>
           </p:cNvPr>
@@ -4851,14 +5001,144 @@
           <a:bodyPr/>
           <a:lstStyle/>
           <a:p>
-            <a:endParaRPr lang="en-US"/>
+            <a:r>
+              <a:rPr lang="en-US" dirty="0"/>
+              <a:t>Used for managing app stuff</a:t>
+            </a:r>
+          </a:p>
+          <a:p>
+            <a:r>
+              <a:rPr lang="en-US" dirty="0"/>
+              <a:t>Build/new/download package/</a:t>
+            </a:r>
+            <a:r>
+              <a:rPr lang="en-US" dirty="0" err="1"/>
+              <a:t>etc</a:t>
+            </a:r>
+            <a:endParaRPr lang="en-US" dirty="0"/>
           </a:p>
         </p:txBody>
       </p:sp>
     </p:spTree>
     <p:extLst>
       <p:ext uri="{BB962C8B-B14F-4D97-AF65-F5344CB8AC3E}">
-        <p14:creationId xmlns:p14="http://schemas.microsoft.com/office/powerpoint/2010/main" val="1482016117"/>
+        <p14:creationId xmlns:p14="http://schemas.microsoft.com/office/powerpoint/2010/main" val="1063557504"/>
+      </p:ext>
+    </p:extLst>
+  </p:cSld>
+  <p:clrMapOvr>
+    <a:masterClrMapping/>
+  </p:clrMapOvr>
+</p:sld>
+</file>
+
+<file path=ppt/slides/slide19.xml><?xml version="1.0" encoding="utf-8"?>
+<p:sld xmlns:a="http://schemas.openxmlformats.org/drawingml/2006/main" xmlns:r="http://schemas.openxmlformats.org/officeDocument/2006/relationships" xmlns:p="http://schemas.openxmlformats.org/presentationml/2006/main">
+  <p:cSld>
+    <p:spTree>
+      <p:nvGrpSpPr>
+        <p:cNvPr id="1" name=""/>
+        <p:cNvGrpSpPr/>
+        <p:nvPr/>
+      </p:nvGrpSpPr>
+      <p:grpSpPr>
+        <a:xfrm>
+          <a:off x="0" y="0"/>
+          <a:ext cx="0" cy="0"/>
+          <a:chOff x="0" y="0"/>
+          <a:chExt cx="0" cy="0"/>
+        </a:xfrm>
+      </p:grpSpPr>
+      <p:sp>
+        <p:nvSpPr>
+          <p:cNvPr id="2" name="Title 1">
+            <a:extLst>
+              <a:ext uri="{FF2B5EF4-FFF2-40B4-BE49-F238E27FC236}">
+                <a16:creationId xmlns:a16="http://schemas.microsoft.com/office/drawing/2014/main" id="{CE5573C2-CF2A-4D6B-95EE-098267EC5A8E}"/>
+              </a:ext>
+            </a:extLst>
+          </p:cNvPr>
+          <p:cNvSpPr>
+            <a:spLocks noGrp="1"/>
+          </p:cNvSpPr>
+          <p:nvPr>
+            <p:ph type="title"/>
+          </p:nvPr>
+        </p:nvSpPr>
+        <p:spPr/>
+        <p:txBody>
+          <a:bodyPr/>
+          <a:lstStyle/>
+          <a:p>
+            <a:r>
+              <a:rPr lang="en-US" dirty="0"/>
+              <a:t>Crates</a:t>
+            </a:r>
+          </a:p>
+        </p:txBody>
+      </p:sp>
+      <p:sp>
+        <p:nvSpPr>
+          <p:cNvPr id="3" name="Content Placeholder 2">
+            <a:extLst>
+              <a:ext uri="{FF2B5EF4-FFF2-40B4-BE49-F238E27FC236}">
+                <a16:creationId xmlns:a16="http://schemas.microsoft.com/office/drawing/2014/main" id="{46BD3879-726E-4CE9-BF40-AFA3E2713707}"/>
+              </a:ext>
+            </a:extLst>
+          </p:cNvPr>
+          <p:cNvSpPr>
+            <a:spLocks noGrp="1"/>
+          </p:cNvSpPr>
+          <p:nvPr>
+            <p:ph idx="1"/>
+          </p:nvPr>
+        </p:nvSpPr>
+        <p:spPr/>
+        <p:txBody>
+          <a:bodyPr/>
+          <a:lstStyle/>
+          <a:p>
+            <a:r>
+              <a:rPr lang="en-US" dirty="0"/>
+              <a:t>Built in package manager</a:t>
+            </a:r>
+          </a:p>
+          <a:p>
+            <a:r>
+              <a:rPr lang="en-US" dirty="0"/>
+              <a:t>Creates for embedded dev</a:t>
+            </a:r>
+          </a:p>
+          <a:p>
+            <a:pPr lvl="1"/>
+            <a:r>
+              <a:rPr lang="en-US" dirty="0"/>
+              <a:t>For specific board</a:t>
+            </a:r>
+          </a:p>
+          <a:p>
+            <a:pPr lvl="1"/>
+            <a:r>
+              <a:rPr lang="en-US" dirty="0"/>
+              <a:t>Peripherals like serial port</a:t>
+            </a:r>
+          </a:p>
+          <a:p>
+            <a:pPr lvl="1"/>
+            <a:r>
+              <a:rPr lang="en-US" dirty="0"/>
+              <a:t>Just like a library from the manufacturer in C/C++</a:t>
+            </a:r>
+          </a:p>
+          <a:p>
+            <a:endParaRPr lang="en-US" dirty="0"/>
+          </a:p>
+        </p:txBody>
+      </p:sp>
+    </p:spTree>
+    <p:extLst>
+      <p:ext uri="{BB962C8B-B14F-4D97-AF65-F5344CB8AC3E}">
+        <p14:creationId xmlns:p14="http://schemas.microsoft.com/office/powerpoint/2010/main" val="3421545788"/>
       </p:ext>
     </p:extLst>
   </p:cSld>
@@ -4869,6 +5149,332 @@
 </file>
 
 <file path=ppt/slides/slide2.xml><?xml version="1.0" encoding="utf-8"?>
+<p:sld xmlns:a="http://schemas.openxmlformats.org/drawingml/2006/main" xmlns:r="http://schemas.openxmlformats.org/officeDocument/2006/relationships" xmlns:p="http://schemas.openxmlformats.org/presentationml/2006/main">
+  <p:cSld>
+    <p:spTree>
+      <p:nvGrpSpPr>
+        <p:cNvPr id="1" name=""/>
+        <p:cNvGrpSpPr/>
+        <p:nvPr/>
+      </p:nvGrpSpPr>
+      <p:grpSpPr>
+        <a:xfrm>
+          <a:off x="0" y="0"/>
+          <a:ext cx="0" cy="0"/>
+          <a:chOff x="0" y="0"/>
+          <a:chExt cx="0" cy="0"/>
+        </a:xfrm>
+      </p:grpSpPr>
+      <p:sp>
+        <p:nvSpPr>
+          <p:cNvPr id="2" name="Title 1">
+            <a:extLst>
+              <a:ext uri="{FF2B5EF4-FFF2-40B4-BE49-F238E27FC236}">
+                <a16:creationId xmlns:a16="http://schemas.microsoft.com/office/drawing/2014/main" id="{F7A46CC8-79F0-4A4F-85B9-F2CE6404A8C0}"/>
+              </a:ext>
+            </a:extLst>
+          </p:cNvPr>
+          <p:cNvSpPr>
+            <a:spLocks noGrp="1"/>
+          </p:cNvSpPr>
+          <p:nvPr>
+            <p:ph type="title"/>
+          </p:nvPr>
+        </p:nvSpPr>
+        <p:spPr/>
+        <p:txBody>
+          <a:bodyPr/>
+          <a:lstStyle/>
+          <a:p>
+            <a:r>
+              <a:rPr lang="en-US" dirty="0"/>
+              <a:t>What this talk is</a:t>
+            </a:r>
+          </a:p>
+        </p:txBody>
+      </p:sp>
+      <p:sp>
+        <p:nvSpPr>
+          <p:cNvPr id="3" name="Content Placeholder 2">
+            <a:extLst>
+              <a:ext uri="{FF2B5EF4-FFF2-40B4-BE49-F238E27FC236}">
+                <a16:creationId xmlns:a16="http://schemas.microsoft.com/office/drawing/2014/main" id="{24D30CA5-A514-4CE6-AB59-B2A26401398D}"/>
+              </a:ext>
+            </a:extLst>
+          </p:cNvPr>
+          <p:cNvSpPr>
+            <a:spLocks noGrp="1"/>
+          </p:cNvSpPr>
+          <p:nvPr>
+            <p:ph idx="1"/>
+          </p:nvPr>
+        </p:nvSpPr>
+        <p:spPr/>
+        <p:txBody>
+          <a:bodyPr/>
+          <a:lstStyle/>
+          <a:p>
+            <a:r>
+              <a:rPr lang="en-US" dirty="0"/>
+              <a:t>Intro to Rust</a:t>
+            </a:r>
+          </a:p>
+          <a:p>
+            <a:r>
+              <a:rPr lang="en-US" dirty="0"/>
+              <a:t>Some code examples</a:t>
+            </a:r>
+          </a:p>
+          <a:p>
+            <a:r>
+              <a:rPr lang="en-US" dirty="0"/>
+              <a:t>Not a deep dive</a:t>
+            </a:r>
+          </a:p>
+        </p:txBody>
+      </p:sp>
+    </p:spTree>
+    <p:extLst>
+      <p:ext uri="{BB962C8B-B14F-4D97-AF65-F5344CB8AC3E}">
+        <p14:creationId xmlns:p14="http://schemas.microsoft.com/office/powerpoint/2010/main" val="2336811404"/>
+      </p:ext>
+    </p:extLst>
+  </p:cSld>
+  <p:clrMapOvr>
+    <a:masterClrMapping/>
+  </p:clrMapOvr>
+</p:sld>
+</file>
+
+<file path=ppt/slides/slide20.xml><?xml version="1.0" encoding="utf-8"?>
+<p:sld xmlns:a="http://schemas.openxmlformats.org/drawingml/2006/main" xmlns:r="http://schemas.openxmlformats.org/officeDocument/2006/relationships" xmlns:p="http://schemas.openxmlformats.org/presentationml/2006/main">
+  <p:cSld>
+    <p:spTree>
+      <p:nvGrpSpPr>
+        <p:cNvPr id="1" name=""/>
+        <p:cNvGrpSpPr/>
+        <p:nvPr/>
+      </p:nvGrpSpPr>
+      <p:grpSpPr>
+        <a:xfrm>
+          <a:off x="0" y="0"/>
+          <a:ext cx="0" cy="0"/>
+          <a:chOff x="0" y="0"/>
+          <a:chExt cx="0" cy="0"/>
+        </a:xfrm>
+      </p:grpSpPr>
+      <p:sp>
+        <p:nvSpPr>
+          <p:cNvPr id="2" name="Title 1">
+            <a:extLst>
+              <a:ext uri="{FF2B5EF4-FFF2-40B4-BE49-F238E27FC236}">
+                <a16:creationId xmlns:a16="http://schemas.microsoft.com/office/drawing/2014/main" id="{49900D82-A889-411B-98D6-61B26E45BA23}"/>
+              </a:ext>
+            </a:extLst>
+          </p:cNvPr>
+          <p:cNvSpPr>
+            <a:spLocks noGrp="1"/>
+          </p:cNvSpPr>
+          <p:nvPr>
+            <p:ph type="title"/>
+          </p:nvPr>
+        </p:nvSpPr>
+        <p:spPr/>
+        <p:txBody>
+          <a:bodyPr/>
+          <a:lstStyle/>
+          <a:p>
+            <a:r>
+              <a:rPr lang="en-US" dirty="0"/>
+              <a:t>Unit Testing</a:t>
+            </a:r>
+          </a:p>
+        </p:txBody>
+      </p:sp>
+      <p:sp>
+        <p:nvSpPr>
+          <p:cNvPr id="3" name="Content Placeholder 2">
+            <a:extLst>
+              <a:ext uri="{FF2B5EF4-FFF2-40B4-BE49-F238E27FC236}">
+                <a16:creationId xmlns:a16="http://schemas.microsoft.com/office/drawing/2014/main" id="{8B918F0D-4C59-434C-B630-957EC324CD8C}"/>
+              </a:ext>
+            </a:extLst>
+          </p:cNvPr>
+          <p:cNvSpPr>
+            <a:spLocks noGrp="1"/>
+          </p:cNvSpPr>
+          <p:nvPr>
+            <p:ph idx="1"/>
+          </p:nvPr>
+        </p:nvSpPr>
+        <p:spPr/>
+        <p:txBody>
+          <a:bodyPr/>
+          <a:lstStyle/>
+          <a:p>
+            <a:r>
+              <a:rPr lang="en-US" dirty="0"/>
+              <a:t>To Add: Add a new project: cargo new my-tests --lib</a:t>
+            </a:r>
+          </a:p>
+          <a:p>
+            <a:r>
+              <a:rPr lang="en-US" dirty="0"/>
+              <a:t>To Run: cargo test</a:t>
+            </a:r>
+          </a:p>
+        </p:txBody>
+      </p:sp>
+      <p:pic>
+        <p:nvPicPr>
+          <p:cNvPr id="4" name="Picture 3">
+            <a:extLst>
+              <a:ext uri="{FF2B5EF4-FFF2-40B4-BE49-F238E27FC236}">
+                <a16:creationId xmlns:a16="http://schemas.microsoft.com/office/drawing/2014/main" id="{5215D6D9-CC71-493F-9BB5-316446C68485}"/>
+              </a:ext>
+            </a:extLst>
+          </p:cNvPr>
+          <p:cNvPicPr>
+            <a:picLocks noChangeAspect="1"/>
+          </p:cNvPicPr>
+          <p:nvPr/>
+        </p:nvPicPr>
+        <p:blipFill>
+          <a:blip r:embed="rId2"/>
+          <a:stretch>
+            <a:fillRect/>
+          </a:stretch>
+        </p:blipFill>
+        <p:spPr>
+          <a:xfrm>
+            <a:off x="6776718" y="5064116"/>
+            <a:ext cx="2395555" cy="1247784"/>
+          </a:xfrm>
+          <a:prstGeom prst="rect">
+            <a:avLst/>
+          </a:prstGeom>
+        </p:spPr>
+      </p:pic>
+    </p:spTree>
+    <p:extLst>
+      <p:ext uri="{BB962C8B-B14F-4D97-AF65-F5344CB8AC3E}">
+        <p14:creationId xmlns:p14="http://schemas.microsoft.com/office/powerpoint/2010/main" val="1909587117"/>
+      </p:ext>
+    </p:extLst>
+  </p:cSld>
+  <p:clrMapOvr>
+    <a:masterClrMapping/>
+  </p:clrMapOvr>
+</p:sld>
+</file>
+
+<file path=ppt/slides/slide3.xml><?xml version="1.0" encoding="utf-8"?>
+<p:sld xmlns:a="http://schemas.openxmlformats.org/drawingml/2006/main" xmlns:r="http://schemas.openxmlformats.org/officeDocument/2006/relationships" xmlns:p="http://schemas.openxmlformats.org/presentationml/2006/main">
+  <p:cSld>
+    <p:spTree>
+      <p:nvGrpSpPr>
+        <p:cNvPr id="1" name=""/>
+        <p:cNvGrpSpPr/>
+        <p:nvPr/>
+      </p:nvGrpSpPr>
+      <p:grpSpPr>
+        <a:xfrm>
+          <a:off x="0" y="0"/>
+          <a:ext cx="0" cy="0"/>
+          <a:chOff x="0" y="0"/>
+          <a:chExt cx="0" cy="0"/>
+        </a:xfrm>
+      </p:grpSpPr>
+      <p:sp>
+        <p:nvSpPr>
+          <p:cNvPr id="2" name="Title 1">
+            <a:extLst>
+              <a:ext uri="{FF2B5EF4-FFF2-40B4-BE49-F238E27FC236}">
+                <a16:creationId xmlns:a16="http://schemas.microsoft.com/office/drawing/2014/main" id="{9C32BAD4-E63B-4944-8DC8-6CF4EE538B89}"/>
+              </a:ext>
+            </a:extLst>
+          </p:cNvPr>
+          <p:cNvSpPr>
+            <a:spLocks noGrp="1"/>
+          </p:cNvSpPr>
+          <p:nvPr>
+            <p:ph type="title"/>
+          </p:nvPr>
+        </p:nvSpPr>
+        <p:spPr/>
+        <p:txBody>
+          <a:bodyPr/>
+          <a:lstStyle/>
+          <a:p>
+            <a:r>
+              <a:rPr lang="en-US" dirty="0"/>
+              <a:t>My Background</a:t>
+            </a:r>
+          </a:p>
+        </p:txBody>
+      </p:sp>
+      <p:sp>
+        <p:nvSpPr>
+          <p:cNvPr id="3" name="Content Placeholder 2">
+            <a:extLst>
+              <a:ext uri="{FF2B5EF4-FFF2-40B4-BE49-F238E27FC236}">
+                <a16:creationId xmlns:a16="http://schemas.microsoft.com/office/drawing/2014/main" id="{A94F5030-ED2D-45BA-8999-C7B0248C16EA}"/>
+              </a:ext>
+            </a:extLst>
+          </p:cNvPr>
+          <p:cNvSpPr>
+            <a:spLocks noGrp="1"/>
+          </p:cNvSpPr>
+          <p:nvPr>
+            <p:ph idx="1"/>
+          </p:nvPr>
+        </p:nvSpPr>
+        <p:spPr/>
+        <p:txBody>
+          <a:bodyPr/>
+          <a:lstStyle/>
+          <a:p>
+            <a:r>
+              <a:rPr lang="en-US" dirty="0"/>
+              <a:t>Primarily C#/.NET Developer</a:t>
+            </a:r>
+          </a:p>
+          <a:p>
+            <a:r>
+              <a:rPr lang="en-US" dirty="0"/>
+              <a:t>Mostly develop apps in controlled environments</a:t>
+            </a:r>
+          </a:p>
+          <a:p>
+            <a:pPr lvl="1"/>
+            <a:r>
+              <a:rPr lang="en-US" dirty="0"/>
+              <a:t>Backend Server</a:t>
+            </a:r>
+          </a:p>
+          <a:p>
+            <a:pPr lvl="1"/>
+            <a:r>
+              <a:rPr lang="en-US" dirty="0"/>
+              <a:t>Desktop/Mobile</a:t>
+            </a:r>
+          </a:p>
+        </p:txBody>
+      </p:sp>
+    </p:spTree>
+    <p:extLst>
+      <p:ext uri="{BB962C8B-B14F-4D97-AF65-F5344CB8AC3E}">
+        <p14:creationId xmlns:p14="http://schemas.microsoft.com/office/powerpoint/2010/main" val="1290334293"/>
+      </p:ext>
+    </p:extLst>
+  </p:cSld>
+  <p:clrMapOvr>
+    <a:masterClrMapping/>
+  </p:clrMapOvr>
+</p:sld>
+</file>
+
+<file path=ppt/slides/slide4.xml><?xml version="1.0" encoding="utf-8"?>
 <p:sld xmlns:a="http://schemas.openxmlformats.org/drawingml/2006/main" xmlns:r="http://schemas.openxmlformats.org/officeDocument/2006/relationships" xmlns:p="http://schemas.openxmlformats.org/presentationml/2006/main">
   <p:cSld>
     <p:spTree>
@@ -5438,7 +6044,7 @@
           <a:lstStyle/>
           <a:p>
             <a:pPr algn="ctr"/>
-            <a:endParaRPr lang="en-US"/>
+            <a:endParaRPr lang="en-US" dirty="0"/>
           </a:p>
         </p:txBody>
       </p:sp>
@@ -5966,239 +6572,6 @@
 </p:sld>
 </file>
 
-<file path=ppt/slides/slide3.xml><?xml version="1.0" encoding="utf-8"?>
-<p:sld xmlns:a="http://schemas.openxmlformats.org/drawingml/2006/main" xmlns:r="http://schemas.openxmlformats.org/officeDocument/2006/relationships" xmlns:p="http://schemas.openxmlformats.org/presentationml/2006/main">
-  <p:cSld>
-    <p:spTree>
-      <p:nvGrpSpPr>
-        <p:cNvPr id="1" name=""/>
-        <p:cNvGrpSpPr/>
-        <p:nvPr/>
-      </p:nvGrpSpPr>
-      <p:grpSpPr>
-        <a:xfrm>
-          <a:off x="0" y="0"/>
-          <a:ext cx="0" cy="0"/>
-          <a:chOff x="0" y="0"/>
-          <a:chExt cx="0" cy="0"/>
-        </a:xfrm>
-      </p:grpSpPr>
-      <p:sp>
-        <p:nvSpPr>
-          <p:cNvPr id="2" name="Title 1">
-            <a:extLst>
-              <a:ext uri="{FF2B5EF4-FFF2-40B4-BE49-F238E27FC236}">
-                <a16:creationId xmlns:a16="http://schemas.microsoft.com/office/drawing/2014/main" id="{63A6B202-6EB1-4E9D-A772-B851CF40F77F}"/>
-              </a:ext>
-            </a:extLst>
-          </p:cNvPr>
-          <p:cNvSpPr>
-            <a:spLocks noGrp="1"/>
-          </p:cNvSpPr>
-          <p:nvPr>
-            <p:ph type="title"/>
-          </p:nvPr>
-        </p:nvSpPr>
-        <p:spPr/>
-        <p:txBody>
-          <a:bodyPr/>
-          <a:lstStyle/>
-          <a:p>
-            <a:r>
-              <a:rPr lang="en-US" dirty="0"/>
-              <a:t>Code Example!</a:t>
-            </a:r>
-          </a:p>
-        </p:txBody>
-      </p:sp>
-      <p:sp>
-        <p:nvSpPr>
-          <p:cNvPr id="3" name="Content Placeholder 2">
-            <a:extLst>
-              <a:ext uri="{FF2B5EF4-FFF2-40B4-BE49-F238E27FC236}">
-                <a16:creationId xmlns:a16="http://schemas.microsoft.com/office/drawing/2014/main" id="{021A7D65-BEEF-42D8-8647-D46DF6D45389}"/>
-              </a:ext>
-            </a:extLst>
-          </p:cNvPr>
-          <p:cNvSpPr>
-            <a:spLocks noGrp="1"/>
-          </p:cNvSpPr>
-          <p:nvPr>
-            <p:ph idx="1"/>
-          </p:nvPr>
-        </p:nvSpPr>
-        <p:spPr/>
-        <p:txBody>
-          <a:bodyPr/>
-          <a:lstStyle/>
-          <a:p>
-            <a:r>
-              <a:rPr lang="en-US" dirty="0"/>
-              <a:t>It’s C Code</a:t>
-            </a:r>
-          </a:p>
-        </p:txBody>
-      </p:sp>
-    </p:spTree>
-    <p:extLst>
-      <p:ext uri="{BB962C8B-B14F-4D97-AF65-F5344CB8AC3E}">
-        <p14:creationId xmlns:p14="http://schemas.microsoft.com/office/powerpoint/2010/main" val="2224390578"/>
-      </p:ext>
-    </p:extLst>
-  </p:cSld>
-  <p:clrMapOvr>
-    <a:masterClrMapping/>
-  </p:clrMapOvr>
-</p:sld>
-</file>
-
-<file path=ppt/slides/slide4.xml><?xml version="1.0" encoding="utf-8"?>
-<p:sld xmlns:a="http://schemas.openxmlformats.org/drawingml/2006/main" xmlns:r="http://schemas.openxmlformats.org/officeDocument/2006/relationships" xmlns:p="http://schemas.openxmlformats.org/presentationml/2006/main">
-  <p:cSld>
-    <p:spTree>
-      <p:nvGrpSpPr>
-        <p:cNvPr id="1" name=""/>
-        <p:cNvGrpSpPr/>
-        <p:nvPr/>
-      </p:nvGrpSpPr>
-      <p:grpSpPr>
-        <a:xfrm>
-          <a:off x="0" y="0"/>
-          <a:ext cx="0" cy="0"/>
-          <a:chOff x="0" y="0"/>
-          <a:chExt cx="0" cy="0"/>
-        </a:xfrm>
-      </p:grpSpPr>
-      <p:sp>
-        <p:nvSpPr>
-          <p:cNvPr id="2" name="Title 1">
-            <a:extLst>
-              <a:ext uri="{FF2B5EF4-FFF2-40B4-BE49-F238E27FC236}">
-                <a16:creationId xmlns:a16="http://schemas.microsoft.com/office/drawing/2014/main" id="{ADD51F4F-49EA-4521-830A-50B931F48C9B}"/>
-              </a:ext>
-            </a:extLst>
-          </p:cNvPr>
-          <p:cNvSpPr>
-            <a:spLocks noGrp="1"/>
-          </p:cNvSpPr>
-          <p:nvPr>
-            <p:ph type="title"/>
-          </p:nvPr>
-        </p:nvSpPr>
-        <p:spPr/>
-        <p:txBody>
-          <a:bodyPr/>
-          <a:lstStyle/>
-          <a:p>
-            <a:r>
-              <a:rPr lang="en-US" dirty="0"/>
-              <a:t>Let’s talk about C/C++</a:t>
-            </a:r>
-          </a:p>
-        </p:txBody>
-      </p:sp>
-      <p:sp>
-        <p:nvSpPr>
-          <p:cNvPr id="3" name="Content Placeholder 2">
-            <a:extLst>
-              <a:ext uri="{FF2B5EF4-FFF2-40B4-BE49-F238E27FC236}">
-                <a16:creationId xmlns:a16="http://schemas.microsoft.com/office/drawing/2014/main" id="{DA297433-4AD9-40C0-85E5-A5B079F47112}"/>
-              </a:ext>
-            </a:extLst>
-          </p:cNvPr>
-          <p:cNvSpPr>
-            <a:spLocks noGrp="1"/>
-          </p:cNvSpPr>
-          <p:nvPr>
-            <p:ph idx="1"/>
-          </p:nvPr>
-        </p:nvSpPr>
-        <p:spPr/>
-        <p:txBody>
-          <a:bodyPr/>
-          <a:lstStyle/>
-          <a:p>
-            <a:r>
-              <a:rPr lang="en-US" dirty="0"/>
-              <a:t>Built for Speed</a:t>
-            </a:r>
-          </a:p>
-          <a:p>
-            <a:r>
-              <a:rPr lang="en-US" dirty="0"/>
-              <a:t>Not memory safe</a:t>
-            </a:r>
-          </a:p>
-          <a:p>
-            <a:pPr lvl="1"/>
-            <a:r>
-              <a:rPr lang="en-US" dirty="0" err="1"/>
-              <a:t>Gotta</a:t>
-            </a:r>
-            <a:r>
-              <a:rPr lang="en-US"/>
-              <a:t> love them pointers</a:t>
-            </a:r>
-            <a:endParaRPr lang="en-US" dirty="0"/>
-          </a:p>
-          <a:p>
-            <a:r>
-              <a:rPr lang="en-US" dirty="0"/>
-              <a:t>Building</a:t>
-            </a:r>
-          </a:p>
-          <a:p>
-            <a:pPr lvl="1"/>
-            <a:r>
-              <a:rPr lang="en-US" dirty="0"/>
-              <a:t>CMake Script</a:t>
-            </a:r>
-          </a:p>
-          <a:p>
-            <a:pPr lvl="1"/>
-            <a:r>
-              <a:rPr lang="en-US" dirty="0"/>
-              <a:t>Have fun setting it up</a:t>
-            </a:r>
-          </a:p>
-          <a:p>
-            <a:r>
-              <a:rPr lang="en-US" dirty="0"/>
-              <a:t>Unit Testing</a:t>
-            </a:r>
-          </a:p>
-          <a:p>
-            <a:pPr lvl="1"/>
-            <a:r>
-              <a:rPr lang="en-US" dirty="0"/>
-              <a:t>Handful of options</a:t>
-            </a:r>
-          </a:p>
-          <a:p>
-            <a:pPr lvl="1"/>
-            <a:r>
-              <a:rPr lang="en-US" dirty="0"/>
-              <a:t>Have fun setting it up</a:t>
-            </a:r>
-          </a:p>
-          <a:p>
-            <a:endParaRPr lang="en-US" dirty="0"/>
-          </a:p>
-        </p:txBody>
-      </p:sp>
-    </p:spTree>
-    <p:extLst>
-      <p:ext uri="{BB962C8B-B14F-4D97-AF65-F5344CB8AC3E}">
-        <p14:creationId xmlns:p14="http://schemas.microsoft.com/office/powerpoint/2010/main" val="49177043"/>
-      </p:ext>
-    </p:extLst>
-  </p:cSld>
-  <p:clrMapOvr>
-    <a:masterClrMapping/>
-  </p:clrMapOvr>
-</p:sld>
-</file>
-
 <file path=ppt/slides/slide5.xml><?xml version="1.0" encoding="utf-8"?>
 <p:sld xmlns:a="http://schemas.openxmlformats.org/drawingml/2006/main" xmlns:r="http://schemas.openxmlformats.org/officeDocument/2006/relationships" xmlns:p="http://schemas.openxmlformats.org/presentationml/2006/main">
   <p:cSld>
@@ -6221,7 +6594,7 @@
           <p:cNvPr id="2" name="Title 1">
             <a:extLst>
               <a:ext uri="{FF2B5EF4-FFF2-40B4-BE49-F238E27FC236}">
-                <a16:creationId xmlns:a16="http://schemas.microsoft.com/office/drawing/2014/main" id="{83DE588E-2A3E-40A1-8B63-EB2732B5D19A}"/>
+                <a16:creationId xmlns:a16="http://schemas.microsoft.com/office/drawing/2014/main" id="{ADD51F4F-49EA-4521-830A-50B931F48C9B}"/>
               </a:ext>
             </a:extLst>
           </p:cNvPr>
@@ -6239,7 +6612,7 @@
           <a:p>
             <a:r>
               <a:rPr lang="en-US" dirty="0"/>
-              <a:t>What is Rust?</a:t>
+              <a:t>Let’s talk about C/C++</a:t>
             </a:r>
           </a:p>
         </p:txBody>
@@ -6249,7 +6622,7 @@
           <p:cNvPr id="3" name="Content Placeholder 2">
             <a:extLst>
               <a:ext uri="{FF2B5EF4-FFF2-40B4-BE49-F238E27FC236}">
-                <a16:creationId xmlns:a16="http://schemas.microsoft.com/office/drawing/2014/main" id="{EDA467E1-8794-48E3-8782-BAF2AB5BD1CE}"/>
+                <a16:creationId xmlns:a16="http://schemas.microsoft.com/office/drawing/2014/main" id="{DA297433-4AD9-40C0-85E5-A5B079F47112}"/>
               </a:ext>
             </a:extLst>
           </p:cNvPr>
@@ -6267,25 +6640,65 @@
           <a:p>
             <a:r>
               <a:rPr lang="en-US" dirty="0"/>
-              <a:t>C based syntax</a:t>
-            </a:r>
-          </a:p>
-          <a:p>
-            <a:r>
-              <a:rPr lang="en-US" dirty="0"/>
-              <a:t>Performance comparable to C++</a:t>
-            </a:r>
-          </a:p>
-          <a:p>
-            <a:r>
-              <a:rPr lang="en-US" dirty="0"/>
-              <a:t>Created by Mozilla</a:t>
-            </a:r>
-          </a:p>
-          <a:p>
-            <a:r>
-              <a:rPr lang="en-US" dirty="0"/>
-              <a:t>“Most loved programming language“ in Stack Overflow’s Developer Survey 2016-2019</a:t>
+              <a:t>Built for Speed</a:t>
+            </a:r>
+          </a:p>
+          <a:p>
+            <a:r>
+              <a:rPr lang="en-US" dirty="0"/>
+              <a:t>Not memory safe</a:t>
+            </a:r>
+          </a:p>
+          <a:p>
+            <a:pPr lvl="1"/>
+            <a:r>
+              <a:rPr lang="en-US" dirty="0" err="1"/>
+              <a:t>Gotta</a:t>
+            </a:r>
+            <a:r>
+              <a:rPr lang="en-US"/>
+              <a:t> love them pointers</a:t>
+            </a:r>
+            <a:endParaRPr lang="en-US" dirty="0"/>
+          </a:p>
+          <a:p>
+            <a:r>
+              <a:rPr lang="en-US" dirty="0"/>
+              <a:t>Building</a:t>
+            </a:r>
+          </a:p>
+          <a:p>
+            <a:pPr lvl="1"/>
+            <a:r>
+              <a:rPr lang="en-US" dirty="0"/>
+              <a:t>CMake Script</a:t>
+            </a:r>
+          </a:p>
+          <a:p>
+            <a:pPr lvl="1"/>
+            <a:r>
+              <a:rPr lang="en-US" dirty="0"/>
+              <a:t>Have fun setting it up</a:t>
+            </a:r>
+          </a:p>
+          <a:p>
+            <a:r>
+              <a:rPr lang="en-US" dirty="0"/>
+              <a:t>Unit Testing</a:t>
+            </a:r>
+          </a:p>
+          <a:p>
+            <a:pPr lvl="1"/>
+            <a:r>
+              <a:rPr lang="en-US" dirty="0"/>
+              <a:t>Handful of options</a:t>
+            </a:r>
+          </a:p>
+          <a:p>
+            <a:pPr lvl="1"/>
+            <a:r>
+              <a:rPr lang="en-US" dirty="0"/>
+              <a:t>Have fun setting it up</a:t>
             </a:r>
           </a:p>
           <a:p>
@@ -6296,7 +6709,7 @@
     </p:spTree>
     <p:extLst>
       <p:ext uri="{BB962C8B-B14F-4D97-AF65-F5344CB8AC3E}">
-        <p14:creationId xmlns:p14="http://schemas.microsoft.com/office/powerpoint/2010/main" val="624615685"/>
+        <p14:creationId xmlns:p14="http://schemas.microsoft.com/office/powerpoint/2010/main" val="49177043"/>
       </p:ext>
     </p:extLst>
   </p:cSld>
@@ -6328,7 +6741,7 @@
           <p:cNvPr id="2" name="Title 1">
             <a:extLst>
               <a:ext uri="{FF2B5EF4-FFF2-40B4-BE49-F238E27FC236}">
-                <a16:creationId xmlns:a16="http://schemas.microsoft.com/office/drawing/2014/main" id="{FA2BD226-E041-4079-8DC7-DDA72477C149}"/>
+                <a16:creationId xmlns:a16="http://schemas.microsoft.com/office/drawing/2014/main" id="{36F5D57F-C3A7-4BD0-9FC9-6F2ADB4EBF6C}"/>
               </a:ext>
             </a:extLst>
           </p:cNvPr>
@@ -6346,7 +6759,7 @@
           <a:p>
             <a:r>
               <a:rPr lang="en-US" dirty="0"/>
-              <a:t>Why Rust?</a:t>
+              <a:t>1 Year Ago</a:t>
             </a:r>
           </a:p>
         </p:txBody>
@@ -6356,7 +6769,7 @@
           <p:cNvPr id="3" name="Content Placeholder 2">
             <a:extLst>
               <a:ext uri="{FF2B5EF4-FFF2-40B4-BE49-F238E27FC236}">
-                <a16:creationId xmlns:a16="http://schemas.microsoft.com/office/drawing/2014/main" id="{F84E0BD2-0042-44C9-8332-D4D4AE19CBE8}"/>
+                <a16:creationId xmlns:a16="http://schemas.microsoft.com/office/drawing/2014/main" id="{FA87FC8B-CC75-4202-A6DE-79E1B39AB413}"/>
               </a:ext>
             </a:extLst>
           </p:cNvPr>
@@ -6374,37 +6787,39 @@
           <a:p>
             <a:r>
               <a:rPr lang="en-US" dirty="0"/>
-              <a:t>New Docs</a:t>
-            </a:r>
-          </a:p>
-          <a:p>
-            <a:pPr lvl="1"/>
-            <a:r>
-              <a:rPr lang="en-US" dirty="0"/>
-              <a:t>Good Docs</a:t>
-            </a:r>
-          </a:p>
-          <a:p>
-            <a:r>
-              <a:rPr lang="en-US" dirty="0"/>
-              <a:t>Memory Safety</a:t>
-            </a:r>
-          </a:p>
-          <a:p>
-            <a:r>
-              <a:rPr lang="en-US" dirty="0"/>
-              <a:t>Performance</a:t>
-            </a:r>
-          </a:p>
-          <a:p>
-            <a:endParaRPr lang="en-US" dirty="0"/>
+              <a:t>Cmake</a:t>
+            </a:r>
+          </a:p>
+          <a:p>
+            <a:r>
+              <a:rPr lang="en-US" dirty="0"/>
+              <a:t>C/C++</a:t>
+            </a:r>
+          </a:p>
+          <a:p>
+            <a:r>
+              <a:rPr lang="en-US" dirty="0"/>
+              <a:t>Unit Tests with Google Test</a:t>
+            </a:r>
+          </a:p>
+          <a:p>
+            <a:r>
+              <a:rPr lang="en-US" dirty="0"/>
+              <a:t>It was hard</a:t>
+            </a:r>
+          </a:p>
+          <a:p>
+            <a:r>
+              <a:rPr lang="en-US" dirty="0"/>
+              <a:t>Never figured out on-board debugging</a:t>
+            </a:r>
           </a:p>
         </p:txBody>
       </p:sp>
     </p:spTree>
     <p:extLst>
       <p:ext uri="{BB962C8B-B14F-4D97-AF65-F5344CB8AC3E}">
-        <p14:creationId xmlns:p14="http://schemas.microsoft.com/office/powerpoint/2010/main" val="2082636709"/>
+        <p14:creationId xmlns:p14="http://schemas.microsoft.com/office/powerpoint/2010/main" val="837529126"/>
       </p:ext>
     </p:extLst>
   </p:cSld>
@@ -6436,7 +6851,7 @@
           <p:cNvPr id="2" name="Title 1">
             <a:extLst>
               <a:ext uri="{FF2B5EF4-FFF2-40B4-BE49-F238E27FC236}">
-                <a16:creationId xmlns:a16="http://schemas.microsoft.com/office/drawing/2014/main" id="{EBC8A360-5809-4304-ADFF-05BBC2ECD839}"/>
+                <a16:creationId xmlns:a16="http://schemas.microsoft.com/office/drawing/2014/main" id="{63A6B202-6EB1-4E9D-A772-B851CF40F77F}"/>
               </a:ext>
             </a:extLst>
           </p:cNvPr>
@@ -6454,7 +6869,7 @@
           <a:p>
             <a:r>
               <a:rPr lang="en-US" dirty="0"/>
-              <a:t>Books!!! and other docs</a:t>
+              <a:t>Code Example!</a:t>
             </a:r>
           </a:p>
         </p:txBody>
@@ -6464,7 +6879,7 @@
           <p:cNvPr id="3" name="Content Placeholder 2">
             <a:extLst>
               <a:ext uri="{FF2B5EF4-FFF2-40B4-BE49-F238E27FC236}">
-                <a16:creationId xmlns:a16="http://schemas.microsoft.com/office/drawing/2014/main" id="{9C201CBE-0B86-48F5-B183-B9A8C8DE2089}"/>
+                <a16:creationId xmlns:a16="http://schemas.microsoft.com/office/drawing/2014/main" id="{021A7D65-BEEF-42D8-8647-D46DF6D45389}"/>
               </a:ext>
             </a:extLst>
           </p:cNvPr>
@@ -6482,38 +6897,15 @@
           <a:p>
             <a:r>
               <a:rPr lang="en-US" dirty="0"/>
-              <a:t>Basic Rust Book: </a:t>
-            </a:r>
-            <a:r>
-              <a:rPr lang="en-US" dirty="0">
-                <a:hlinkClick r:id="rId2"/>
-              </a:rPr>
-              <a:t>https://doc.rust-lang.org/book/</a:t>
-            </a:r>
-            <a:endParaRPr lang="en-US" dirty="0"/>
-          </a:p>
-          <a:p>
-            <a:r>
-              <a:rPr lang="en-US" dirty="0"/>
-              <a:t>Embedded Rust Book: </a:t>
-            </a:r>
-            <a:r>
-              <a:rPr lang="en-US" dirty="0">
-                <a:hlinkClick r:id="rId3"/>
-              </a:rPr>
-              <a:t>https://rust-embedded.github.io/book/intro/index.html</a:t>
-            </a:r>
-            <a:endParaRPr lang="en-US" dirty="0"/>
-          </a:p>
-          <a:p>
-            <a:endParaRPr lang="en-US" dirty="0"/>
+              <a:t>It’s C Code</a:t>
+            </a:r>
           </a:p>
         </p:txBody>
       </p:sp>
     </p:spTree>
     <p:extLst>
       <p:ext uri="{BB962C8B-B14F-4D97-AF65-F5344CB8AC3E}">
-        <p14:creationId xmlns:p14="http://schemas.microsoft.com/office/powerpoint/2010/main" val="774428196"/>
+        <p14:creationId xmlns:p14="http://schemas.microsoft.com/office/powerpoint/2010/main" val="2224390578"/>
       </p:ext>
     </p:extLst>
   </p:cSld>
@@ -6545,7 +6937,7 @@
           <p:cNvPr id="2" name="Title 1">
             <a:extLst>
               <a:ext uri="{FF2B5EF4-FFF2-40B4-BE49-F238E27FC236}">
-                <a16:creationId xmlns:a16="http://schemas.microsoft.com/office/drawing/2014/main" id="{D9D1052D-B90E-4951-A48D-DA0E50370EF5}"/>
+                <a16:creationId xmlns:a16="http://schemas.microsoft.com/office/drawing/2014/main" id="{83DE588E-2A3E-40A1-8B63-EB2732B5D19A}"/>
               </a:ext>
             </a:extLst>
           </p:cNvPr>
@@ -6563,7 +6955,7 @@
           <a:p>
             <a:r>
               <a:rPr lang="en-US" dirty="0"/>
-              <a:t>Getting Started</a:t>
+              <a:t>What is Rust?</a:t>
             </a:r>
           </a:p>
         </p:txBody>
@@ -6573,7 +6965,7 @@
           <p:cNvPr id="3" name="Content Placeholder 2">
             <a:extLst>
               <a:ext uri="{FF2B5EF4-FFF2-40B4-BE49-F238E27FC236}">
-                <a16:creationId xmlns:a16="http://schemas.microsoft.com/office/drawing/2014/main" id="{341D4FB4-5A4C-4226-8499-E5C40648563E}"/>
+                <a16:creationId xmlns:a16="http://schemas.microsoft.com/office/drawing/2014/main" id="{EDA467E1-8794-48E3-8782-BAF2AB5BD1CE}"/>
               </a:ext>
             </a:extLst>
           </p:cNvPr>
@@ -6591,70 +6983,36 @@
           <a:p>
             <a:r>
               <a:rPr lang="en-US" dirty="0"/>
-              <a:t>Navigate to: </a:t>
-            </a:r>
-            <a:r>
-              <a:rPr lang="en-US" dirty="0">
-                <a:hlinkClick r:id="rId2"/>
-              </a:rPr>
-              <a:t>https://www.rust-lang.org/</a:t>
-            </a:r>
+              <a:t>C based syntax</a:t>
+            </a:r>
+          </a:p>
+          <a:p>
+            <a:r>
+              <a:rPr lang="en-US" dirty="0"/>
+              <a:t>Performance comparable to C++</a:t>
+            </a:r>
+          </a:p>
+          <a:p>
+            <a:r>
+              <a:rPr lang="en-US" dirty="0"/>
+              <a:t>Created by Mozilla</a:t>
+            </a:r>
+          </a:p>
+          <a:p>
+            <a:r>
+              <a:rPr lang="en-US" dirty="0"/>
+              <a:t>“Most loved programming language“ in Stack Overflow’s Developer Survey 2016-2019</a:t>
+            </a:r>
+          </a:p>
+          <a:p>
             <a:endParaRPr lang="en-US" dirty="0"/>
-          </a:p>
-          <a:p>
-            <a:r>
-              <a:rPr lang="en-US" dirty="0"/>
-              <a:t>Follow Instructions to install</a:t>
-            </a:r>
-          </a:p>
-          <a:p>
-            <a:r>
-              <a:rPr lang="en-US" dirty="0"/>
-              <a:t>Use CLI: `cargo new </a:t>
-            </a:r>
-            <a:r>
-              <a:rPr lang="en-US" dirty="0" err="1"/>
-              <a:t>hello_world</a:t>
-            </a:r>
-            <a:r>
-              <a:rPr lang="en-US" dirty="0"/>
-              <a:t>`</a:t>
-            </a:r>
-          </a:p>
-          <a:p>
-            <a:r>
-              <a:rPr lang="en-US" dirty="0"/>
-              <a:t>Navigate to </a:t>
-            </a:r>
-            <a:r>
-              <a:rPr lang="en-US" dirty="0" err="1"/>
-              <a:t>hello_world</a:t>
-            </a:r>
-            <a:r>
-              <a:rPr lang="en-US" dirty="0"/>
-              <a:t> folder</a:t>
-            </a:r>
-          </a:p>
-          <a:p>
-            <a:r>
-              <a:rPr lang="en-US" dirty="0"/>
-              <a:t>Use CLI: `cargo run </a:t>
-            </a:r>
-            <a:r>
-              <a:rPr lang="en-US" dirty="0" err="1"/>
-              <a:t>hello_world</a:t>
-            </a:r>
-            <a:r>
-              <a:rPr lang="en-US" dirty="0"/>
-              <a:t>`</a:t>
-            </a:r>
           </a:p>
         </p:txBody>
       </p:sp>
     </p:spTree>
     <p:extLst>
       <p:ext uri="{BB962C8B-B14F-4D97-AF65-F5344CB8AC3E}">
-        <p14:creationId xmlns:p14="http://schemas.microsoft.com/office/powerpoint/2010/main" val="1163067433"/>
+        <p14:creationId xmlns:p14="http://schemas.microsoft.com/office/powerpoint/2010/main" val="624615685"/>
       </p:ext>
     </p:extLst>
   </p:cSld>
@@ -6686,7 +7044,7 @@
           <p:cNvPr id="2" name="Title 1">
             <a:extLst>
               <a:ext uri="{FF2B5EF4-FFF2-40B4-BE49-F238E27FC236}">
-                <a16:creationId xmlns:a16="http://schemas.microsoft.com/office/drawing/2014/main" id="{03F2DE0A-72C0-4E6C-B546-2CE22D7D6660}"/>
+                <a16:creationId xmlns:a16="http://schemas.microsoft.com/office/drawing/2014/main" id="{FA2BD226-E041-4079-8DC7-DDA72477C149}"/>
               </a:ext>
             </a:extLst>
           </p:cNvPr>
@@ -6704,7 +7062,7 @@
           <a:p>
             <a:r>
               <a:rPr lang="en-US" dirty="0"/>
-              <a:t>No Embedded “Standard Library”</a:t>
+              <a:t>Why Rust?</a:t>
             </a:r>
           </a:p>
         </p:txBody>
@@ -6714,7 +7072,7 @@
           <p:cNvPr id="3" name="Content Placeholder 2">
             <a:extLst>
               <a:ext uri="{FF2B5EF4-FFF2-40B4-BE49-F238E27FC236}">
-                <a16:creationId xmlns:a16="http://schemas.microsoft.com/office/drawing/2014/main" id="{574CC8C0-D171-4B9C-90C8-5F6F6852A72E}"/>
+                <a16:creationId xmlns:a16="http://schemas.microsoft.com/office/drawing/2014/main" id="{F84E0BD2-0042-44C9-8332-D4D4AE19CBE8}"/>
               </a:ext>
             </a:extLst>
           </p:cNvPr>
@@ -6732,59 +7090,37 @@
           <a:p>
             <a:r>
               <a:rPr lang="en-US" dirty="0"/>
-              <a:t>Embedded devices are small</a:t>
-            </a:r>
-          </a:p>
-          <a:p>
-            <a:r>
-              <a:rPr lang="en-US" dirty="0"/>
-              <a:t>Alternative: </a:t>
-            </a:r>
-            <a:r>
-              <a:rPr lang="en-US" dirty="0" err="1"/>
-              <a:t>no_std</a:t>
-            </a:r>
+              <a:t>New Docs</a:t>
+            </a:r>
+          </a:p>
+          <a:p>
+            <a:pPr lvl="1"/>
+            <a:r>
+              <a:rPr lang="en-US" dirty="0"/>
+              <a:t>Good Docs</a:t>
+            </a:r>
+          </a:p>
+          <a:p>
+            <a:r>
+              <a:rPr lang="en-US" dirty="0"/>
+              <a:t>Memory Safety</a:t>
+            </a:r>
+          </a:p>
+          <a:p>
+            <a:r>
+              <a:rPr lang="en-US" dirty="0"/>
+              <a:t>Performance</a:t>
+            </a:r>
+          </a:p>
+          <a:p>
             <a:endParaRPr lang="en-US" dirty="0"/>
           </a:p>
-          <a:p>
-            <a:endParaRPr lang="en-US" dirty="0"/>
-          </a:p>
-        </p:txBody>
-      </p:sp>
-      <p:pic>
-        <p:nvPicPr>
-          <p:cNvPr id="6" name="Picture 5">
-            <a:extLst>
-              <a:ext uri="{FF2B5EF4-FFF2-40B4-BE49-F238E27FC236}">
-                <a16:creationId xmlns:a16="http://schemas.microsoft.com/office/drawing/2014/main" id="{73BD517B-A24C-4FEA-9437-CB98DD6DB41E}"/>
-              </a:ext>
-            </a:extLst>
-          </p:cNvPr>
-          <p:cNvPicPr>
-            <a:picLocks noChangeAspect="1"/>
-          </p:cNvPicPr>
-          <p:nvPr/>
-        </p:nvPicPr>
-        <p:blipFill>
-          <a:blip r:embed="rId2"/>
-          <a:stretch>
-            <a:fillRect/>
-          </a:stretch>
-        </p:blipFill>
-        <p:spPr>
-          <a:xfrm>
-            <a:off x="3862552" y="2701741"/>
-            <a:ext cx="7831893" cy="3934743"/>
-          </a:xfrm>
-          <a:prstGeom prst="rect">
-            <a:avLst/>
-          </a:prstGeom>
-        </p:spPr>
-      </p:pic>
+        </p:txBody>
+      </p:sp>
     </p:spTree>
     <p:extLst>
       <p:ext uri="{BB962C8B-B14F-4D97-AF65-F5344CB8AC3E}">
-        <p14:creationId xmlns:p14="http://schemas.microsoft.com/office/powerpoint/2010/main" val="2008116879"/>
+        <p14:creationId xmlns:p14="http://schemas.microsoft.com/office/powerpoint/2010/main" val="2082636709"/>
       </p:ext>
     </p:extLst>
   </p:cSld>

</xml_diff>